<commit_message>
UPDATE Mockup: Stage and plan merged as GUI and color added
</commit_message>
<xml_diff>
--- a/MockupPRO.pptx
+++ b/MockupPRO.pptx
@@ -5,11 +5,10 @@
     <p:sldMasterId id="2147483648" r:id="rId1"/>
   </p:sldMasterIdLst>
   <p:notesMasterIdLst>
-    <p:notesMasterId r:id="rId4"/>
+    <p:notesMasterId r:id="rId3"/>
   </p:notesMasterIdLst>
   <p:sldIdLst>
-    <p:sldId id="256" r:id="rId2"/>
-    <p:sldId id="257" r:id="rId3"/>
+    <p:sldId id="257" r:id="rId2"/>
   </p:sldIdLst>
   <p:sldSz cx="12192000" cy="6858000"/>
   <p:notesSz cx="6858000" cy="9144000"/>
@@ -108,6 +107,11 @@
       </a:defRPr>
     </a:lvl9pPr>
   </p:defaultTextStyle>
+  <p:extLst>
+    <p:ext uri="{EFAFB233-063F-42B5-8137-9DF3F51BA10A}">
+      <p15:sldGuideLst xmlns:p15="http://schemas.microsoft.com/office/powerpoint/2012/main"/>
+    </p:ext>
+  </p:extLst>
 </p:presentation>
 </file>
 
@@ -193,7 +197,7 @@
           <a:p>
             <a:fld id="{D376FD3C-033A-43C6-9494-8198EB2CEFF4}" type="datetimeFigureOut">
               <a:rPr lang="fr-CH" smtClean="0"/>
-              <a:t>03.03.2018</a:t>
+              <a:t>06.03.2018</a:t>
             </a:fld>
             <a:endParaRPr lang="fr-CH"/>
           </a:p>
@@ -610,7 +614,7 @@
           <a:p>
             <a:fld id="{D357FEA1-2930-4012-B0BA-BBD3DD8A8053}" type="datetimeFigureOut">
               <a:rPr lang="fr-CH" smtClean="0"/>
-              <a:t>03.03.2018</a:t>
+              <a:t>06.03.2018</a:t>
             </a:fld>
             <a:endParaRPr lang="fr-CH"/>
           </a:p>
@@ -810,7 +814,7 @@
           <a:p>
             <a:fld id="{D357FEA1-2930-4012-B0BA-BBD3DD8A8053}" type="datetimeFigureOut">
               <a:rPr lang="fr-CH" smtClean="0"/>
-              <a:t>03.03.2018</a:t>
+              <a:t>06.03.2018</a:t>
             </a:fld>
             <a:endParaRPr lang="fr-CH"/>
           </a:p>
@@ -1020,7 +1024,7 @@
           <a:p>
             <a:fld id="{D357FEA1-2930-4012-B0BA-BBD3DD8A8053}" type="datetimeFigureOut">
               <a:rPr lang="fr-CH" smtClean="0"/>
-              <a:t>03.03.2018</a:t>
+              <a:t>06.03.2018</a:t>
             </a:fld>
             <a:endParaRPr lang="fr-CH"/>
           </a:p>
@@ -1220,7 +1224,7 @@
           <a:p>
             <a:fld id="{D357FEA1-2930-4012-B0BA-BBD3DD8A8053}" type="datetimeFigureOut">
               <a:rPr lang="fr-CH" smtClean="0"/>
-              <a:t>03.03.2018</a:t>
+              <a:t>06.03.2018</a:t>
             </a:fld>
             <a:endParaRPr lang="fr-CH"/>
           </a:p>
@@ -1496,7 +1500,7 @@
           <a:p>
             <a:fld id="{D357FEA1-2930-4012-B0BA-BBD3DD8A8053}" type="datetimeFigureOut">
               <a:rPr lang="fr-CH" smtClean="0"/>
-              <a:t>03.03.2018</a:t>
+              <a:t>06.03.2018</a:t>
             </a:fld>
             <a:endParaRPr lang="fr-CH"/>
           </a:p>
@@ -1764,7 +1768,7 @@
           <a:p>
             <a:fld id="{D357FEA1-2930-4012-B0BA-BBD3DD8A8053}" type="datetimeFigureOut">
               <a:rPr lang="fr-CH" smtClean="0"/>
-              <a:t>03.03.2018</a:t>
+              <a:t>06.03.2018</a:t>
             </a:fld>
             <a:endParaRPr lang="fr-CH"/>
           </a:p>
@@ -2179,7 +2183,7 @@
           <a:p>
             <a:fld id="{D357FEA1-2930-4012-B0BA-BBD3DD8A8053}" type="datetimeFigureOut">
               <a:rPr lang="fr-CH" smtClean="0"/>
-              <a:t>03.03.2018</a:t>
+              <a:t>06.03.2018</a:t>
             </a:fld>
             <a:endParaRPr lang="fr-CH"/>
           </a:p>
@@ -2321,7 +2325,7 @@
           <a:p>
             <a:fld id="{D357FEA1-2930-4012-B0BA-BBD3DD8A8053}" type="datetimeFigureOut">
               <a:rPr lang="fr-CH" smtClean="0"/>
-              <a:t>03.03.2018</a:t>
+              <a:t>06.03.2018</a:t>
             </a:fld>
             <a:endParaRPr lang="fr-CH"/>
           </a:p>
@@ -2434,7 +2438,7 @@
           <a:p>
             <a:fld id="{D357FEA1-2930-4012-B0BA-BBD3DD8A8053}" type="datetimeFigureOut">
               <a:rPr lang="fr-CH" smtClean="0"/>
-              <a:t>03.03.2018</a:t>
+              <a:t>06.03.2018</a:t>
             </a:fld>
             <a:endParaRPr lang="fr-CH"/>
           </a:p>
@@ -2747,7 +2751,7 @@
           <a:p>
             <a:fld id="{D357FEA1-2930-4012-B0BA-BBD3DD8A8053}" type="datetimeFigureOut">
               <a:rPr lang="fr-CH" smtClean="0"/>
-              <a:t>03.03.2018</a:t>
+              <a:t>06.03.2018</a:t>
             </a:fld>
             <a:endParaRPr lang="fr-CH"/>
           </a:p>
@@ -3036,7 +3040,7 @@
           <a:p>
             <a:fld id="{D357FEA1-2930-4012-B0BA-BBD3DD8A8053}" type="datetimeFigureOut">
               <a:rPr lang="fr-CH" smtClean="0"/>
-              <a:t>03.03.2018</a:t>
+              <a:t>06.03.2018</a:t>
             </a:fld>
             <a:endParaRPr lang="fr-CH"/>
           </a:p>
@@ -3279,7 +3283,7 @@
           <a:p>
             <a:fld id="{D357FEA1-2930-4012-B0BA-BBD3DD8A8053}" type="datetimeFigureOut">
               <a:rPr lang="fr-CH" smtClean="0"/>
-              <a:t>03.03.2018</a:t>
+              <a:t>06.03.2018</a:t>
             </a:fld>
             <a:endParaRPr lang="fr-CH"/>
           </a:p>
@@ -4074,64 +4078,6 @@
       </p:sp>
       <p:sp>
         <p:nvSpPr>
-          <p:cNvPr id="16" name="Rectangle 15">
-            <a:extLst>
-              <a:ext uri="{FF2B5EF4-FFF2-40B4-BE49-F238E27FC236}">
-                <a16:creationId xmlns:a16="http://schemas.microsoft.com/office/drawing/2014/main" id="{D81E555B-4F56-4DF3-BE33-01E7C5B6E0B9}"/>
-              </a:ext>
-            </a:extLst>
-          </p:cNvPr>
-          <p:cNvSpPr/>
-          <p:nvPr/>
-        </p:nvSpPr>
-        <p:spPr>
-          <a:xfrm>
-            <a:off x="876300" y="1367552"/>
-            <a:ext cx="7719060" cy="4983956"/>
-          </a:xfrm>
-          <a:prstGeom prst="rect">
-            <a:avLst/>
-          </a:prstGeom>
-          <a:solidFill>
-            <a:schemeClr val="bg1"/>
-          </a:solidFill>
-          <a:ln w="38100">
-            <a:solidFill>
-              <a:schemeClr val="tx1"/>
-            </a:solidFill>
-          </a:ln>
-        </p:spPr>
-        <p:style>
-          <a:lnRef idx="2">
-            <a:schemeClr val="accent1">
-              <a:shade val="50000"/>
-            </a:schemeClr>
-          </a:lnRef>
-          <a:fillRef idx="1">
-            <a:schemeClr val="accent1"/>
-          </a:fillRef>
-          <a:effectRef idx="0">
-            <a:schemeClr val="accent1"/>
-          </a:effectRef>
-          <a:fontRef idx="minor">
-            <a:schemeClr val="lt1"/>
-          </a:fontRef>
-        </p:style>
-        <p:txBody>
-          <a:bodyPr rtlCol="0" anchor="ctr"/>
-          <a:lstStyle/>
-          <a:p>
-            <a:pPr algn="ctr"/>
-            <a:endParaRPr lang="fr-CH" dirty="0">
-              <a:solidFill>
-                <a:schemeClr val="tx1"/>
-              </a:solidFill>
-            </a:endParaRPr>
-          </a:p>
-        </p:txBody>
-      </p:sp>
-      <p:sp>
-        <p:nvSpPr>
           <p:cNvPr id="17" name="Rectangle 16">
             <a:extLst>
               <a:ext uri="{FF2B5EF4-FFF2-40B4-BE49-F238E27FC236}">
@@ -4368,377 +4314,6 @@
               </a:rPr>
               <a:t>Filtres/Conditions</a:t>
             </a:r>
-          </a:p>
-        </p:txBody>
-      </p:sp>
-      <p:sp>
-        <p:nvSpPr>
-          <p:cNvPr id="24" name="Rectangle 23">
-            <a:extLst>
-              <a:ext uri="{FF2B5EF4-FFF2-40B4-BE49-F238E27FC236}">
-                <a16:creationId xmlns:a16="http://schemas.microsoft.com/office/drawing/2014/main" id="{F220AAAC-C9F0-4C5D-B8BE-54462378455D}"/>
-              </a:ext>
-            </a:extLst>
-          </p:cNvPr>
-          <p:cNvSpPr/>
-          <p:nvPr/>
-        </p:nvSpPr>
-        <p:spPr>
-          <a:xfrm>
-            <a:off x="3307080" y="5695712"/>
-            <a:ext cx="2857500" cy="644128"/>
-          </a:xfrm>
-          <a:prstGeom prst="rect">
-            <a:avLst/>
-          </a:prstGeom>
-          <a:solidFill>
-            <a:schemeClr val="bg1"/>
-          </a:solidFill>
-          <a:ln w="38100">
-            <a:solidFill>
-              <a:schemeClr val="tx1"/>
-            </a:solidFill>
-          </a:ln>
-        </p:spPr>
-        <p:style>
-          <a:lnRef idx="2">
-            <a:schemeClr val="accent1">
-              <a:shade val="50000"/>
-            </a:schemeClr>
-          </a:lnRef>
-          <a:fillRef idx="1">
-            <a:schemeClr val="accent1"/>
-          </a:fillRef>
-          <a:effectRef idx="0">
-            <a:schemeClr val="accent1"/>
-          </a:effectRef>
-          <a:fontRef idx="minor">
-            <a:schemeClr val="lt1"/>
-          </a:fontRef>
-        </p:style>
-        <p:txBody>
-          <a:bodyPr rtlCol="0" anchor="ctr"/>
-          <a:lstStyle/>
-          <a:p>
-            <a:pPr algn="ctr"/>
-            <a:r>
-              <a:rPr lang="fr-CH" dirty="0">
-                <a:solidFill>
-                  <a:schemeClr val="tx1"/>
-                </a:solidFill>
-              </a:rPr>
-              <a:t>Étage1</a:t>
-            </a:r>
-          </a:p>
-        </p:txBody>
-      </p:sp>
-      <p:sp>
-        <p:nvSpPr>
-          <p:cNvPr id="25" name="Rectangle 24">
-            <a:extLst>
-              <a:ext uri="{FF2B5EF4-FFF2-40B4-BE49-F238E27FC236}">
-                <a16:creationId xmlns:a16="http://schemas.microsoft.com/office/drawing/2014/main" id="{E9177244-A30F-4488-AAB2-F872889CFE2F}"/>
-              </a:ext>
-            </a:extLst>
-          </p:cNvPr>
-          <p:cNvSpPr/>
-          <p:nvPr/>
-        </p:nvSpPr>
-        <p:spPr>
-          <a:xfrm>
-            <a:off x="3307080" y="5048012"/>
-            <a:ext cx="2857500" cy="644128"/>
-          </a:xfrm>
-          <a:prstGeom prst="rect">
-            <a:avLst/>
-          </a:prstGeom>
-          <a:solidFill>
-            <a:schemeClr val="bg1"/>
-          </a:solidFill>
-          <a:ln w="38100">
-            <a:solidFill>
-              <a:schemeClr val="tx1"/>
-            </a:solidFill>
-          </a:ln>
-        </p:spPr>
-        <p:style>
-          <a:lnRef idx="2">
-            <a:schemeClr val="accent1">
-              <a:shade val="50000"/>
-            </a:schemeClr>
-          </a:lnRef>
-          <a:fillRef idx="1">
-            <a:schemeClr val="accent1"/>
-          </a:fillRef>
-          <a:effectRef idx="0">
-            <a:schemeClr val="accent1"/>
-          </a:effectRef>
-          <a:fontRef idx="minor">
-            <a:schemeClr val="lt1"/>
-          </a:fontRef>
-        </p:style>
-        <p:txBody>
-          <a:bodyPr rtlCol="0" anchor="ctr"/>
-          <a:lstStyle/>
-          <a:p>
-            <a:pPr algn="ctr"/>
-            <a:r>
-              <a:rPr lang="fr-CH" dirty="0">
-                <a:solidFill>
-                  <a:schemeClr val="tx1"/>
-                </a:solidFill>
-              </a:rPr>
-              <a:t>Étage2</a:t>
-            </a:r>
-          </a:p>
-        </p:txBody>
-      </p:sp>
-      <p:sp>
-        <p:nvSpPr>
-          <p:cNvPr id="27" name="Rectangle 26">
-            <a:extLst>
-              <a:ext uri="{FF2B5EF4-FFF2-40B4-BE49-F238E27FC236}">
-                <a16:creationId xmlns:a16="http://schemas.microsoft.com/office/drawing/2014/main" id="{1526D227-FF9F-48FC-AFD0-62402EA33B70}"/>
-              </a:ext>
-            </a:extLst>
-          </p:cNvPr>
-          <p:cNvSpPr/>
-          <p:nvPr/>
-        </p:nvSpPr>
-        <p:spPr>
-          <a:xfrm>
-            <a:off x="3307080" y="4407932"/>
-            <a:ext cx="2857500" cy="644128"/>
-          </a:xfrm>
-          <a:prstGeom prst="rect">
-            <a:avLst/>
-          </a:prstGeom>
-          <a:solidFill>
-            <a:schemeClr val="bg1"/>
-          </a:solidFill>
-          <a:ln w="38100">
-            <a:solidFill>
-              <a:schemeClr val="tx1"/>
-            </a:solidFill>
-          </a:ln>
-        </p:spPr>
-        <p:style>
-          <a:lnRef idx="2">
-            <a:schemeClr val="accent1">
-              <a:shade val="50000"/>
-            </a:schemeClr>
-          </a:lnRef>
-          <a:fillRef idx="1">
-            <a:schemeClr val="accent1"/>
-          </a:fillRef>
-          <a:effectRef idx="0">
-            <a:schemeClr val="accent1"/>
-          </a:effectRef>
-          <a:fontRef idx="minor">
-            <a:schemeClr val="lt1"/>
-          </a:fontRef>
-        </p:style>
-        <p:txBody>
-          <a:bodyPr rtlCol="0" anchor="ctr"/>
-          <a:lstStyle/>
-          <a:p>
-            <a:pPr algn="ctr"/>
-            <a:r>
-              <a:rPr lang="fr-CH" dirty="0">
-                <a:solidFill>
-                  <a:schemeClr val="tx1"/>
-                </a:solidFill>
-              </a:rPr>
-              <a:t>…</a:t>
-            </a:r>
-          </a:p>
-        </p:txBody>
-      </p:sp>
-      <p:sp>
-        <p:nvSpPr>
-          <p:cNvPr id="28" name="Rectangle 27">
-            <a:extLst>
-              <a:ext uri="{FF2B5EF4-FFF2-40B4-BE49-F238E27FC236}">
-                <a16:creationId xmlns:a16="http://schemas.microsoft.com/office/drawing/2014/main" id="{5E175FC6-BD9D-4568-BC62-66CED55B09F6}"/>
-              </a:ext>
-            </a:extLst>
-          </p:cNvPr>
-          <p:cNvSpPr/>
-          <p:nvPr/>
-        </p:nvSpPr>
-        <p:spPr>
-          <a:xfrm>
-            <a:off x="3307080" y="3815120"/>
-            <a:ext cx="2857500" cy="644128"/>
-          </a:xfrm>
-          <a:prstGeom prst="rect">
-            <a:avLst/>
-          </a:prstGeom>
-          <a:solidFill>
-            <a:schemeClr val="bg1"/>
-          </a:solidFill>
-          <a:ln w="38100">
-            <a:solidFill>
-              <a:schemeClr val="tx1"/>
-            </a:solidFill>
-          </a:ln>
-        </p:spPr>
-        <p:style>
-          <a:lnRef idx="2">
-            <a:schemeClr val="accent1">
-              <a:shade val="50000"/>
-            </a:schemeClr>
-          </a:lnRef>
-          <a:fillRef idx="1">
-            <a:schemeClr val="accent1"/>
-          </a:fillRef>
-          <a:effectRef idx="0">
-            <a:schemeClr val="accent1"/>
-          </a:effectRef>
-          <a:fontRef idx="minor">
-            <a:schemeClr val="lt1"/>
-          </a:fontRef>
-        </p:style>
-        <p:txBody>
-          <a:bodyPr rtlCol="0" anchor="ctr"/>
-          <a:lstStyle/>
-          <a:p>
-            <a:pPr algn="ctr"/>
-            <a:r>
-              <a:rPr lang="fr-CH" dirty="0">
-                <a:solidFill>
-                  <a:schemeClr val="tx1"/>
-                </a:solidFill>
-              </a:rPr>
-              <a:t>…</a:t>
-            </a:r>
-          </a:p>
-        </p:txBody>
-      </p:sp>
-      <p:sp>
-        <p:nvSpPr>
-          <p:cNvPr id="29" name="Rectangle 28">
-            <a:extLst>
-              <a:ext uri="{FF2B5EF4-FFF2-40B4-BE49-F238E27FC236}">
-                <a16:creationId xmlns:a16="http://schemas.microsoft.com/office/drawing/2014/main" id="{BFCC6E36-F2F6-4DF5-8ADF-10B5F75DEBCF}"/>
-              </a:ext>
-            </a:extLst>
-          </p:cNvPr>
-          <p:cNvSpPr/>
-          <p:nvPr/>
-        </p:nvSpPr>
-        <p:spPr>
-          <a:xfrm>
-            <a:off x="3307080" y="3169444"/>
-            <a:ext cx="2857500" cy="644128"/>
-          </a:xfrm>
-          <a:prstGeom prst="rect">
-            <a:avLst/>
-          </a:prstGeom>
-          <a:solidFill>
-            <a:schemeClr val="bg1"/>
-          </a:solidFill>
-          <a:ln w="38100">
-            <a:solidFill>
-              <a:schemeClr val="tx1"/>
-            </a:solidFill>
-          </a:ln>
-        </p:spPr>
-        <p:style>
-          <a:lnRef idx="2">
-            <a:schemeClr val="accent1">
-              <a:shade val="50000"/>
-            </a:schemeClr>
-          </a:lnRef>
-          <a:fillRef idx="1">
-            <a:schemeClr val="accent1"/>
-          </a:fillRef>
-          <a:effectRef idx="0">
-            <a:schemeClr val="accent1"/>
-          </a:effectRef>
-          <a:fontRef idx="minor">
-            <a:schemeClr val="lt1"/>
-          </a:fontRef>
-        </p:style>
-        <p:txBody>
-          <a:bodyPr rtlCol="0" anchor="ctr"/>
-          <a:lstStyle/>
-          <a:p>
-            <a:pPr algn="ctr"/>
-            <a:r>
-              <a:rPr lang="fr-CH" dirty="0">
-                <a:solidFill>
-                  <a:schemeClr val="tx1"/>
-                </a:solidFill>
-              </a:rPr>
-              <a:t>…</a:t>
-            </a:r>
-          </a:p>
-        </p:txBody>
-      </p:sp>
-      <p:sp>
-        <p:nvSpPr>
-          <p:cNvPr id="30" name="Rectangle 29">
-            <a:extLst>
-              <a:ext uri="{FF2B5EF4-FFF2-40B4-BE49-F238E27FC236}">
-                <a16:creationId xmlns:a16="http://schemas.microsoft.com/office/drawing/2014/main" id="{4491FC35-4247-4BBF-9F41-369A5BE007B4}"/>
-              </a:ext>
-            </a:extLst>
-          </p:cNvPr>
-          <p:cNvSpPr/>
-          <p:nvPr/>
-        </p:nvSpPr>
-        <p:spPr>
-          <a:xfrm>
-            <a:off x="3307080" y="2521744"/>
-            <a:ext cx="2857500" cy="644128"/>
-          </a:xfrm>
-          <a:prstGeom prst="rect">
-            <a:avLst/>
-          </a:prstGeom>
-          <a:solidFill>
-            <a:schemeClr val="bg1"/>
-          </a:solidFill>
-          <a:ln w="38100">
-            <a:solidFill>
-              <a:schemeClr val="tx1"/>
-            </a:solidFill>
-          </a:ln>
-        </p:spPr>
-        <p:style>
-          <a:lnRef idx="2">
-            <a:schemeClr val="accent1">
-              <a:shade val="50000"/>
-            </a:schemeClr>
-          </a:lnRef>
-          <a:fillRef idx="1">
-            <a:schemeClr val="accent1"/>
-          </a:fillRef>
-          <a:effectRef idx="0">
-            <a:schemeClr val="accent1"/>
-          </a:effectRef>
-          <a:fontRef idx="minor">
-            <a:schemeClr val="lt1"/>
-          </a:fontRef>
-        </p:style>
-        <p:txBody>
-          <a:bodyPr rtlCol="0" anchor="ctr"/>
-          <a:lstStyle/>
-          <a:p>
-            <a:pPr algn="ctr"/>
-            <a:r>
-              <a:rPr lang="fr-CH">
-                <a:solidFill>
-                  <a:schemeClr val="tx1"/>
-                </a:solidFill>
-              </a:rPr>
-              <a:t>ÉtageN</a:t>
-            </a:r>
-            <a:endParaRPr lang="fr-CH" dirty="0">
-              <a:solidFill>
-                <a:schemeClr val="tx1"/>
-              </a:solidFill>
-            </a:endParaRPr>
           </a:p>
         </p:txBody>
       </p:sp>
@@ -5090,42 +4665,12 @@
           </p:txBody>
         </p:sp>
       </p:grpSp>
-    </p:spTree>
-    <p:extLst>
-      <p:ext uri="{BB962C8B-B14F-4D97-AF65-F5344CB8AC3E}">
-        <p14:creationId xmlns:p14="http://schemas.microsoft.com/office/powerpoint/2010/main" val="1617928980"/>
-      </p:ext>
-    </p:extLst>
-  </p:cSld>
-  <p:clrMapOvr>
-    <a:masterClrMapping/>
-  </p:clrMapOvr>
-</p:sld>
-</file>
-
-<file path=ppt/slides/slide2.xml><?xml version="1.0" encoding="utf-8"?>
-<p:sld xmlns:a="http://schemas.openxmlformats.org/drawingml/2006/main" xmlns:r="http://schemas.openxmlformats.org/officeDocument/2006/relationships" xmlns:p="http://schemas.openxmlformats.org/presentationml/2006/main">
-  <p:cSld>
-    <p:spTree>
-      <p:nvGrpSpPr>
-        <p:cNvPr id="1" name=""/>
-        <p:cNvGrpSpPr/>
-        <p:nvPr/>
-      </p:nvGrpSpPr>
-      <p:grpSpPr>
-        <a:xfrm>
-          <a:off x="0" y="0"/>
-          <a:ext cx="0" cy="0"/>
-          <a:chOff x="0" y="0"/>
-          <a:chExt cx="0" cy="0"/>
-        </a:xfrm>
-      </p:grpSpPr>
       <p:grpSp>
         <p:nvGrpSpPr>
-          <p:cNvPr id="14" name="Groupe 13">
-            <a:extLst>
-              <a:ext uri="{FF2B5EF4-FFF2-40B4-BE49-F238E27FC236}">
-                <a16:creationId xmlns:a16="http://schemas.microsoft.com/office/drawing/2014/main" id="{865F36D7-33A2-45CC-856A-7D1D1F9B1218}"/>
+          <p:cNvPr id="2" name="Groupe 1">
+            <a:extLst>
+              <a:ext uri="{FF2B5EF4-FFF2-40B4-BE49-F238E27FC236}">
+                <a16:creationId xmlns:a16="http://schemas.microsoft.com/office/drawing/2014/main" id="{ED6CEE56-F5E6-4C48-8196-30A51AE33B81}"/>
               </a:ext>
             </a:extLst>
           </p:cNvPr>
@@ -5134,18 +4679,18 @@
         </p:nvGrpSpPr>
         <p:grpSpPr>
           <a:xfrm>
-            <a:off x="876300" y="594360"/>
-            <a:ext cx="10690860" cy="5745480"/>
-            <a:chOff x="876300" y="594360"/>
-            <a:chExt cx="10690860" cy="5745480"/>
+            <a:off x="2286000" y="1355884"/>
+            <a:ext cx="6309360" cy="4995148"/>
+            <a:chOff x="876300" y="1355884"/>
+            <a:chExt cx="7719060" cy="4995148"/>
           </a:xfrm>
         </p:grpSpPr>
         <p:sp>
           <p:nvSpPr>
-            <p:cNvPr id="5" name="Rectangle 4">
+            <p:cNvPr id="16" name="Rectangle 15">
               <a:extLst>
                 <a:ext uri="{FF2B5EF4-FFF2-40B4-BE49-F238E27FC236}">
-                  <a16:creationId xmlns:a16="http://schemas.microsoft.com/office/drawing/2014/main" id="{590B0BBB-D0F4-4B0B-9146-6E66ACD19DC9}"/>
+                  <a16:creationId xmlns:a16="http://schemas.microsoft.com/office/drawing/2014/main" id="{D81E555B-4F56-4DF3-BE33-01E7C5B6E0B9}"/>
                 </a:ext>
               </a:extLst>
             </p:cNvPr>
@@ -5154,917 +4699,8 @@
           </p:nvSpPr>
           <p:spPr>
             <a:xfrm>
-              <a:off x="876300" y="594360"/>
-              <a:ext cx="10690860" cy="5745480"/>
-            </a:xfrm>
-            <a:prstGeom prst="rect">
-              <a:avLst/>
-            </a:prstGeom>
-            <a:solidFill>
-              <a:schemeClr val="bg1"/>
-            </a:solidFill>
-            <a:ln w="38100">
-              <a:solidFill>
-                <a:schemeClr val="tx1"/>
-              </a:solidFill>
-            </a:ln>
-          </p:spPr>
-          <p:style>
-            <a:lnRef idx="2">
-              <a:schemeClr val="accent1">
-                <a:shade val="50000"/>
-              </a:schemeClr>
-            </a:lnRef>
-            <a:fillRef idx="1">
-              <a:schemeClr val="accent1"/>
-            </a:fillRef>
-            <a:effectRef idx="0">
-              <a:schemeClr val="accent1"/>
-            </a:effectRef>
-            <a:fontRef idx="minor">
-              <a:schemeClr val="lt1"/>
-            </a:fontRef>
-          </p:style>
-          <p:txBody>
-            <a:bodyPr rtlCol="0" anchor="ctr"/>
-            <a:lstStyle/>
-            <a:p>
-              <a:pPr algn="ctr"/>
-              <a:endParaRPr lang="fr-CH" dirty="0">
-                <a:solidFill>
-                  <a:schemeClr val="tx1"/>
-                </a:solidFill>
-              </a:endParaRPr>
-            </a:p>
-          </p:txBody>
-        </p:sp>
-        <p:grpSp>
-          <p:nvGrpSpPr>
-            <p:cNvPr id="12" name="Groupe 11">
-              <a:extLst>
-                <a:ext uri="{FF2B5EF4-FFF2-40B4-BE49-F238E27FC236}">
-                  <a16:creationId xmlns:a16="http://schemas.microsoft.com/office/drawing/2014/main" id="{374A4E02-987A-42E8-A88A-5EAAE9DDECCD}"/>
-                </a:ext>
-              </a:extLst>
-            </p:cNvPr>
-            <p:cNvGrpSpPr/>
-            <p:nvPr/>
-          </p:nvGrpSpPr>
-          <p:grpSpPr>
-            <a:xfrm>
-              <a:off x="10401300" y="594360"/>
-              <a:ext cx="1165860" cy="381000"/>
-              <a:chOff x="10401300" y="594360"/>
-              <a:chExt cx="1165860" cy="381000"/>
-            </a:xfrm>
-          </p:grpSpPr>
-          <p:sp>
-            <p:nvSpPr>
-              <p:cNvPr id="9" name="Rectangle 8">
-                <a:extLst>
-                  <a:ext uri="{FF2B5EF4-FFF2-40B4-BE49-F238E27FC236}">
-                    <a16:creationId xmlns:a16="http://schemas.microsoft.com/office/drawing/2014/main" id="{3D65F1BE-ED3B-4494-8CD5-8147C63CCA16}"/>
-                  </a:ext>
-                </a:extLst>
-              </p:cNvPr>
-              <p:cNvSpPr/>
-              <p:nvPr/>
-            </p:nvSpPr>
-            <p:spPr>
-              <a:xfrm>
-                <a:off x="11178540" y="594360"/>
-                <a:ext cx="388620" cy="381000"/>
-              </a:xfrm>
-              <a:prstGeom prst="rect">
-                <a:avLst/>
-              </a:prstGeom>
-              <a:solidFill>
-                <a:schemeClr val="bg1"/>
-              </a:solidFill>
-              <a:ln w="38100">
-                <a:solidFill>
-                  <a:schemeClr val="tx1"/>
-                </a:solidFill>
-              </a:ln>
-            </p:spPr>
-            <p:style>
-              <a:lnRef idx="2">
-                <a:schemeClr val="accent1">
-                  <a:shade val="50000"/>
-                </a:schemeClr>
-              </a:lnRef>
-              <a:fillRef idx="1">
-                <a:schemeClr val="accent1"/>
-              </a:fillRef>
-              <a:effectRef idx="0">
-                <a:schemeClr val="accent1"/>
-              </a:effectRef>
-              <a:fontRef idx="minor">
-                <a:schemeClr val="lt1"/>
-              </a:fontRef>
-            </p:style>
-            <p:txBody>
-              <a:bodyPr rtlCol="0" anchor="ctr"/>
-              <a:lstStyle/>
-              <a:p>
-                <a:pPr algn="ctr"/>
-                <a:r>
-                  <a:rPr lang="fr-CH" dirty="0">
-                    <a:solidFill>
-                      <a:schemeClr val="tx1"/>
-                    </a:solidFill>
-                  </a:rPr>
-                  <a:t>x</a:t>
-                </a:r>
-              </a:p>
-            </p:txBody>
-          </p:sp>
-          <p:sp>
-            <p:nvSpPr>
-              <p:cNvPr id="10" name="Rectangle 9">
-                <a:extLst>
-                  <a:ext uri="{FF2B5EF4-FFF2-40B4-BE49-F238E27FC236}">
-                    <a16:creationId xmlns:a16="http://schemas.microsoft.com/office/drawing/2014/main" id="{D56CFD0D-4A8E-4A3B-8E08-2C810487B944}"/>
-                  </a:ext>
-                </a:extLst>
-              </p:cNvPr>
-              <p:cNvSpPr/>
-              <p:nvPr/>
-            </p:nvSpPr>
-            <p:spPr>
-              <a:xfrm>
-                <a:off x="10789920" y="594360"/>
-                <a:ext cx="388620" cy="381000"/>
-              </a:xfrm>
-              <a:prstGeom prst="rect">
-                <a:avLst/>
-              </a:prstGeom>
-              <a:solidFill>
-                <a:schemeClr val="bg1"/>
-              </a:solidFill>
-              <a:ln w="38100">
-                <a:solidFill>
-                  <a:schemeClr val="tx1"/>
-                </a:solidFill>
-              </a:ln>
-            </p:spPr>
-            <p:style>
-              <a:lnRef idx="2">
-                <a:schemeClr val="accent1">
-                  <a:shade val="50000"/>
-                </a:schemeClr>
-              </a:lnRef>
-              <a:fillRef idx="1">
-                <a:schemeClr val="accent1"/>
-              </a:fillRef>
-              <a:effectRef idx="0">
-                <a:schemeClr val="accent1"/>
-              </a:effectRef>
-              <a:fontRef idx="minor">
-                <a:schemeClr val="lt1"/>
-              </a:fontRef>
-            </p:style>
-            <p:txBody>
-              <a:bodyPr rtlCol="0" anchor="ctr"/>
-              <a:lstStyle/>
-              <a:p>
-                <a:pPr algn="ctr"/>
-                <a:r>
-                  <a:rPr lang="fr-CH" b="1" dirty="0">
-                    <a:solidFill>
-                      <a:schemeClr val="tx1"/>
-                    </a:solidFill>
-                  </a:rPr>
-                  <a:t>□</a:t>
-                </a:r>
-              </a:p>
-            </p:txBody>
-          </p:sp>
-          <p:sp>
-            <p:nvSpPr>
-              <p:cNvPr id="11" name="Rectangle 10">
-                <a:extLst>
-                  <a:ext uri="{FF2B5EF4-FFF2-40B4-BE49-F238E27FC236}">
-                    <a16:creationId xmlns:a16="http://schemas.microsoft.com/office/drawing/2014/main" id="{A8985AF4-305D-4D73-957E-500B3241C2A2}"/>
-                  </a:ext>
-                </a:extLst>
-              </p:cNvPr>
-              <p:cNvSpPr/>
-              <p:nvPr/>
-            </p:nvSpPr>
-            <p:spPr>
-              <a:xfrm>
-                <a:off x="10401300" y="594360"/>
-                <a:ext cx="388620" cy="381000"/>
-              </a:xfrm>
-              <a:prstGeom prst="rect">
-                <a:avLst/>
-              </a:prstGeom>
-              <a:solidFill>
-                <a:schemeClr val="bg1"/>
-              </a:solidFill>
-              <a:ln w="38100">
-                <a:solidFill>
-                  <a:schemeClr val="tx1"/>
-                </a:solidFill>
-              </a:ln>
-            </p:spPr>
-            <p:style>
-              <a:lnRef idx="2">
-                <a:schemeClr val="accent1">
-                  <a:shade val="50000"/>
-                </a:schemeClr>
-              </a:lnRef>
-              <a:fillRef idx="1">
-                <a:schemeClr val="accent1"/>
-              </a:fillRef>
-              <a:effectRef idx="0">
-                <a:schemeClr val="accent1"/>
-              </a:effectRef>
-              <a:fontRef idx="minor">
-                <a:schemeClr val="lt1"/>
-              </a:fontRef>
-            </p:style>
-            <p:txBody>
-              <a:bodyPr rtlCol="0" anchor="ctr"/>
-              <a:lstStyle/>
-              <a:p>
-                <a:pPr algn="ctr"/>
-                <a:r>
-                  <a:rPr lang="fr-CH" dirty="0">
-                    <a:solidFill>
-                      <a:schemeClr val="tx1"/>
-                    </a:solidFill>
-                  </a:rPr>
-                  <a:t>-</a:t>
-                </a:r>
-              </a:p>
-            </p:txBody>
-          </p:sp>
-        </p:grpSp>
-      </p:grpSp>
-      <p:sp>
-        <p:nvSpPr>
-          <p:cNvPr id="13" name="Rectangle 12">
-            <a:extLst>
-              <a:ext uri="{FF2B5EF4-FFF2-40B4-BE49-F238E27FC236}">
-                <a16:creationId xmlns:a16="http://schemas.microsoft.com/office/drawing/2014/main" id="{6B6DF9ED-ECFD-4CCB-A306-1D31FE808A47}"/>
-              </a:ext>
-            </a:extLst>
-          </p:cNvPr>
-          <p:cNvSpPr/>
-          <p:nvPr/>
-        </p:nvSpPr>
-        <p:spPr>
-          <a:xfrm>
-            <a:off x="876300" y="975360"/>
-            <a:ext cx="10690860" cy="5364480"/>
-          </a:xfrm>
-          <a:prstGeom prst="rect">
-            <a:avLst/>
-          </a:prstGeom>
-          <a:solidFill>
-            <a:schemeClr val="bg1"/>
-          </a:solidFill>
-          <a:ln w="38100">
-            <a:solidFill>
-              <a:schemeClr val="tx1"/>
-            </a:solidFill>
-          </a:ln>
-        </p:spPr>
-        <p:style>
-          <a:lnRef idx="2">
-            <a:schemeClr val="accent1">
-              <a:shade val="50000"/>
-            </a:schemeClr>
-          </a:lnRef>
-          <a:fillRef idx="1">
-            <a:schemeClr val="accent1"/>
-          </a:fillRef>
-          <a:effectRef idx="0">
-            <a:schemeClr val="accent1"/>
-          </a:effectRef>
-          <a:fontRef idx="minor">
-            <a:schemeClr val="lt1"/>
-          </a:fontRef>
-        </p:style>
-        <p:txBody>
-          <a:bodyPr rtlCol="0" anchor="ctr"/>
-          <a:lstStyle/>
-          <a:p>
-            <a:pPr algn="ctr"/>
-            <a:endParaRPr lang="fr-CH" dirty="0">
-              <a:solidFill>
-                <a:schemeClr val="tx1"/>
-              </a:solidFill>
-            </a:endParaRPr>
-          </a:p>
-        </p:txBody>
-      </p:sp>
-      <p:sp>
-        <p:nvSpPr>
-          <p:cNvPr id="15" name="ZoneTexte 14">
-            <a:extLst>
-              <a:ext uri="{FF2B5EF4-FFF2-40B4-BE49-F238E27FC236}">
-                <a16:creationId xmlns:a16="http://schemas.microsoft.com/office/drawing/2014/main" id="{EFF18D46-A1FE-41DA-B740-2151864ECA4B}"/>
-              </a:ext>
-            </a:extLst>
-          </p:cNvPr>
-          <p:cNvSpPr txBox="1"/>
-          <p:nvPr/>
-        </p:nvSpPr>
-        <p:spPr>
-          <a:xfrm>
-            <a:off x="1013460" y="606028"/>
-            <a:ext cx="1783080" cy="369332"/>
-          </a:xfrm>
-          <a:prstGeom prst="rect">
-            <a:avLst/>
-          </a:prstGeom>
-          <a:noFill/>
-        </p:spPr>
-        <p:txBody>
-          <a:bodyPr wrap="square" rtlCol="0">
-            <a:spAutoFit/>
-          </a:bodyPr>
-          <a:lstStyle/>
-          <a:p>
-            <a:r>
-              <a:rPr lang="fr-CH" dirty="0"/>
-              <a:t>Titre programme</a:t>
-            </a:r>
-          </a:p>
-        </p:txBody>
-      </p:sp>
-      <p:sp>
-        <p:nvSpPr>
-          <p:cNvPr id="16" name="Rectangle 15">
-            <a:extLst>
-              <a:ext uri="{FF2B5EF4-FFF2-40B4-BE49-F238E27FC236}">
-                <a16:creationId xmlns:a16="http://schemas.microsoft.com/office/drawing/2014/main" id="{D81E555B-4F56-4DF3-BE33-01E7C5B6E0B9}"/>
-              </a:ext>
-            </a:extLst>
-          </p:cNvPr>
-          <p:cNvSpPr/>
-          <p:nvPr/>
-        </p:nvSpPr>
-        <p:spPr>
-          <a:xfrm>
-            <a:off x="876300" y="1357670"/>
-            <a:ext cx="7719060" cy="4983956"/>
-          </a:xfrm>
-          <a:prstGeom prst="rect">
-            <a:avLst/>
-          </a:prstGeom>
-          <a:solidFill>
-            <a:schemeClr val="bg1"/>
-          </a:solidFill>
-          <a:ln w="38100">
-            <a:solidFill>
-              <a:schemeClr val="tx1"/>
-            </a:solidFill>
-          </a:ln>
-        </p:spPr>
-        <p:style>
-          <a:lnRef idx="2">
-            <a:schemeClr val="accent1">
-              <a:shade val="50000"/>
-            </a:schemeClr>
-          </a:lnRef>
-          <a:fillRef idx="1">
-            <a:schemeClr val="accent1"/>
-          </a:fillRef>
-          <a:effectRef idx="0">
-            <a:schemeClr val="accent1"/>
-          </a:effectRef>
-          <a:fontRef idx="minor">
-            <a:schemeClr val="lt1"/>
-          </a:fontRef>
-        </p:style>
-        <p:txBody>
-          <a:bodyPr rtlCol="0" anchor="ctr"/>
-          <a:lstStyle/>
-          <a:p>
-            <a:pPr algn="ctr"/>
-            <a:endParaRPr lang="fr-CH" dirty="0">
-              <a:solidFill>
-                <a:schemeClr val="tx1"/>
-              </a:solidFill>
-            </a:endParaRPr>
-          </a:p>
-        </p:txBody>
-      </p:sp>
-      <p:sp>
-        <p:nvSpPr>
-          <p:cNvPr id="17" name="Rectangle 16">
-            <a:extLst>
-              <a:ext uri="{FF2B5EF4-FFF2-40B4-BE49-F238E27FC236}">
-                <a16:creationId xmlns:a16="http://schemas.microsoft.com/office/drawing/2014/main" id="{8A9515FE-A58F-47A0-909F-9C10BB16FBFC}"/>
-              </a:ext>
-            </a:extLst>
-          </p:cNvPr>
-          <p:cNvSpPr/>
-          <p:nvPr/>
-        </p:nvSpPr>
-        <p:spPr>
-          <a:xfrm>
-            <a:off x="8595360" y="986552"/>
-            <a:ext cx="2971800" cy="5353288"/>
-          </a:xfrm>
-          <a:prstGeom prst="rect">
-            <a:avLst/>
-          </a:prstGeom>
-          <a:solidFill>
-            <a:schemeClr val="bg1"/>
-          </a:solidFill>
-          <a:ln w="38100">
-            <a:solidFill>
-              <a:schemeClr val="tx1"/>
-            </a:solidFill>
-          </a:ln>
-        </p:spPr>
-        <p:style>
-          <a:lnRef idx="2">
-            <a:schemeClr val="accent1">
-              <a:shade val="50000"/>
-            </a:schemeClr>
-          </a:lnRef>
-          <a:fillRef idx="1">
-            <a:schemeClr val="accent1"/>
-          </a:fillRef>
-          <a:effectRef idx="0">
-            <a:schemeClr val="accent1"/>
-          </a:effectRef>
-          <a:fontRef idx="minor">
-            <a:schemeClr val="lt1"/>
-          </a:fontRef>
-        </p:style>
-        <p:txBody>
-          <a:bodyPr rtlCol="0" anchor="ctr"/>
-          <a:lstStyle/>
-          <a:p>
-            <a:pPr algn="ctr"/>
-            <a:endParaRPr lang="fr-CH" dirty="0">
-              <a:solidFill>
-                <a:schemeClr val="tx1"/>
-              </a:solidFill>
-            </a:endParaRPr>
-          </a:p>
-        </p:txBody>
-      </p:sp>
-      <p:sp>
-        <p:nvSpPr>
-          <p:cNvPr id="21" name="Rectangle 20">
-            <a:extLst>
-              <a:ext uri="{FF2B5EF4-FFF2-40B4-BE49-F238E27FC236}">
-                <a16:creationId xmlns:a16="http://schemas.microsoft.com/office/drawing/2014/main" id="{4A8C177F-B1BC-4CC3-89E9-E2EC6C950B4E}"/>
-              </a:ext>
-            </a:extLst>
-          </p:cNvPr>
-          <p:cNvSpPr/>
-          <p:nvPr/>
-        </p:nvSpPr>
-        <p:spPr>
-          <a:xfrm>
-            <a:off x="876300" y="986552"/>
-            <a:ext cx="1409700" cy="381000"/>
-          </a:xfrm>
-          <a:prstGeom prst="rect">
-            <a:avLst/>
-          </a:prstGeom>
-          <a:solidFill>
-            <a:schemeClr val="bg1"/>
-          </a:solidFill>
-          <a:ln w="38100">
-            <a:solidFill>
-              <a:schemeClr val="tx1"/>
-            </a:solidFill>
-          </a:ln>
-        </p:spPr>
-        <p:style>
-          <a:lnRef idx="2">
-            <a:schemeClr val="accent1">
-              <a:shade val="50000"/>
-            </a:schemeClr>
-          </a:lnRef>
-          <a:fillRef idx="1">
-            <a:schemeClr val="accent1"/>
-          </a:fillRef>
-          <a:effectRef idx="0">
-            <a:schemeClr val="accent1"/>
-          </a:effectRef>
-          <a:fontRef idx="minor">
-            <a:schemeClr val="lt1"/>
-          </a:fontRef>
-        </p:style>
-        <p:txBody>
-          <a:bodyPr rtlCol="0" anchor="ctr"/>
-          <a:lstStyle/>
-          <a:p>
-            <a:pPr algn="ctr"/>
-            <a:r>
-              <a:rPr lang="fr-CH" b="1" dirty="0">
-                <a:solidFill>
-                  <a:schemeClr val="tx1"/>
-                </a:solidFill>
-              </a:rPr>
-              <a:t>Cheseaux</a:t>
-            </a:r>
-          </a:p>
-        </p:txBody>
-      </p:sp>
-      <p:sp>
-        <p:nvSpPr>
-          <p:cNvPr id="22" name="Rectangle 21">
-            <a:extLst>
-              <a:ext uri="{FF2B5EF4-FFF2-40B4-BE49-F238E27FC236}">
-                <a16:creationId xmlns:a16="http://schemas.microsoft.com/office/drawing/2014/main" id="{87923A7E-F05A-4DA8-B17B-0E8AC60F1BE5}"/>
-              </a:ext>
-            </a:extLst>
-          </p:cNvPr>
-          <p:cNvSpPr/>
-          <p:nvPr/>
-        </p:nvSpPr>
-        <p:spPr>
-          <a:xfrm>
-            <a:off x="2286000" y="986552"/>
-            <a:ext cx="1409700" cy="381000"/>
-          </a:xfrm>
-          <a:prstGeom prst="rect">
-            <a:avLst/>
-          </a:prstGeom>
-          <a:solidFill>
-            <a:schemeClr val="bg1"/>
-          </a:solidFill>
-          <a:ln w="38100">
-            <a:solidFill>
-              <a:schemeClr val="tx1"/>
-            </a:solidFill>
-          </a:ln>
-        </p:spPr>
-        <p:style>
-          <a:lnRef idx="2">
-            <a:schemeClr val="accent1">
-              <a:shade val="50000"/>
-            </a:schemeClr>
-          </a:lnRef>
-          <a:fillRef idx="1">
-            <a:schemeClr val="accent1"/>
-          </a:fillRef>
-          <a:effectRef idx="0">
-            <a:schemeClr val="accent1"/>
-          </a:effectRef>
-          <a:fontRef idx="minor">
-            <a:schemeClr val="lt1"/>
-          </a:fontRef>
-        </p:style>
-        <p:txBody>
-          <a:bodyPr rtlCol="0" anchor="ctr"/>
-          <a:lstStyle/>
-          <a:p>
-            <a:pPr algn="ctr"/>
-            <a:r>
-              <a:rPr lang="fr-CH" b="1" dirty="0">
-                <a:solidFill>
-                  <a:schemeClr val="tx1"/>
-                </a:solidFill>
-              </a:rPr>
-              <a:t>Saint-Roch</a:t>
-            </a:r>
-          </a:p>
-        </p:txBody>
-      </p:sp>
-      <p:sp>
-        <p:nvSpPr>
-          <p:cNvPr id="23" name="Rectangle 22">
-            <a:extLst>
-              <a:ext uri="{FF2B5EF4-FFF2-40B4-BE49-F238E27FC236}">
-                <a16:creationId xmlns:a16="http://schemas.microsoft.com/office/drawing/2014/main" id="{369B2824-F532-45F4-AA2C-61D6F673CA9D}"/>
-              </a:ext>
-            </a:extLst>
-          </p:cNvPr>
-          <p:cNvSpPr/>
-          <p:nvPr/>
-        </p:nvSpPr>
-        <p:spPr>
-          <a:xfrm>
-            <a:off x="8595360" y="986552"/>
-            <a:ext cx="2971800" cy="381000"/>
-          </a:xfrm>
-          <a:prstGeom prst="rect">
-            <a:avLst/>
-          </a:prstGeom>
-          <a:solidFill>
-            <a:schemeClr val="bg1"/>
-          </a:solidFill>
-          <a:ln w="38100">
-            <a:solidFill>
-              <a:schemeClr val="tx1"/>
-            </a:solidFill>
-          </a:ln>
-        </p:spPr>
-        <p:style>
-          <a:lnRef idx="2">
-            <a:schemeClr val="accent1">
-              <a:shade val="50000"/>
-            </a:schemeClr>
-          </a:lnRef>
-          <a:fillRef idx="1">
-            <a:schemeClr val="accent1"/>
-          </a:fillRef>
-          <a:effectRef idx="0">
-            <a:schemeClr val="accent1"/>
-          </a:effectRef>
-          <a:fontRef idx="minor">
-            <a:schemeClr val="lt1"/>
-          </a:fontRef>
-        </p:style>
-        <p:txBody>
-          <a:bodyPr rtlCol="0" anchor="ctr"/>
-          <a:lstStyle/>
-          <a:p>
-            <a:pPr algn="ctr"/>
-            <a:r>
-              <a:rPr lang="fr-CH" b="1" dirty="0">
-                <a:solidFill>
-                  <a:schemeClr val="tx1"/>
-                </a:solidFill>
-              </a:rPr>
-              <a:t>Filtres/Conditions</a:t>
-            </a:r>
-          </a:p>
-        </p:txBody>
-      </p:sp>
-      <p:grpSp>
-        <p:nvGrpSpPr>
-          <p:cNvPr id="35" name="Groupe 34">
-            <a:extLst>
-              <a:ext uri="{FF2B5EF4-FFF2-40B4-BE49-F238E27FC236}">
-                <a16:creationId xmlns:a16="http://schemas.microsoft.com/office/drawing/2014/main" id="{569729D3-DCB3-40FA-B52F-203EC1121D70}"/>
-              </a:ext>
-            </a:extLst>
-          </p:cNvPr>
-          <p:cNvGrpSpPr/>
-          <p:nvPr/>
-        </p:nvGrpSpPr>
-        <p:grpSpPr>
-          <a:xfrm>
-            <a:off x="8862060" y="2402920"/>
-            <a:ext cx="2118360" cy="369332"/>
-            <a:chOff x="8862060" y="2402920"/>
-            <a:chExt cx="2118360" cy="369332"/>
-          </a:xfrm>
-        </p:grpSpPr>
-        <p:sp>
-          <p:nvSpPr>
-            <p:cNvPr id="31" name="Rectangle 30">
-              <a:extLst>
-                <a:ext uri="{FF2B5EF4-FFF2-40B4-BE49-F238E27FC236}">
-                  <a16:creationId xmlns:a16="http://schemas.microsoft.com/office/drawing/2014/main" id="{8E282E94-A873-4742-8358-EFA6AEDB3958}"/>
-                </a:ext>
-              </a:extLst>
-            </p:cNvPr>
-            <p:cNvSpPr/>
-            <p:nvPr/>
-          </p:nvSpPr>
-          <p:spPr>
-            <a:xfrm>
-              <a:off x="8862060" y="2438400"/>
-              <a:ext cx="281940" cy="273844"/>
-            </a:xfrm>
-            <a:prstGeom prst="rect">
-              <a:avLst/>
-            </a:prstGeom>
-            <a:solidFill>
-              <a:schemeClr val="bg1"/>
-            </a:solidFill>
-            <a:ln w="38100">
-              <a:solidFill>
-                <a:schemeClr val="tx1"/>
-              </a:solidFill>
-            </a:ln>
-          </p:spPr>
-          <p:style>
-            <a:lnRef idx="2">
-              <a:schemeClr val="accent1">
-                <a:shade val="50000"/>
-              </a:schemeClr>
-            </a:lnRef>
-            <a:fillRef idx="1">
-              <a:schemeClr val="accent1"/>
-            </a:fillRef>
-            <a:effectRef idx="0">
-              <a:schemeClr val="accent1"/>
-            </a:effectRef>
-            <a:fontRef idx="minor">
-              <a:schemeClr val="lt1"/>
-            </a:fontRef>
-          </p:style>
-          <p:txBody>
-            <a:bodyPr rtlCol="0" anchor="ctr"/>
-            <a:lstStyle/>
-            <a:p>
-              <a:pPr algn="ctr"/>
-              <a:r>
-                <a:rPr lang="fr-CH" dirty="0">
-                  <a:solidFill>
-                    <a:schemeClr val="tx1"/>
-                  </a:solidFill>
-                </a:rPr>
-                <a:t>X</a:t>
-              </a:r>
-            </a:p>
-          </p:txBody>
-        </p:sp>
-        <p:sp>
-          <p:nvSpPr>
-            <p:cNvPr id="34" name="ZoneTexte 33">
-              <a:extLst>
-                <a:ext uri="{FF2B5EF4-FFF2-40B4-BE49-F238E27FC236}">
-                  <a16:creationId xmlns:a16="http://schemas.microsoft.com/office/drawing/2014/main" id="{1AD1A590-0CD7-4AC8-8E11-BE182461EAEE}"/>
-                </a:ext>
-              </a:extLst>
-            </p:cNvPr>
-            <p:cNvSpPr txBox="1"/>
-            <p:nvPr/>
-          </p:nvSpPr>
-          <p:spPr>
-            <a:xfrm>
-              <a:off x="9311640" y="2402920"/>
-              <a:ext cx="1668780" cy="369332"/>
-            </a:xfrm>
-            <a:prstGeom prst="rect">
-              <a:avLst/>
-            </a:prstGeom>
-            <a:noFill/>
-          </p:spPr>
-          <p:txBody>
-            <a:bodyPr wrap="square" rtlCol="0">
-              <a:spAutoFit/>
-            </a:bodyPr>
-            <a:lstStyle/>
-            <a:p>
-              <a:r>
-                <a:rPr lang="fr-CH" dirty="0"/>
-                <a:t>Projecteur</a:t>
-              </a:r>
-            </a:p>
-          </p:txBody>
-        </p:sp>
-      </p:grpSp>
-      <p:grpSp>
-        <p:nvGrpSpPr>
-          <p:cNvPr id="36" name="Groupe 35">
-            <a:extLst>
-              <a:ext uri="{FF2B5EF4-FFF2-40B4-BE49-F238E27FC236}">
-                <a16:creationId xmlns:a16="http://schemas.microsoft.com/office/drawing/2014/main" id="{AAD3CDB4-E977-46C6-9DAE-83E69378DCA2}"/>
-              </a:ext>
-            </a:extLst>
-          </p:cNvPr>
-          <p:cNvGrpSpPr/>
-          <p:nvPr/>
-        </p:nvGrpSpPr>
-        <p:grpSpPr>
-          <a:xfrm>
-            <a:off x="8862060" y="3500914"/>
-            <a:ext cx="2118360" cy="369332"/>
-            <a:chOff x="8862060" y="2402920"/>
-            <a:chExt cx="2118360" cy="369332"/>
-          </a:xfrm>
-        </p:grpSpPr>
-        <p:sp>
-          <p:nvSpPr>
-            <p:cNvPr id="37" name="Rectangle 36">
-              <a:extLst>
-                <a:ext uri="{FF2B5EF4-FFF2-40B4-BE49-F238E27FC236}">
-                  <a16:creationId xmlns:a16="http://schemas.microsoft.com/office/drawing/2014/main" id="{63276C52-DCDC-4F18-BB10-B1CF2F7E1ADE}"/>
-                </a:ext>
-              </a:extLst>
-            </p:cNvPr>
-            <p:cNvSpPr/>
-            <p:nvPr/>
-          </p:nvSpPr>
-          <p:spPr>
-            <a:xfrm>
-              <a:off x="8862060" y="2438400"/>
-              <a:ext cx="281940" cy="273844"/>
-            </a:xfrm>
-            <a:prstGeom prst="rect">
-              <a:avLst/>
-            </a:prstGeom>
-            <a:solidFill>
-              <a:schemeClr val="bg1"/>
-            </a:solidFill>
-            <a:ln w="38100">
-              <a:solidFill>
-                <a:schemeClr val="tx1"/>
-              </a:solidFill>
-            </a:ln>
-          </p:spPr>
-          <p:style>
-            <a:lnRef idx="2">
-              <a:schemeClr val="accent1">
-                <a:shade val="50000"/>
-              </a:schemeClr>
-            </a:lnRef>
-            <a:fillRef idx="1">
-              <a:schemeClr val="accent1"/>
-            </a:fillRef>
-            <a:effectRef idx="0">
-              <a:schemeClr val="accent1"/>
-            </a:effectRef>
-            <a:fontRef idx="minor">
-              <a:schemeClr val="lt1"/>
-            </a:fontRef>
-          </p:style>
-          <p:txBody>
-            <a:bodyPr rtlCol="0" anchor="ctr"/>
-            <a:lstStyle/>
-            <a:p>
-              <a:pPr algn="ctr"/>
-              <a:r>
-                <a:rPr lang="fr-CH" dirty="0">
-                  <a:solidFill>
-                    <a:schemeClr val="tx1"/>
-                  </a:solidFill>
-                </a:rPr>
-                <a:t>X</a:t>
-              </a:r>
-            </a:p>
-          </p:txBody>
-        </p:sp>
-        <p:sp>
-          <p:nvSpPr>
-            <p:cNvPr id="38" name="ZoneTexte 37">
-              <a:extLst>
-                <a:ext uri="{FF2B5EF4-FFF2-40B4-BE49-F238E27FC236}">
-                  <a16:creationId xmlns:a16="http://schemas.microsoft.com/office/drawing/2014/main" id="{72B81FA5-3668-4359-BC8E-748464962080}"/>
-                </a:ext>
-              </a:extLst>
-            </p:cNvPr>
-            <p:cNvSpPr txBox="1"/>
-            <p:nvPr/>
-          </p:nvSpPr>
-          <p:spPr>
-            <a:xfrm>
-              <a:off x="9311640" y="2402920"/>
-              <a:ext cx="1668780" cy="369332"/>
-            </a:xfrm>
-            <a:prstGeom prst="rect">
-              <a:avLst/>
-            </a:prstGeom>
-            <a:noFill/>
-          </p:spPr>
-          <p:txBody>
-            <a:bodyPr wrap="square" rtlCol="0">
-              <a:spAutoFit/>
-            </a:bodyPr>
-            <a:lstStyle/>
-            <a:p>
-              <a:r>
-                <a:rPr lang="fr-CH" dirty="0"/>
-                <a:t>Toilettes à prox.</a:t>
-              </a:r>
-            </a:p>
-          </p:txBody>
-        </p:sp>
-      </p:grpSp>
-      <p:grpSp>
-        <p:nvGrpSpPr>
-          <p:cNvPr id="39" name="Groupe 38">
-            <a:extLst>
-              <a:ext uri="{FF2B5EF4-FFF2-40B4-BE49-F238E27FC236}">
-                <a16:creationId xmlns:a16="http://schemas.microsoft.com/office/drawing/2014/main" id="{F32BC244-E134-4B0D-A957-740B734AAC94}"/>
-              </a:ext>
-            </a:extLst>
-          </p:cNvPr>
-          <p:cNvGrpSpPr/>
-          <p:nvPr/>
-        </p:nvGrpSpPr>
-        <p:grpSpPr>
-          <a:xfrm>
-            <a:off x="8862060" y="2951917"/>
-            <a:ext cx="2453640" cy="646331"/>
-            <a:chOff x="8862060" y="2402920"/>
-            <a:chExt cx="2118360" cy="646331"/>
-          </a:xfrm>
-        </p:grpSpPr>
-        <p:sp>
-          <p:nvSpPr>
-            <p:cNvPr id="40" name="Rectangle 39">
-              <a:extLst>
-                <a:ext uri="{FF2B5EF4-FFF2-40B4-BE49-F238E27FC236}">
-                  <a16:creationId xmlns:a16="http://schemas.microsoft.com/office/drawing/2014/main" id="{640DE51C-8F51-44E5-B20B-2D90A2C32985}"/>
-                </a:ext>
-              </a:extLst>
-            </p:cNvPr>
-            <p:cNvSpPr/>
-            <p:nvPr/>
-          </p:nvSpPr>
-          <p:spPr>
-            <a:xfrm>
-              <a:off x="8862060" y="2438400"/>
-              <a:ext cx="232481" cy="273844"/>
+              <a:off x="876300" y="1357670"/>
+              <a:ext cx="7719060" cy="4983956"/>
             </a:xfrm>
             <a:prstGeom prst="rect">
               <a:avLst/>
@@ -6109,35 +4745,506 @@
         </p:sp>
         <p:sp>
           <p:nvSpPr>
-            <p:cNvPr id="41" name="ZoneTexte 40">
+            <p:cNvPr id="32" name="Rectangle 31">
               <a:extLst>
                 <a:ext uri="{FF2B5EF4-FFF2-40B4-BE49-F238E27FC236}">
-                  <a16:creationId xmlns:a16="http://schemas.microsoft.com/office/drawing/2014/main" id="{510E7742-F24B-47D7-A736-4FBE9CFCB7C7}"/>
+                  <a16:creationId xmlns:a16="http://schemas.microsoft.com/office/drawing/2014/main" id="{3379A290-B93C-4943-B15C-B21BF11A0764}"/>
                 </a:ext>
               </a:extLst>
             </p:cNvPr>
-            <p:cNvSpPr txBox="1"/>
+            <p:cNvSpPr/>
             <p:nvPr/>
           </p:nvSpPr>
           <p:spPr>
             <a:xfrm>
-              <a:off x="9311640" y="2402920"/>
-              <a:ext cx="1668780" cy="646331"/>
+              <a:off x="876300" y="4396740"/>
+              <a:ext cx="1508760" cy="1954292"/>
             </a:xfrm>
             <a:prstGeom prst="rect">
               <a:avLst/>
             </a:prstGeom>
-            <a:noFill/>
+            <a:solidFill>
+              <a:schemeClr val="bg1"/>
+            </a:solidFill>
+            <a:ln w="38100">
+              <a:solidFill>
+                <a:schemeClr val="tx1"/>
+              </a:solidFill>
+            </a:ln>
           </p:spPr>
+          <p:style>
+            <a:lnRef idx="2">
+              <a:schemeClr val="accent1">
+                <a:shade val="50000"/>
+              </a:schemeClr>
+            </a:lnRef>
+            <a:fillRef idx="1">
+              <a:schemeClr val="accent1"/>
+            </a:fillRef>
+            <a:effectRef idx="0">
+              <a:schemeClr val="accent1"/>
+            </a:effectRef>
+            <a:fontRef idx="minor">
+              <a:schemeClr val="lt1"/>
+            </a:fontRef>
+          </p:style>
           <p:txBody>
-            <a:bodyPr wrap="square" rtlCol="0">
-              <a:spAutoFit/>
-            </a:bodyPr>
+            <a:bodyPr rtlCol="0" anchor="ctr"/>
             <a:lstStyle/>
             <a:p>
+              <a:pPr algn="ctr"/>
               <a:r>
-                <a:rPr lang="fr-CH" dirty="0"/>
-                <a:t>Prises électriques</a:t>
+                <a:rPr lang="fr-CH" dirty="0">
+                  <a:solidFill>
+                    <a:schemeClr val="tx1"/>
+                  </a:solidFill>
+                </a:rPr>
+                <a:t>WC</a:t>
+              </a:r>
+            </a:p>
+          </p:txBody>
+        </p:sp>
+        <p:sp>
+          <p:nvSpPr>
+            <p:cNvPr id="33" name="Rectangle 32">
+              <a:extLst>
+                <a:ext uri="{FF2B5EF4-FFF2-40B4-BE49-F238E27FC236}">
+                  <a16:creationId xmlns:a16="http://schemas.microsoft.com/office/drawing/2014/main" id="{37C1BD34-2475-4F1C-8726-39F3D789A5C3}"/>
+                </a:ext>
+              </a:extLst>
+            </p:cNvPr>
+            <p:cNvSpPr/>
+            <p:nvPr/>
+          </p:nvSpPr>
+          <p:spPr>
+            <a:xfrm>
+              <a:off x="876300" y="1363980"/>
+              <a:ext cx="1242060" cy="1531620"/>
+            </a:xfrm>
+            <a:prstGeom prst="rect">
+              <a:avLst/>
+            </a:prstGeom>
+            <a:solidFill>
+              <a:schemeClr val="accent6">
+                <a:lumMod val="40000"/>
+                <a:lumOff val="60000"/>
+              </a:schemeClr>
+            </a:solidFill>
+            <a:ln w="38100">
+              <a:solidFill>
+                <a:schemeClr val="tx1"/>
+              </a:solidFill>
+            </a:ln>
+          </p:spPr>
+          <p:style>
+            <a:lnRef idx="2">
+              <a:schemeClr val="accent1">
+                <a:shade val="50000"/>
+              </a:schemeClr>
+            </a:lnRef>
+            <a:fillRef idx="1">
+              <a:schemeClr val="accent1"/>
+            </a:fillRef>
+            <a:effectRef idx="0">
+              <a:schemeClr val="accent1"/>
+            </a:effectRef>
+            <a:fontRef idx="minor">
+              <a:schemeClr val="lt1"/>
+            </a:fontRef>
+          </p:style>
+          <p:txBody>
+            <a:bodyPr rtlCol="0" anchor="ctr"/>
+            <a:lstStyle/>
+            <a:p>
+              <a:pPr algn="ctr"/>
+              <a:r>
+                <a:rPr lang="fr-CH" dirty="0">
+                  <a:solidFill>
+                    <a:schemeClr val="tx1"/>
+                  </a:solidFill>
+                </a:rPr>
+                <a:t>H01</a:t>
+              </a:r>
+            </a:p>
+          </p:txBody>
+        </p:sp>
+        <p:sp>
+          <p:nvSpPr>
+            <p:cNvPr id="42" name="Rectangle 41">
+              <a:extLst>
+                <a:ext uri="{FF2B5EF4-FFF2-40B4-BE49-F238E27FC236}">
+                  <a16:creationId xmlns:a16="http://schemas.microsoft.com/office/drawing/2014/main" id="{6FDF1844-2295-41A2-B751-56FC83F0D762}"/>
+                </a:ext>
+              </a:extLst>
+            </p:cNvPr>
+            <p:cNvSpPr/>
+            <p:nvPr/>
+          </p:nvSpPr>
+          <p:spPr>
+            <a:xfrm>
+              <a:off x="2118360" y="1371124"/>
+              <a:ext cx="1242060" cy="1531620"/>
+            </a:xfrm>
+            <a:prstGeom prst="rect">
+              <a:avLst/>
+            </a:prstGeom>
+            <a:solidFill>
+              <a:schemeClr val="accent2">
+                <a:lumMod val="40000"/>
+                <a:lumOff val="60000"/>
+              </a:schemeClr>
+            </a:solidFill>
+            <a:ln w="38100">
+              <a:solidFill>
+                <a:schemeClr val="tx1"/>
+              </a:solidFill>
+            </a:ln>
+          </p:spPr>
+          <p:style>
+            <a:lnRef idx="2">
+              <a:schemeClr val="accent1">
+                <a:shade val="50000"/>
+              </a:schemeClr>
+            </a:lnRef>
+            <a:fillRef idx="1">
+              <a:schemeClr val="accent1"/>
+            </a:fillRef>
+            <a:effectRef idx="0">
+              <a:schemeClr val="accent1"/>
+            </a:effectRef>
+            <a:fontRef idx="minor">
+              <a:schemeClr val="lt1"/>
+            </a:fontRef>
+          </p:style>
+          <p:txBody>
+            <a:bodyPr rtlCol="0" anchor="ctr"/>
+            <a:lstStyle/>
+            <a:p>
+              <a:pPr algn="ctr"/>
+              <a:r>
+                <a:rPr lang="fr-CH" dirty="0">
+                  <a:solidFill>
+                    <a:schemeClr val="tx1"/>
+                  </a:solidFill>
+                </a:rPr>
+                <a:t>H02</a:t>
+              </a:r>
+            </a:p>
+          </p:txBody>
+        </p:sp>
+        <p:sp>
+          <p:nvSpPr>
+            <p:cNvPr id="43" name="Rectangle 42">
+              <a:extLst>
+                <a:ext uri="{FF2B5EF4-FFF2-40B4-BE49-F238E27FC236}">
+                  <a16:creationId xmlns:a16="http://schemas.microsoft.com/office/drawing/2014/main" id="{684FD5A1-1E47-4941-B905-2F63A88E23FC}"/>
+                </a:ext>
+              </a:extLst>
+            </p:cNvPr>
+            <p:cNvSpPr/>
+            <p:nvPr/>
+          </p:nvSpPr>
+          <p:spPr>
+            <a:xfrm>
+              <a:off x="3360420" y="1355884"/>
+              <a:ext cx="1684020" cy="2050256"/>
+            </a:xfrm>
+            <a:prstGeom prst="rect">
+              <a:avLst/>
+            </a:prstGeom>
+            <a:solidFill>
+              <a:schemeClr val="accent6">
+                <a:lumMod val="40000"/>
+                <a:lumOff val="60000"/>
+              </a:schemeClr>
+            </a:solidFill>
+            <a:ln w="38100">
+              <a:solidFill>
+                <a:schemeClr val="tx1"/>
+              </a:solidFill>
+            </a:ln>
+          </p:spPr>
+          <p:style>
+            <a:lnRef idx="2">
+              <a:schemeClr val="accent1">
+                <a:shade val="50000"/>
+              </a:schemeClr>
+            </a:lnRef>
+            <a:fillRef idx="1">
+              <a:schemeClr val="accent1"/>
+            </a:fillRef>
+            <a:effectRef idx="0">
+              <a:schemeClr val="accent1"/>
+            </a:effectRef>
+            <a:fontRef idx="minor">
+              <a:schemeClr val="lt1"/>
+            </a:fontRef>
+          </p:style>
+          <p:txBody>
+            <a:bodyPr rtlCol="0" anchor="ctr"/>
+            <a:lstStyle/>
+            <a:p>
+              <a:pPr algn="ctr"/>
+              <a:r>
+                <a:rPr lang="fr-CH" dirty="0">
+                  <a:solidFill>
+                    <a:schemeClr val="tx1"/>
+                  </a:solidFill>
+                </a:rPr>
+                <a:t>H03</a:t>
+              </a:r>
+            </a:p>
+          </p:txBody>
+        </p:sp>
+        <p:sp>
+          <p:nvSpPr>
+            <p:cNvPr id="44" name="Rectangle 43">
+              <a:extLst>
+                <a:ext uri="{FF2B5EF4-FFF2-40B4-BE49-F238E27FC236}">
+                  <a16:creationId xmlns:a16="http://schemas.microsoft.com/office/drawing/2014/main" id="{D59B7F66-8C9F-45A9-B976-69DD62734CE5}"/>
+                </a:ext>
+              </a:extLst>
+            </p:cNvPr>
+            <p:cNvSpPr/>
+            <p:nvPr/>
+          </p:nvSpPr>
+          <p:spPr>
+            <a:xfrm>
+              <a:off x="5044440" y="1362433"/>
+              <a:ext cx="1569720" cy="2036087"/>
+            </a:xfrm>
+            <a:prstGeom prst="rect">
+              <a:avLst/>
+            </a:prstGeom>
+            <a:solidFill>
+              <a:schemeClr val="accent2">
+                <a:lumMod val="40000"/>
+                <a:lumOff val="60000"/>
+              </a:schemeClr>
+            </a:solidFill>
+            <a:ln w="38100">
+              <a:solidFill>
+                <a:schemeClr val="tx1"/>
+              </a:solidFill>
+            </a:ln>
+          </p:spPr>
+          <p:style>
+            <a:lnRef idx="2">
+              <a:schemeClr val="accent1">
+                <a:shade val="50000"/>
+              </a:schemeClr>
+            </a:lnRef>
+            <a:fillRef idx="1">
+              <a:schemeClr val="accent1"/>
+            </a:fillRef>
+            <a:effectRef idx="0">
+              <a:schemeClr val="accent1"/>
+            </a:effectRef>
+            <a:fontRef idx="minor">
+              <a:schemeClr val="lt1"/>
+            </a:fontRef>
+          </p:style>
+          <p:txBody>
+            <a:bodyPr rtlCol="0" anchor="ctr"/>
+            <a:lstStyle/>
+            <a:p>
+              <a:pPr algn="ctr"/>
+              <a:r>
+                <a:rPr lang="fr-CH" dirty="0">
+                  <a:solidFill>
+                    <a:schemeClr val="tx1"/>
+                  </a:solidFill>
+                </a:rPr>
+                <a:t>H04</a:t>
+              </a:r>
+            </a:p>
+          </p:txBody>
+        </p:sp>
+        <p:sp>
+          <p:nvSpPr>
+            <p:cNvPr id="48" name="Rectangle 47">
+              <a:extLst>
+                <a:ext uri="{FF2B5EF4-FFF2-40B4-BE49-F238E27FC236}">
+                  <a16:creationId xmlns:a16="http://schemas.microsoft.com/office/drawing/2014/main" id="{DB39A551-F893-449E-89D9-AA6AB3E91E99}"/>
+                </a:ext>
+              </a:extLst>
+            </p:cNvPr>
+            <p:cNvSpPr/>
+            <p:nvPr/>
+          </p:nvSpPr>
+          <p:spPr>
+            <a:xfrm>
+              <a:off x="6614160" y="3429001"/>
+              <a:ext cx="1981200" cy="1409700"/>
+            </a:xfrm>
+            <a:prstGeom prst="rect">
+              <a:avLst/>
+            </a:prstGeom>
+            <a:solidFill>
+              <a:schemeClr val="accent6">
+                <a:lumMod val="40000"/>
+                <a:lumOff val="60000"/>
+              </a:schemeClr>
+            </a:solidFill>
+            <a:ln w="38100">
+              <a:solidFill>
+                <a:schemeClr val="tx1"/>
+              </a:solidFill>
+            </a:ln>
+          </p:spPr>
+          <p:style>
+            <a:lnRef idx="2">
+              <a:schemeClr val="accent1">
+                <a:shade val="50000"/>
+              </a:schemeClr>
+            </a:lnRef>
+            <a:fillRef idx="1">
+              <a:schemeClr val="accent1"/>
+            </a:fillRef>
+            <a:effectRef idx="0">
+              <a:schemeClr val="accent1"/>
+            </a:effectRef>
+            <a:fontRef idx="minor">
+              <a:schemeClr val="lt1"/>
+            </a:fontRef>
+          </p:style>
+          <p:txBody>
+            <a:bodyPr rtlCol="0" anchor="ctr"/>
+            <a:lstStyle/>
+            <a:p>
+              <a:pPr algn="ctr"/>
+              <a:r>
+                <a:rPr lang="fr-CH" dirty="0">
+                  <a:solidFill>
+                    <a:schemeClr val="tx1"/>
+                  </a:solidFill>
+                </a:rPr>
+                <a:t>H05</a:t>
+              </a:r>
+            </a:p>
+          </p:txBody>
+        </p:sp>
+        <p:sp>
+          <p:nvSpPr>
+            <p:cNvPr id="49" name="Rectangle 48">
+              <a:extLst>
+                <a:ext uri="{FF2B5EF4-FFF2-40B4-BE49-F238E27FC236}">
+                  <a16:creationId xmlns:a16="http://schemas.microsoft.com/office/drawing/2014/main" id="{94533DA4-BC12-4373-9791-379F85724E83}"/>
+                </a:ext>
+              </a:extLst>
+            </p:cNvPr>
+            <p:cNvSpPr/>
+            <p:nvPr/>
+          </p:nvSpPr>
+          <p:spPr>
+            <a:xfrm>
+              <a:off x="6614160" y="4838700"/>
+              <a:ext cx="1981200" cy="1501139"/>
+            </a:xfrm>
+            <a:prstGeom prst="rect">
+              <a:avLst/>
+            </a:prstGeom>
+            <a:solidFill>
+              <a:schemeClr val="accent2">
+                <a:lumMod val="40000"/>
+                <a:lumOff val="60000"/>
+              </a:schemeClr>
+            </a:solidFill>
+            <a:ln w="38100">
+              <a:solidFill>
+                <a:schemeClr val="tx1"/>
+              </a:solidFill>
+            </a:ln>
+          </p:spPr>
+          <p:style>
+            <a:lnRef idx="2">
+              <a:schemeClr val="accent1">
+                <a:shade val="50000"/>
+              </a:schemeClr>
+            </a:lnRef>
+            <a:fillRef idx="1">
+              <a:schemeClr val="accent1"/>
+            </a:fillRef>
+            <a:effectRef idx="0">
+              <a:schemeClr val="accent1"/>
+            </a:effectRef>
+            <a:fontRef idx="minor">
+              <a:schemeClr val="lt1"/>
+            </a:fontRef>
+          </p:style>
+          <p:txBody>
+            <a:bodyPr rtlCol="0" anchor="ctr"/>
+            <a:lstStyle/>
+            <a:p>
+              <a:pPr algn="ctr"/>
+              <a:r>
+                <a:rPr lang="fr-CH" dirty="0">
+                  <a:solidFill>
+                    <a:schemeClr val="tx1"/>
+                  </a:solidFill>
+                </a:rPr>
+                <a:t>H06</a:t>
+              </a:r>
+            </a:p>
+          </p:txBody>
+        </p:sp>
+        <p:sp>
+          <p:nvSpPr>
+            <p:cNvPr id="50" name="Rectangle 49">
+              <a:extLst>
+                <a:ext uri="{FF2B5EF4-FFF2-40B4-BE49-F238E27FC236}">
+                  <a16:creationId xmlns:a16="http://schemas.microsoft.com/office/drawing/2014/main" id="{2210BB83-E6B6-4215-9D50-51FA435D2E9B}"/>
+                </a:ext>
+              </a:extLst>
+            </p:cNvPr>
+            <p:cNvSpPr/>
+            <p:nvPr/>
+          </p:nvSpPr>
+          <p:spPr>
+            <a:xfrm>
+              <a:off x="3108960" y="5486877"/>
+              <a:ext cx="1242060" cy="852962"/>
+            </a:xfrm>
+            <a:prstGeom prst="rect">
+              <a:avLst/>
+            </a:prstGeom>
+            <a:solidFill>
+              <a:schemeClr val="bg1"/>
+            </a:solidFill>
+            <a:ln w="38100">
+              <a:solidFill>
+                <a:schemeClr val="tx1"/>
+              </a:solidFill>
+            </a:ln>
+          </p:spPr>
+          <p:style>
+            <a:lnRef idx="2">
+              <a:schemeClr val="accent1">
+                <a:shade val="50000"/>
+              </a:schemeClr>
+            </a:lnRef>
+            <a:fillRef idx="1">
+              <a:schemeClr val="accent1"/>
+            </a:fillRef>
+            <a:effectRef idx="0">
+              <a:schemeClr val="accent1"/>
+            </a:effectRef>
+            <a:fontRef idx="minor">
+              <a:schemeClr val="lt1"/>
+            </a:fontRef>
+          </p:style>
+          <p:txBody>
+            <a:bodyPr rtlCol="0" anchor="ctr"/>
+            <a:lstStyle/>
+            <a:p>
+              <a:pPr algn="ctr"/>
+              <a:r>
+                <a:rPr lang="fr-CH" dirty="0">
+                  <a:solidFill>
+                    <a:schemeClr val="tx1"/>
+                  </a:solidFill>
+                </a:rPr>
+                <a:t>Escalier</a:t>
               </a:r>
             </a:p>
           </p:txBody>
@@ -6145,10 +5252,10 @@
       </p:grpSp>
       <p:sp>
         <p:nvSpPr>
-          <p:cNvPr id="32" name="Rectangle 31">
-            <a:extLst>
-              <a:ext uri="{FF2B5EF4-FFF2-40B4-BE49-F238E27FC236}">
-                <a16:creationId xmlns:a16="http://schemas.microsoft.com/office/drawing/2014/main" id="{3379A290-B93C-4943-B15C-B21BF11A0764}"/>
+          <p:cNvPr id="45" name="Rectangle 44">
+            <a:extLst>
+              <a:ext uri="{FF2B5EF4-FFF2-40B4-BE49-F238E27FC236}">
+                <a16:creationId xmlns:a16="http://schemas.microsoft.com/office/drawing/2014/main" id="{D63678CD-D0EA-4362-984E-D0829A57026B}"/>
               </a:ext>
             </a:extLst>
           </p:cNvPr>
@@ -6157,8 +5264,8 @@
         </p:nvSpPr>
         <p:spPr>
           <a:xfrm>
-            <a:off x="876300" y="4396740"/>
-            <a:ext cx="1508760" cy="1954292"/>
+            <a:off x="876299" y="1378744"/>
+            <a:ext cx="1409700" cy="453628"/>
           </a:xfrm>
           <a:prstGeom prst="rect">
             <a:avLst/>
@@ -6194,22 +5301,27 @@
           <a:p>
             <a:pPr algn="ctr"/>
             <a:r>
-              <a:rPr lang="fr-CH" dirty="0">
+              <a:rPr lang="fr-CH">
                 <a:solidFill>
                   <a:schemeClr val="tx1"/>
                 </a:solidFill>
               </a:rPr>
-              <a:t>WC</a:t>
-            </a:r>
-          </a:p>
-        </p:txBody>
-      </p:sp>
-      <p:sp>
-        <p:nvSpPr>
-          <p:cNvPr id="33" name="Rectangle 32">
-            <a:extLst>
-              <a:ext uri="{FF2B5EF4-FFF2-40B4-BE49-F238E27FC236}">
-                <a16:creationId xmlns:a16="http://schemas.microsoft.com/office/drawing/2014/main" id="{37C1BD34-2475-4F1C-8726-39F3D789A5C3}"/>
+              <a:t>ÉtageN</a:t>
+            </a:r>
+            <a:endParaRPr lang="fr-CH" dirty="0">
+              <a:solidFill>
+                <a:schemeClr val="tx1"/>
+              </a:solidFill>
+            </a:endParaRPr>
+          </a:p>
+        </p:txBody>
+      </p:sp>
+      <p:sp>
+        <p:nvSpPr>
+          <p:cNvPr id="47" name="Rectangle 46">
+            <a:extLst>
+              <a:ext uri="{FF2B5EF4-FFF2-40B4-BE49-F238E27FC236}">
+                <a16:creationId xmlns:a16="http://schemas.microsoft.com/office/drawing/2014/main" id="{9716E632-ADEB-48EC-8C7B-0D37D5A8AA43}"/>
               </a:ext>
             </a:extLst>
           </p:cNvPr>
@@ -6218,8 +5330,8 @@
         </p:nvSpPr>
         <p:spPr>
           <a:xfrm>
-            <a:off x="876300" y="1363980"/>
-            <a:ext cx="1242060" cy="1531620"/>
+            <a:off x="871380" y="1826112"/>
+            <a:ext cx="1409700" cy="453628"/>
           </a:xfrm>
           <a:prstGeom prst="rect">
             <a:avLst/>
@@ -6260,17 +5372,17 @@
                   <a:schemeClr val="tx1"/>
                 </a:solidFill>
               </a:rPr>
-              <a:t>H01</a:t>
-            </a:r>
-          </a:p>
-        </p:txBody>
-      </p:sp>
-      <p:sp>
-        <p:nvSpPr>
-          <p:cNvPr id="42" name="Rectangle 41">
-            <a:extLst>
-              <a:ext uri="{FF2B5EF4-FFF2-40B4-BE49-F238E27FC236}">
-                <a16:creationId xmlns:a16="http://schemas.microsoft.com/office/drawing/2014/main" id="{6FDF1844-2295-41A2-B751-56FC83F0D762}"/>
+              <a:t>…</a:t>
+            </a:r>
+          </a:p>
+        </p:txBody>
+      </p:sp>
+      <p:sp>
+        <p:nvSpPr>
+          <p:cNvPr id="51" name="Rectangle 50">
+            <a:extLst>
+              <a:ext uri="{FF2B5EF4-FFF2-40B4-BE49-F238E27FC236}">
+                <a16:creationId xmlns:a16="http://schemas.microsoft.com/office/drawing/2014/main" id="{03B98A59-0AB1-46DB-82A1-98532570A34B}"/>
               </a:ext>
             </a:extLst>
           </p:cNvPr>
@@ -6279,8 +5391,8 @@
         </p:nvSpPr>
         <p:spPr>
           <a:xfrm>
-            <a:off x="2118360" y="1371124"/>
-            <a:ext cx="1242060" cy="1531620"/>
+            <a:off x="881214" y="2278398"/>
+            <a:ext cx="1409700" cy="453628"/>
           </a:xfrm>
           <a:prstGeom prst="rect">
             <a:avLst/>
@@ -6321,17 +5433,17 @@
                   <a:schemeClr val="tx1"/>
                 </a:solidFill>
               </a:rPr>
-              <a:t>H02</a:t>
-            </a:r>
-          </a:p>
-        </p:txBody>
-      </p:sp>
-      <p:sp>
-        <p:nvSpPr>
-          <p:cNvPr id="43" name="Rectangle 42">
-            <a:extLst>
-              <a:ext uri="{FF2B5EF4-FFF2-40B4-BE49-F238E27FC236}">
-                <a16:creationId xmlns:a16="http://schemas.microsoft.com/office/drawing/2014/main" id="{684FD5A1-1E47-4941-B905-2F63A88E23FC}"/>
+              <a:t>…</a:t>
+            </a:r>
+          </a:p>
+        </p:txBody>
+      </p:sp>
+      <p:sp>
+        <p:nvSpPr>
+          <p:cNvPr id="52" name="Rectangle 51">
+            <a:extLst>
+              <a:ext uri="{FF2B5EF4-FFF2-40B4-BE49-F238E27FC236}">
+                <a16:creationId xmlns:a16="http://schemas.microsoft.com/office/drawing/2014/main" id="{EE212C94-745C-477F-BF3C-E2FF478045C3}"/>
               </a:ext>
             </a:extLst>
           </p:cNvPr>
@@ -6340,8 +5452,8 @@
         </p:nvSpPr>
         <p:spPr>
           <a:xfrm>
-            <a:off x="3360420" y="1355884"/>
-            <a:ext cx="1684020" cy="2050256"/>
+            <a:off x="876295" y="2725766"/>
+            <a:ext cx="1409700" cy="453628"/>
           </a:xfrm>
           <a:prstGeom prst="rect">
             <a:avLst/>
@@ -6382,17 +5494,17 @@
                   <a:schemeClr val="tx1"/>
                 </a:solidFill>
               </a:rPr>
-              <a:t>H03</a:t>
-            </a:r>
-          </a:p>
-        </p:txBody>
-      </p:sp>
-      <p:sp>
-        <p:nvSpPr>
-          <p:cNvPr id="44" name="Rectangle 43">
-            <a:extLst>
-              <a:ext uri="{FF2B5EF4-FFF2-40B4-BE49-F238E27FC236}">
-                <a16:creationId xmlns:a16="http://schemas.microsoft.com/office/drawing/2014/main" id="{D59B7F66-8C9F-45A9-B976-69DD62734CE5}"/>
+              <a:t>…</a:t>
+            </a:r>
+          </a:p>
+        </p:txBody>
+      </p:sp>
+      <p:sp>
+        <p:nvSpPr>
+          <p:cNvPr id="53" name="Rectangle 52">
+            <a:extLst>
+              <a:ext uri="{FF2B5EF4-FFF2-40B4-BE49-F238E27FC236}">
+                <a16:creationId xmlns:a16="http://schemas.microsoft.com/office/drawing/2014/main" id="{48D97D13-439D-490F-9500-D232BAE84D1C}"/>
               </a:ext>
             </a:extLst>
           </p:cNvPr>
@@ -6401,8 +5513,8 @@
         </p:nvSpPr>
         <p:spPr>
           <a:xfrm>
-            <a:off x="5044440" y="1362433"/>
-            <a:ext cx="1569720" cy="2036087"/>
+            <a:off x="881214" y="3173132"/>
+            <a:ext cx="1409700" cy="453628"/>
           </a:xfrm>
           <a:prstGeom prst="rect">
             <a:avLst/>
@@ -6443,17 +5555,17 @@
                   <a:schemeClr val="tx1"/>
                 </a:solidFill>
               </a:rPr>
-              <a:t>H04</a:t>
-            </a:r>
-          </a:p>
-        </p:txBody>
-      </p:sp>
-      <p:sp>
-        <p:nvSpPr>
-          <p:cNvPr id="48" name="Rectangle 47">
-            <a:extLst>
-              <a:ext uri="{FF2B5EF4-FFF2-40B4-BE49-F238E27FC236}">
-                <a16:creationId xmlns:a16="http://schemas.microsoft.com/office/drawing/2014/main" id="{DB39A551-F893-449E-89D9-AA6AB3E91E99}"/>
+              <a:t>…</a:t>
+            </a:r>
+          </a:p>
+        </p:txBody>
+      </p:sp>
+      <p:sp>
+        <p:nvSpPr>
+          <p:cNvPr id="54" name="Rectangle 53">
+            <a:extLst>
+              <a:ext uri="{FF2B5EF4-FFF2-40B4-BE49-F238E27FC236}">
+                <a16:creationId xmlns:a16="http://schemas.microsoft.com/office/drawing/2014/main" id="{50466DC9-0244-4930-8556-3D9A97D4600A}"/>
               </a:ext>
             </a:extLst>
           </p:cNvPr>
@@ -6462,8 +5574,8 @@
         </p:nvSpPr>
         <p:spPr>
           <a:xfrm>
-            <a:off x="6614160" y="3429001"/>
-            <a:ext cx="1981200" cy="1409700"/>
+            <a:off x="876295" y="3620500"/>
+            <a:ext cx="1409700" cy="453628"/>
           </a:xfrm>
           <a:prstGeom prst="rect">
             <a:avLst/>
@@ -6504,17 +5616,17 @@
                   <a:schemeClr val="tx1"/>
                 </a:solidFill>
               </a:rPr>
-              <a:t>H05</a:t>
-            </a:r>
-          </a:p>
-        </p:txBody>
-      </p:sp>
-      <p:sp>
-        <p:nvSpPr>
-          <p:cNvPr id="49" name="Rectangle 48">
-            <a:extLst>
-              <a:ext uri="{FF2B5EF4-FFF2-40B4-BE49-F238E27FC236}">
-                <a16:creationId xmlns:a16="http://schemas.microsoft.com/office/drawing/2014/main" id="{94533DA4-BC12-4373-9791-379F85724E83}"/>
+              <a:t>…</a:t>
+            </a:r>
+          </a:p>
+        </p:txBody>
+      </p:sp>
+      <p:sp>
+        <p:nvSpPr>
+          <p:cNvPr id="55" name="Rectangle 54">
+            <a:extLst>
+              <a:ext uri="{FF2B5EF4-FFF2-40B4-BE49-F238E27FC236}">
+                <a16:creationId xmlns:a16="http://schemas.microsoft.com/office/drawing/2014/main" id="{C855EA14-E506-46B5-A805-04168B6ED65D}"/>
               </a:ext>
             </a:extLst>
           </p:cNvPr>
@@ -6523,8 +5635,8 @@
         </p:nvSpPr>
         <p:spPr>
           <a:xfrm>
-            <a:off x="6614160" y="4838700"/>
-            <a:ext cx="1981200" cy="1501139"/>
+            <a:off x="869353" y="4043288"/>
+            <a:ext cx="1409700" cy="453628"/>
           </a:xfrm>
           <a:prstGeom prst="rect">
             <a:avLst/>
@@ -6565,17 +5677,17 @@
                   <a:schemeClr val="tx1"/>
                 </a:solidFill>
               </a:rPr>
-              <a:t>H06</a:t>
-            </a:r>
-          </a:p>
-        </p:txBody>
-      </p:sp>
-      <p:sp>
-        <p:nvSpPr>
-          <p:cNvPr id="50" name="Rectangle 49">
-            <a:extLst>
-              <a:ext uri="{FF2B5EF4-FFF2-40B4-BE49-F238E27FC236}">
-                <a16:creationId xmlns:a16="http://schemas.microsoft.com/office/drawing/2014/main" id="{2210BB83-E6B6-4215-9D50-51FA435D2E9B}"/>
+              <a:t>…</a:t>
+            </a:r>
+          </a:p>
+        </p:txBody>
+      </p:sp>
+      <p:sp>
+        <p:nvSpPr>
+          <p:cNvPr id="56" name="Rectangle 55">
+            <a:extLst>
+              <a:ext uri="{FF2B5EF4-FFF2-40B4-BE49-F238E27FC236}">
+                <a16:creationId xmlns:a16="http://schemas.microsoft.com/office/drawing/2014/main" id="{F6A6C2AF-2ACD-4E65-8620-56B80A6B4DBF}"/>
               </a:ext>
             </a:extLst>
           </p:cNvPr>
@@ -6584,8 +5696,8 @@
         </p:nvSpPr>
         <p:spPr>
           <a:xfrm>
-            <a:off x="3108960" y="5486877"/>
-            <a:ext cx="1242060" cy="852962"/>
+            <a:off x="881212" y="4490656"/>
+            <a:ext cx="1409700" cy="453628"/>
           </a:xfrm>
           <a:prstGeom prst="rect">
             <a:avLst/>
@@ -6626,8 +5738,199 @@
                   <a:schemeClr val="tx1"/>
                 </a:solidFill>
               </a:rPr>
-              <a:t>Escalier</a:t>
-            </a:r>
+              <a:t>…</a:t>
+            </a:r>
+          </a:p>
+        </p:txBody>
+      </p:sp>
+      <p:sp>
+        <p:nvSpPr>
+          <p:cNvPr id="57" name="Rectangle 56">
+            <a:extLst>
+              <a:ext uri="{FF2B5EF4-FFF2-40B4-BE49-F238E27FC236}">
+                <a16:creationId xmlns:a16="http://schemas.microsoft.com/office/drawing/2014/main" id="{39DD5B73-30EF-4B70-8AB5-735737C24082}"/>
+              </a:ext>
+            </a:extLst>
+          </p:cNvPr>
+          <p:cNvSpPr/>
+          <p:nvPr/>
+        </p:nvSpPr>
+        <p:spPr>
+          <a:xfrm>
+            <a:off x="881217" y="4933110"/>
+            <a:ext cx="1409700" cy="453628"/>
+          </a:xfrm>
+          <a:prstGeom prst="rect">
+            <a:avLst/>
+          </a:prstGeom>
+          <a:solidFill>
+            <a:schemeClr val="bg1"/>
+          </a:solidFill>
+          <a:ln w="38100">
+            <a:solidFill>
+              <a:schemeClr val="tx1"/>
+            </a:solidFill>
+          </a:ln>
+        </p:spPr>
+        <p:style>
+          <a:lnRef idx="2">
+            <a:schemeClr val="accent1">
+              <a:shade val="50000"/>
+            </a:schemeClr>
+          </a:lnRef>
+          <a:fillRef idx="1">
+            <a:schemeClr val="accent1"/>
+          </a:fillRef>
+          <a:effectRef idx="0">
+            <a:schemeClr val="accent1"/>
+          </a:effectRef>
+          <a:fontRef idx="minor">
+            <a:schemeClr val="lt1"/>
+          </a:fontRef>
+        </p:style>
+        <p:txBody>
+          <a:bodyPr rtlCol="0" anchor="ctr"/>
+          <a:lstStyle/>
+          <a:p>
+            <a:pPr algn="ctr"/>
+            <a:r>
+              <a:rPr lang="fr-CH" dirty="0">
+                <a:solidFill>
+                  <a:schemeClr val="tx1"/>
+                </a:solidFill>
+              </a:rPr>
+              <a:t>…</a:t>
+            </a:r>
+          </a:p>
+        </p:txBody>
+      </p:sp>
+      <p:sp>
+        <p:nvSpPr>
+          <p:cNvPr id="58" name="Rectangle 57">
+            <a:extLst>
+              <a:ext uri="{FF2B5EF4-FFF2-40B4-BE49-F238E27FC236}">
+                <a16:creationId xmlns:a16="http://schemas.microsoft.com/office/drawing/2014/main" id="{60588FEB-4CD5-4065-825F-FBE62683B26F}"/>
+              </a:ext>
+            </a:extLst>
+          </p:cNvPr>
+          <p:cNvSpPr/>
+          <p:nvPr/>
+        </p:nvSpPr>
+        <p:spPr>
+          <a:xfrm>
+            <a:off x="886130" y="5380478"/>
+            <a:ext cx="1409700" cy="453628"/>
+          </a:xfrm>
+          <a:prstGeom prst="rect">
+            <a:avLst/>
+          </a:prstGeom>
+          <a:solidFill>
+            <a:schemeClr val="bg1"/>
+          </a:solidFill>
+          <a:ln w="38100">
+            <a:solidFill>
+              <a:schemeClr val="tx1"/>
+            </a:solidFill>
+          </a:ln>
+        </p:spPr>
+        <p:style>
+          <a:lnRef idx="2">
+            <a:schemeClr val="accent1">
+              <a:shade val="50000"/>
+            </a:schemeClr>
+          </a:lnRef>
+          <a:fillRef idx="1">
+            <a:schemeClr val="accent1"/>
+          </a:fillRef>
+          <a:effectRef idx="0">
+            <a:schemeClr val="accent1"/>
+          </a:effectRef>
+          <a:fontRef idx="minor">
+            <a:schemeClr val="lt1"/>
+          </a:fontRef>
+        </p:style>
+        <p:txBody>
+          <a:bodyPr rtlCol="0" anchor="ctr"/>
+          <a:lstStyle/>
+          <a:p>
+            <a:pPr algn="ctr"/>
+            <a:r>
+              <a:rPr lang="fr-CH" dirty="0">
+                <a:solidFill>
+                  <a:schemeClr val="tx1"/>
+                </a:solidFill>
+              </a:rPr>
+              <a:t>Étage2</a:t>
+            </a:r>
+          </a:p>
+        </p:txBody>
+      </p:sp>
+      <p:sp>
+        <p:nvSpPr>
+          <p:cNvPr id="59" name="Rectangle 58">
+            <a:extLst>
+              <a:ext uri="{FF2B5EF4-FFF2-40B4-BE49-F238E27FC236}">
+                <a16:creationId xmlns:a16="http://schemas.microsoft.com/office/drawing/2014/main" id="{CCBA0498-7B52-496F-9AF7-7FF7F213D327}"/>
+              </a:ext>
+            </a:extLst>
+          </p:cNvPr>
+          <p:cNvSpPr/>
+          <p:nvPr/>
+        </p:nvSpPr>
+        <p:spPr>
+          <a:xfrm>
+            <a:off x="876298" y="5861406"/>
+            <a:ext cx="1409700" cy="453628"/>
+          </a:xfrm>
+          <a:prstGeom prst="rect">
+            <a:avLst/>
+          </a:prstGeom>
+          <a:solidFill>
+            <a:schemeClr val="accent1">
+              <a:lumMod val="40000"/>
+              <a:lumOff val="60000"/>
+            </a:schemeClr>
+          </a:solidFill>
+          <a:ln w="38100">
+            <a:solidFill>
+              <a:schemeClr val="tx1"/>
+            </a:solidFill>
+          </a:ln>
+        </p:spPr>
+        <p:style>
+          <a:lnRef idx="2">
+            <a:schemeClr val="accent1">
+              <a:shade val="50000"/>
+            </a:schemeClr>
+          </a:lnRef>
+          <a:fillRef idx="1">
+            <a:schemeClr val="accent1"/>
+          </a:fillRef>
+          <a:effectRef idx="0">
+            <a:schemeClr val="accent1"/>
+          </a:effectRef>
+          <a:fontRef idx="minor">
+            <a:schemeClr val="lt1"/>
+          </a:fontRef>
+        </p:style>
+        <p:txBody>
+          <a:bodyPr rtlCol="0" anchor="ctr"/>
+          <a:lstStyle/>
+          <a:p>
+            <a:pPr algn="ctr"/>
+            <a:r>
+              <a:rPr lang="fr-CH" sz="1600" dirty="0">
+                <a:solidFill>
+                  <a:schemeClr val="tx1"/>
+                </a:solidFill>
+              </a:rPr>
+              <a:t>Étage1</a:t>
+            </a:r>
+            <a:endParaRPr lang="fr-CH" dirty="0">
+              <a:solidFill>
+                <a:schemeClr val="tx1"/>
+              </a:solidFill>
+            </a:endParaRPr>
           </a:p>
         </p:txBody>
       </p:sp>

</xml_diff>

<commit_message>
UPDATE : mockup with legends and color added
</commit_message>
<xml_diff>
--- a/MockupPRO.pptx
+++ b/MockupPRO.pptx
@@ -197,7 +197,7 @@
           <a:p>
             <a:fld id="{D376FD3C-033A-43C6-9494-8198EB2CEFF4}" type="datetimeFigureOut">
               <a:rPr lang="fr-CH" smtClean="0"/>
-              <a:t>06.03.2018</a:t>
+              <a:t>07.03.2018</a:t>
             </a:fld>
             <a:endParaRPr lang="fr-CH"/>
           </a:p>
@@ -614,7 +614,7 @@
           <a:p>
             <a:fld id="{D357FEA1-2930-4012-B0BA-BBD3DD8A8053}" type="datetimeFigureOut">
               <a:rPr lang="fr-CH" smtClean="0"/>
-              <a:t>06.03.2018</a:t>
+              <a:t>07.03.2018</a:t>
             </a:fld>
             <a:endParaRPr lang="fr-CH"/>
           </a:p>
@@ -814,7 +814,7 @@
           <a:p>
             <a:fld id="{D357FEA1-2930-4012-B0BA-BBD3DD8A8053}" type="datetimeFigureOut">
               <a:rPr lang="fr-CH" smtClean="0"/>
-              <a:t>06.03.2018</a:t>
+              <a:t>07.03.2018</a:t>
             </a:fld>
             <a:endParaRPr lang="fr-CH"/>
           </a:p>
@@ -1024,7 +1024,7 @@
           <a:p>
             <a:fld id="{D357FEA1-2930-4012-B0BA-BBD3DD8A8053}" type="datetimeFigureOut">
               <a:rPr lang="fr-CH" smtClean="0"/>
-              <a:t>06.03.2018</a:t>
+              <a:t>07.03.2018</a:t>
             </a:fld>
             <a:endParaRPr lang="fr-CH"/>
           </a:p>
@@ -1224,7 +1224,7 @@
           <a:p>
             <a:fld id="{D357FEA1-2930-4012-B0BA-BBD3DD8A8053}" type="datetimeFigureOut">
               <a:rPr lang="fr-CH" smtClean="0"/>
-              <a:t>06.03.2018</a:t>
+              <a:t>07.03.2018</a:t>
             </a:fld>
             <a:endParaRPr lang="fr-CH"/>
           </a:p>
@@ -1500,7 +1500,7 @@
           <a:p>
             <a:fld id="{D357FEA1-2930-4012-B0BA-BBD3DD8A8053}" type="datetimeFigureOut">
               <a:rPr lang="fr-CH" smtClean="0"/>
-              <a:t>06.03.2018</a:t>
+              <a:t>07.03.2018</a:t>
             </a:fld>
             <a:endParaRPr lang="fr-CH"/>
           </a:p>
@@ -1768,7 +1768,7 @@
           <a:p>
             <a:fld id="{D357FEA1-2930-4012-B0BA-BBD3DD8A8053}" type="datetimeFigureOut">
               <a:rPr lang="fr-CH" smtClean="0"/>
-              <a:t>06.03.2018</a:t>
+              <a:t>07.03.2018</a:t>
             </a:fld>
             <a:endParaRPr lang="fr-CH"/>
           </a:p>
@@ -2183,7 +2183,7 @@
           <a:p>
             <a:fld id="{D357FEA1-2930-4012-B0BA-BBD3DD8A8053}" type="datetimeFigureOut">
               <a:rPr lang="fr-CH" smtClean="0"/>
-              <a:t>06.03.2018</a:t>
+              <a:t>07.03.2018</a:t>
             </a:fld>
             <a:endParaRPr lang="fr-CH"/>
           </a:p>
@@ -2325,7 +2325,7 @@
           <a:p>
             <a:fld id="{D357FEA1-2930-4012-B0BA-BBD3DD8A8053}" type="datetimeFigureOut">
               <a:rPr lang="fr-CH" smtClean="0"/>
-              <a:t>06.03.2018</a:t>
+              <a:t>07.03.2018</a:t>
             </a:fld>
             <a:endParaRPr lang="fr-CH"/>
           </a:p>
@@ -2438,7 +2438,7 @@
           <a:p>
             <a:fld id="{D357FEA1-2930-4012-B0BA-BBD3DD8A8053}" type="datetimeFigureOut">
               <a:rPr lang="fr-CH" smtClean="0"/>
-              <a:t>06.03.2018</a:t>
+              <a:t>07.03.2018</a:t>
             </a:fld>
             <a:endParaRPr lang="fr-CH"/>
           </a:p>
@@ -2751,7 +2751,7 @@
           <a:p>
             <a:fld id="{D357FEA1-2930-4012-B0BA-BBD3DD8A8053}" type="datetimeFigureOut">
               <a:rPr lang="fr-CH" smtClean="0"/>
-              <a:t>06.03.2018</a:t>
+              <a:t>07.03.2018</a:t>
             </a:fld>
             <a:endParaRPr lang="fr-CH"/>
           </a:p>
@@ -3040,7 +3040,7 @@
           <a:p>
             <a:fld id="{D357FEA1-2930-4012-B0BA-BBD3DD8A8053}" type="datetimeFigureOut">
               <a:rPr lang="fr-CH" smtClean="0"/>
-              <a:t>06.03.2018</a:t>
+              <a:t>07.03.2018</a:t>
             </a:fld>
             <a:endParaRPr lang="fr-CH"/>
           </a:p>
@@ -3283,7 +3283,7 @@
           <a:p>
             <a:fld id="{D357FEA1-2930-4012-B0BA-BBD3DD8A8053}" type="datetimeFigureOut">
               <a:rPr lang="fr-CH" smtClean="0"/>
-              <a:t>06.03.2018</a:t>
+              <a:t>07.03.2018</a:t>
             </a:fld>
             <a:endParaRPr lang="fr-CH"/>
           </a:p>
@@ -3702,10 +3702,10 @@
       </p:grpSpPr>
       <p:grpSp>
         <p:nvGrpSpPr>
-          <p:cNvPr id="14" name="Groupe 13">
+          <p:cNvPr id="6" name="Groupe 5">
             <a:extLst>
               <a:ext uri="{FF2B5EF4-FFF2-40B4-BE49-F238E27FC236}">
-                <a16:creationId xmlns:a16="http://schemas.microsoft.com/office/drawing/2014/main" id="{865F36D7-33A2-45CC-856A-7D1D1F9B1218}"/>
+                <a16:creationId xmlns:a16="http://schemas.microsoft.com/office/drawing/2014/main" id="{B3C7695A-8390-4548-BF47-1A7B1CF80906}"/>
               </a:ext>
             </a:extLst>
           </p:cNvPr>
@@ -3714,76 +3714,18 @@
         </p:nvGrpSpPr>
         <p:grpSpPr>
           <a:xfrm>
-            <a:off x="876300" y="594360"/>
-            <a:ext cx="10690860" cy="5745480"/>
-            <a:chOff x="876300" y="594360"/>
-            <a:chExt cx="10690860" cy="5745480"/>
+            <a:off x="833632" y="157318"/>
+            <a:ext cx="10876587" cy="5515896"/>
+            <a:chOff x="1305581" y="946698"/>
+            <a:chExt cx="10697807" cy="5756672"/>
           </a:xfrm>
         </p:grpSpPr>
-        <p:sp>
-          <p:nvSpPr>
-            <p:cNvPr id="5" name="Rectangle 4">
+        <p:grpSp>
+          <p:nvGrpSpPr>
+            <p:cNvPr id="14" name="Groupe 13">
               <a:extLst>
                 <a:ext uri="{FF2B5EF4-FFF2-40B4-BE49-F238E27FC236}">
-                  <a16:creationId xmlns:a16="http://schemas.microsoft.com/office/drawing/2014/main" id="{590B0BBB-D0F4-4B0B-9146-6E66ACD19DC9}"/>
-                </a:ext>
-              </a:extLst>
-            </p:cNvPr>
-            <p:cNvSpPr/>
-            <p:nvPr/>
-          </p:nvSpPr>
-          <p:spPr>
-            <a:xfrm>
-              <a:off x="876300" y="594360"/>
-              <a:ext cx="10690860" cy="5745480"/>
-            </a:xfrm>
-            <a:prstGeom prst="rect">
-              <a:avLst/>
-            </a:prstGeom>
-            <a:solidFill>
-              <a:schemeClr val="bg1"/>
-            </a:solidFill>
-            <a:ln w="38100">
-              <a:solidFill>
-                <a:schemeClr val="tx1"/>
-              </a:solidFill>
-            </a:ln>
-          </p:spPr>
-          <p:style>
-            <a:lnRef idx="2">
-              <a:schemeClr val="accent1">
-                <a:shade val="50000"/>
-              </a:schemeClr>
-            </a:lnRef>
-            <a:fillRef idx="1">
-              <a:schemeClr val="accent1"/>
-            </a:fillRef>
-            <a:effectRef idx="0">
-              <a:schemeClr val="accent1"/>
-            </a:effectRef>
-            <a:fontRef idx="minor">
-              <a:schemeClr val="lt1"/>
-            </a:fontRef>
-          </p:style>
-          <p:txBody>
-            <a:bodyPr rtlCol="0" anchor="ctr"/>
-            <a:lstStyle/>
-            <a:p>
-              <a:pPr algn="ctr"/>
-              <a:endParaRPr lang="fr-CH" dirty="0">
-                <a:solidFill>
-                  <a:schemeClr val="tx1"/>
-                </a:solidFill>
-              </a:endParaRPr>
-            </a:p>
-          </p:txBody>
-        </p:sp>
-        <p:grpSp>
-          <p:nvGrpSpPr>
-            <p:cNvPr id="12" name="Groupe 11">
-              <a:extLst>
-                <a:ext uri="{FF2B5EF4-FFF2-40B4-BE49-F238E27FC236}">
-                  <a16:creationId xmlns:a16="http://schemas.microsoft.com/office/drawing/2014/main" id="{374A4E02-987A-42E8-A88A-5EAAE9DDECCD}"/>
+                  <a16:creationId xmlns:a16="http://schemas.microsoft.com/office/drawing/2014/main" id="{865F36D7-33A2-45CC-856A-7D1D1F9B1218}"/>
                 </a:ext>
               </a:extLst>
             </p:cNvPr>
@@ -3792,18 +3734,18 @@
           </p:nvGrpSpPr>
           <p:grpSpPr>
             <a:xfrm>
-              <a:off x="10401300" y="594360"/>
-              <a:ext cx="1165860" cy="381000"/>
-              <a:chOff x="10401300" y="594360"/>
-              <a:chExt cx="1165860" cy="381000"/>
+              <a:off x="1312528" y="946698"/>
+              <a:ext cx="10690860" cy="5745480"/>
+              <a:chOff x="876300" y="594360"/>
+              <a:chExt cx="10690860" cy="5745480"/>
             </a:xfrm>
           </p:grpSpPr>
           <p:sp>
             <p:nvSpPr>
-              <p:cNvPr id="9" name="Rectangle 8">
+              <p:cNvPr id="5" name="Rectangle 4">
                 <a:extLst>
                   <a:ext uri="{FF2B5EF4-FFF2-40B4-BE49-F238E27FC236}">
-                    <a16:creationId xmlns:a16="http://schemas.microsoft.com/office/drawing/2014/main" id="{3D65F1BE-ED3B-4494-8CD5-8147C63CCA16}"/>
+                    <a16:creationId xmlns:a16="http://schemas.microsoft.com/office/drawing/2014/main" id="{590B0BBB-D0F4-4B0B-9146-6E66ACD19DC9}"/>
                   </a:ext>
                 </a:extLst>
               </p:cNvPr>
@@ -3812,8 +3754,8 @@
             </p:nvSpPr>
             <p:spPr>
               <a:xfrm>
-                <a:off x="11178540" y="594360"/>
-                <a:ext cx="388620" cy="381000"/>
+                <a:off x="876300" y="594360"/>
+                <a:ext cx="10690860" cy="5745480"/>
               </a:xfrm>
               <a:prstGeom prst="rect">
                 <a:avLst/>
@@ -3848,501 +3790,225 @@
               <a:lstStyle/>
               <a:p>
                 <a:pPr algn="ctr"/>
-                <a:r>
-                  <a:rPr lang="fr-CH" dirty="0">
-                    <a:solidFill>
-                      <a:schemeClr val="tx1"/>
-                    </a:solidFill>
-                  </a:rPr>
-                  <a:t>x</a:t>
-                </a:r>
+                <a:endParaRPr lang="fr-CH" dirty="0">
+                  <a:solidFill>
+                    <a:schemeClr val="tx1"/>
+                  </a:solidFill>
+                </a:endParaRPr>
               </a:p>
             </p:txBody>
           </p:sp>
-          <p:sp>
-            <p:nvSpPr>
-              <p:cNvPr id="10" name="Rectangle 9">
+          <p:grpSp>
+            <p:nvGrpSpPr>
+              <p:cNvPr id="12" name="Groupe 11">
                 <a:extLst>
                   <a:ext uri="{FF2B5EF4-FFF2-40B4-BE49-F238E27FC236}">
-                    <a16:creationId xmlns:a16="http://schemas.microsoft.com/office/drawing/2014/main" id="{D56CFD0D-4A8E-4A3B-8E08-2C810487B944}"/>
+                    <a16:creationId xmlns:a16="http://schemas.microsoft.com/office/drawing/2014/main" id="{374A4E02-987A-42E8-A88A-5EAAE9DDECCD}"/>
                   </a:ext>
                 </a:extLst>
               </p:cNvPr>
-              <p:cNvSpPr/>
+              <p:cNvGrpSpPr/>
               <p:nvPr/>
-            </p:nvSpPr>
-            <p:spPr>
-              <a:xfrm>
-                <a:off x="10789920" y="594360"/>
-                <a:ext cx="388620" cy="381000"/>
-              </a:xfrm>
-              <a:prstGeom prst="rect">
-                <a:avLst/>
-              </a:prstGeom>
-              <a:solidFill>
-                <a:schemeClr val="bg1"/>
-              </a:solidFill>
-              <a:ln w="38100">
-                <a:solidFill>
-                  <a:schemeClr val="tx1"/>
-                </a:solidFill>
-              </a:ln>
-            </p:spPr>
-            <p:style>
-              <a:lnRef idx="2">
-                <a:schemeClr val="accent1">
-                  <a:shade val="50000"/>
-                </a:schemeClr>
-              </a:lnRef>
-              <a:fillRef idx="1">
-                <a:schemeClr val="accent1"/>
-              </a:fillRef>
-              <a:effectRef idx="0">
-                <a:schemeClr val="accent1"/>
-              </a:effectRef>
-              <a:fontRef idx="minor">
-                <a:schemeClr val="lt1"/>
-              </a:fontRef>
-            </p:style>
-            <p:txBody>
-              <a:bodyPr rtlCol="0" anchor="ctr"/>
-              <a:lstStyle/>
-              <a:p>
-                <a:pPr algn="ctr"/>
-                <a:r>
-                  <a:rPr lang="fr-CH" b="1" dirty="0">
-                    <a:solidFill>
-                      <a:schemeClr val="tx1"/>
-                    </a:solidFill>
-                  </a:rPr>
-                  <a:t>□</a:t>
-                </a:r>
-              </a:p>
-            </p:txBody>
-          </p:sp>
-          <p:sp>
-            <p:nvSpPr>
-              <p:cNvPr id="11" name="Rectangle 10">
-                <a:extLst>
-                  <a:ext uri="{FF2B5EF4-FFF2-40B4-BE49-F238E27FC236}">
-                    <a16:creationId xmlns:a16="http://schemas.microsoft.com/office/drawing/2014/main" id="{A8985AF4-305D-4D73-957E-500B3241C2A2}"/>
-                  </a:ext>
-                </a:extLst>
-              </p:cNvPr>
-              <p:cNvSpPr/>
-              <p:nvPr/>
-            </p:nvSpPr>
-            <p:spPr>
+            </p:nvGrpSpPr>
+            <p:grpSpPr>
               <a:xfrm>
                 <a:off x="10401300" y="594360"/>
-                <a:ext cx="388620" cy="381000"/>
+                <a:ext cx="1165860" cy="381000"/>
+                <a:chOff x="10401300" y="594360"/>
+                <a:chExt cx="1165860" cy="381000"/>
               </a:xfrm>
-              <a:prstGeom prst="rect">
-                <a:avLst/>
-              </a:prstGeom>
-              <a:solidFill>
-                <a:schemeClr val="bg1"/>
-              </a:solidFill>
-              <a:ln w="38100">
+            </p:grpSpPr>
+            <p:sp>
+              <p:nvSpPr>
+                <p:cNvPr id="9" name="Rectangle 8">
+                  <a:extLst>
+                    <a:ext uri="{FF2B5EF4-FFF2-40B4-BE49-F238E27FC236}">
+                      <a16:creationId xmlns:a16="http://schemas.microsoft.com/office/drawing/2014/main" id="{3D65F1BE-ED3B-4494-8CD5-8147C63CCA16}"/>
+                    </a:ext>
+                  </a:extLst>
+                </p:cNvPr>
+                <p:cNvSpPr/>
+                <p:nvPr/>
+              </p:nvSpPr>
+              <p:spPr>
+                <a:xfrm>
+                  <a:off x="11178540" y="594360"/>
+                  <a:ext cx="388620" cy="381000"/>
+                </a:xfrm>
+                <a:prstGeom prst="rect">
+                  <a:avLst/>
+                </a:prstGeom>
                 <a:solidFill>
-                  <a:schemeClr val="tx1"/>
+                  <a:schemeClr val="bg1"/>
                 </a:solidFill>
-              </a:ln>
-            </p:spPr>
-            <p:style>
-              <a:lnRef idx="2">
-                <a:schemeClr val="accent1">
-                  <a:shade val="50000"/>
-                </a:schemeClr>
-              </a:lnRef>
-              <a:fillRef idx="1">
-                <a:schemeClr val="accent1"/>
-              </a:fillRef>
-              <a:effectRef idx="0">
-                <a:schemeClr val="accent1"/>
-              </a:effectRef>
-              <a:fontRef idx="minor">
-                <a:schemeClr val="lt1"/>
-              </a:fontRef>
-            </p:style>
-            <p:txBody>
-              <a:bodyPr rtlCol="0" anchor="ctr"/>
-              <a:lstStyle/>
-              <a:p>
-                <a:pPr algn="ctr"/>
-                <a:r>
-                  <a:rPr lang="fr-CH" dirty="0">
-                    <a:solidFill>
-                      <a:schemeClr val="tx1"/>
-                    </a:solidFill>
-                  </a:rPr>
-                  <a:t>-</a:t>
-                </a:r>
-              </a:p>
-            </p:txBody>
-          </p:sp>
+                <a:ln w="38100">
+                  <a:solidFill>
+                    <a:schemeClr val="tx1"/>
+                  </a:solidFill>
+                </a:ln>
+              </p:spPr>
+              <p:style>
+                <a:lnRef idx="2">
+                  <a:schemeClr val="accent1">
+                    <a:shade val="50000"/>
+                  </a:schemeClr>
+                </a:lnRef>
+                <a:fillRef idx="1">
+                  <a:schemeClr val="accent1"/>
+                </a:fillRef>
+                <a:effectRef idx="0">
+                  <a:schemeClr val="accent1"/>
+                </a:effectRef>
+                <a:fontRef idx="minor">
+                  <a:schemeClr val="lt1"/>
+                </a:fontRef>
+              </p:style>
+              <p:txBody>
+                <a:bodyPr rtlCol="0" anchor="ctr"/>
+                <a:lstStyle/>
+                <a:p>
+                  <a:pPr algn="ctr"/>
+                  <a:r>
+                    <a:rPr lang="fr-CH" dirty="0">
+                      <a:solidFill>
+                        <a:schemeClr val="tx1"/>
+                      </a:solidFill>
+                    </a:rPr>
+                    <a:t>x</a:t>
+                  </a:r>
+                </a:p>
+              </p:txBody>
+            </p:sp>
+            <p:sp>
+              <p:nvSpPr>
+                <p:cNvPr id="10" name="Rectangle 9">
+                  <a:extLst>
+                    <a:ext uri="{FF2B5EF4-FFF2-40B4-BE49-F238E27FC236}">
+                      <a16:creationId xmlns:a16="http://schemas.microsoft.com/office/drawing/2014/main" id="{D56CFD0D-4A8E-4A3B-8E08-2C810487B944}"/>
+                    </a:ext>
+                  </a:extLst>
+                </p:cNvPr>
+                <p:cNvSpPr/>
+                <p:nvPr/>
+              </p:nvSpPr>
+              <p:spPr>
+                <a:xfrm>
+                  <a:off x="10789920" y="594360"/>
+                  <a:ext cx="388620" cy="381000"/>
+                </a:xfrm>
+                <a:prstGeom prst="rect">
+                  <a:avLst/>
+                </a:prstGeom>
+                <a:solidFill>
+                  <a:schemeClr val="bg1"/>
+                </a:solidFill>
+                <a:ln w="38100">
+                  <a:solidFill>
+                    <a:schemeClr val="tx1"/>
+                  </a:solidFill>
+                </a:ln>
+              </p:spPr>
+              <p:style>
+                <a:lnRef idx="2">
+                  <a:schemeClr val="accent1">
+                    <a:shade val="50000"/>
+                  </a:schemeClr>
+                </a:lnRef>
+                <a:fillRef idx="1">
+                  <a:schemeClr val="accent1"/>
+                </a:fillRef>
+                <a:effectRef idx="0">
+                  <a:schemeClr val="accent1"/>
+                </a:effectRef>
+                <a:fontRef idx="minor">
+                  <a:schemeClr val="lt1"/>
+                </a:fontRef>
+              </p:style>
+              <p:txBody>
+                <a:bodyPr rtlCol="0" anchor="ctr"/>
+                <a:lstStyle/>
+                <a:p>
+                  <a:pPr algn="ctr"/>
+                  <a:r>
+                    <a:rPr lang="fr-CH" b="1" dirty="0">
+                      <a:solidFill>
+                        <a:schemeClr val="tx1"/>
+                      </a:solidFill>
+                    </a:rPr>
+                    <a:t>□</a:t>
+                  </a:r>
+                </a:p>
+              </p:txBody>
+            </p:sp>
+            <p:sp>
+              <p:nvSpPr>
+                <p:cNvPr id="11" name="Rectangle 10">
+                  <a:extLst>
+                    <a:ext uri="{FF2B5EF4-FFF2-40B4-BE49-F238E27FC236}">
+                      <a16:creationId xmlns:a16="http://schemas.microsoft.com/office/drawing/2014/main" id="{A8985AF4-305D-4D73-957E-500B3241C2A2}"/>
+                    </a:ext>
+                  </a:extLst>
+                </p:cNvPr>
+                <p:cNvSpPr/>
+                <p:nvPr/>
+              </p:nvSpPr>
+              <p:spPr>
+                <a:xfrm>
+                  <a:off x="10401300" y="594360"/>
+                  <a:ext cx="388620" cy="381000"/>
+                </a:xfrm>
+                <a:prstGeom prst="rect">
+                  <a:avLst/>
+                </a:prstGeom>
+                <a:solidFill>
+                  <a:schemeClr val="bg1"/>
+                </a:solidFill>
+                <a:ln w="38100">
+                  <a:solidFill>
+                    <a:schemeClr val="tx1"/>
+                  </a:solidFill>
+                </a:ln>
+              </p:spPr>
+              <p:style>
+                <a:lnRef idx="2">
+                  <a:schemeClr val="accent1">
+                    <a:shade val="50000"/>
+                  </a:schemeClr>
+                </a:lnRef>
+                <a:fillRef idx="1">
+                  <a:schemeClr val="accent1"/>
+                </a:fillRef>
+                <a:effectRef idx="0">
+                  <a:schemeClr val="accent1"/>
+                </a:effectRef>
+                <a:fontRef idx="minor">
+                  <a:schemeClr val="lt1"/>
+                </a:fontRef>
+              </p:style>
+              <p:txBody>
+                <a:bodyPr rtlCol="0" anchor="ctr"/>
+                <a:lstStyle/>
+                <a:p>
+                  <a:pPr algn="ctr"/>
+                  <a:r>
+                    <a:rPr lang="fr-CH" dirty="0">
+                      <a:solidFill>
+                        <a:schemeClr val="tx1"/>
+                      </a:solidFill>
+                    </a:rPr>
+                    <a:t>-</a:t>
+                  </a:r>
+                </a:p>
+              </p:txBody>
+            </p:sp>
+          </p:grpSp>
         </p:grpSp>
-      </p:grpSp>
-      <p:sp>
-        <p:nvSpPr>
-          <p:cNvPr id="13" name="Rectangle 12">
-            <a:extLst>
-              <a:ext uri="{FF2B5EF4-FFF2-40B4-BE49-F238E27FC236}">
-                <a16:creationId xmlns:a16="http://schemas.microsoft.com/office/drawing/2014/main" id="{6B6DF9ED-ECFD-4CCB-A306-1D31FE808A47}"/>
-              </a:ext>
-            </a:extLst>
-          </p:cNvPr>
-          <p:cNvSpPr/>
-          <p:nvPr/>
-        </p:nvSpPr>
-        <p:spPr>
-          <a:xfrm>
-            <a:off x="876300" y="975360"/>
-            <a:ext cx="10690860" cy="5364480"/>
-          </a:xfrm>
-          <a:prstGeom prst="rect">
-            <a:avLst/>
-          </a:prstGeom>
-          <a:solidFill>
-            <a:schemeClr val="bg1"/>
-          </a:solidFill>
-          <a:ln w="38100">
-            <a:solidFill>
-              <a:schemeClr val="tx1"/>
-            </a:solidFill>
-          </a:ln>
-        </p:spPr>
-        <p:style>
-          <a:lnRef idx="2">
-            <a:schemeClr val="accent1">
-              <a:shade val="50000"/>
-            </a:schemeClr>
-          </a:lnRef>
-          <a:fillRef idx="1">
-            <a:schemeClr val="accent1"/>
-          </a:fillRef>
-          <a:effectRef idx="0">
-            <a:schemeClr val="accent1"/>
-          </a:effectRef>
-          <a:fontRef idx="minor">
-            <a:schemeClr val="lt1"/>
-          </a:fontRef>
-        </p:style>
-        <p:txBody>
-          <a:bodyPr rtlCol="0" anchor="ctr"/>
-          <a:lstStyle/>
-          <a:p>
-            <a:pPr algn="ctr"/>
-            <a:endParaRPr lang="fr-CH" dirty="0">
-              <a:solidFill>
-                <a:schemeClr val="tx1"/>
-              </a:solidFill>
-            </a:endParaRPr>
-          </a:p>
-        </p:txBody>
-      </p:sp>
-      <p:sp>
-        <p:nvSpPr>
-          <p:cNvPr id="15" name="ZoneTexte 14">
-            <a:extLst>
-              <a:ext uri="{FF2B5EF4-FFF2-40B4-BE49-F238E27FC236}">
-                <a16:creationId xmlns:a16="http://schemas.microsoft.com/office/drawing/2014/main" id="{EFF18D46-A1FE-41DA-B740-2151864ECA4B}"/>
-              </a:ext>
-            </a:extLst>
-          </p:cNvPr>
-          <p:cNvSpPr txBox="1"/>
-          <p:nvPr/>
-        </p:nvSpPr>
-        <p:spPr>
-          <a:xfrm>
-            <a:off x="1013460" y="606028"/>
-            <a:ext cx="1783080" cy="369332"/>
-          </a:xfrm>
-          <a:prstGeom prst="rect">
-            <a:avLst/>
-          </a:prstGeom>
-          <a:noFill/>
-        </p:spPr>
-        <p:txBody>
-          <a:bodyPr wrap="square" rtlCol="0">
-            <a:spAutoFit/>
-          </a:bodyPr>
-          <a:lstStyle/>
-          <a:p>
-            <a:r>
-              <a:rPr lang="fr-CH" dirty="0"/>
-              <a:t>Titre programme</a:t>
-            </a:r>
-          </a:p>
-        </p:txBody>
-      </p:sp>
-      <p:sp>
-        <p:nvSpPr>
-          <p:cNvPr id="17" name="Rectangle 16">
-            <a:extLst>
-              <a:ext uri="{FF2B5EF4-FFF2-40B4-BE49-F238E27FC236}">
-                <a16:creationId xmlns:a16="http://schemas.microsoft.com/office/drawing/2014/main" id="{8A9515FE-A58F-47A0-909F-9C10BB16FBFC}"/>
-              </a:ext>
-            </a:extLst>
-          </p:cNvPr>
-          <p:cNvSpPr/>
-          <p:nvPr/>
-        </p:nvSpPr>
-        <p:spPr>
-          <a:xfrm>
-            <a:off x="8595360" y="986552"/>
-            <a:ext cx="2971800" cy="5353288"/>
-          </a:xfrm>
-          <a:prstGeom prst="rect">
-            <a:avLst/>
-          </a:prstGeom>
-          <a:solidFill>
-            <a:schemeClr val="bg1"/>
-          </a:solidFill>
-          <a:ln w="38100">
-            <a:solidFill>
-              <a:schemeClr val="tx1"/>
-            </a:solidFill>
-          </a:ln>
-        </p:spPr>
-        <p:style>
-          <a:lnRef idx="2">
-            <a:schemeClr val="accent1">
-              <a:shade val="50000"/>
-            </a:schemeClr>
-          </a:lnRef>
-          <a:fillRef idx="1">
-            <a:schemeClr val="accent1"/>
-          </a:fillRef>
-          <a:effectRef idx="0">
-            <a:schemeClr val="accent1"/>
-          </a:effectRef>
-          <a:fontRef idx="minor">
-            <a:schemeClr val="lt1"/>
-          </a:fontRef>
-        </p:style>
-        <p:txBody>
-          <a:bodyPr rtlCol="0" anchor="ctr"/>
-          <a:lstStyle/>
-          <a:p>
-            <a:pPr algn="ctr"/>
-            <a:endParaRPr lang="fr-CH" dirty="0">
-              <a:solidFill>
-                <a:schemeClr val="tx1"/>
-              </a:solidFill>
-            </a:endParaRPr>
-          </a:p>
-        </p:txBody>
-      </p:sp>
-      <p:sp>
-        <p:nvSpPr>
-          <p:cNvPr id="21" name="Rectangle 20">
-            <a:extLst>
-              <a:ext uri="{FF2B5EF4-FFF2-40B4-BE49-F238E27FC236}">
-                <a16:creationId xmlns:a16="http://schemas.microsoft.com/office/drawing/2014/main" id="{4A8C177F-B1BC-4CC3-89E9-E2EC6C950B4E}"/>
-              </a:ext>
-            </a:extLst>
-          </p:cNvPr>
-          <p:cNvSpPr/>
-          <p:nvPr/>
-        </p:nvSpPr>
-        <p:spPr>
-          <a:xfrm>
-            <a:off x="876300" y="986552"/>
-            <a:ext cx="1409700" cy="381000"/>
-          </a:xfrm>
-          <a:prstGeom prst="rect">
-            <a:avLst/>
-          </a:prstGeom>
-          <a:solidFill>
-            <a:schemeClr val="bg1"/>
-          </a:solidFill>
-          <a:ln w="38100">
-            <a:solidFill>
-              <a:schemeClr val="tx1"/>
-            </a:solidFill>
-          </a:ln>
-        </p:spPr>
-        <p:style>
-          <a:lnRef idx="2">
-            <a:schemeClr val="accent1">
-              <a:shade val="50000"/>
-            </a:schemeClr>
-          </a:lnRef>
-          <a:fillRef idx="1">
-            <a:schemeClr val="accent1"/>
-          </a:fillRef>
-          <a:effectRef idx="0">
-            <a:schemeClr val="accent1"/>
-          </a:effectRef>
-          <a:fontRef idx="minor">
-            <a:schemeClr val="lt1"/>
-          </a:fontRef>
-        </p:style>
-        <p:txBody>
-          <a:bodyPr rtlCol="0" anchor="ctr"/>
-          <a:lstStyle/>
-          <a:p>
-            <a:pPr algn="ctr"/>
-            <a:r>
-              <a:rPr lang="fr-CH" b="1" dirty="0">
-                <a:solidFill>
-                  <a:schemeClr val="tx1"/>
-                </a:solidFill>
-              </a:rPr>
-              <a:t>Cheseaux</a:t>
-            </a:r>
-          </a:p>
-        </p:txBody>
-      </p:sp>
-      <p:sp>
-        <p:nvSpPr>
-          <p:cNvPr id="22" name="Rectangle 21">
-            <a:extLst>
-              <a:ext uri="{FF2B5EF4-FFF2-40B4-BE49-F238E27FC236}">
-                <a16:creationId xmlns:a16="http://schemas.microsoft.com/office/drawing/2014/main" id="{87923A7E-F05A-4DA8-B17B-0E8AC60F1BE5}"/>
-              </a:ext>
-            </a:extLst>
-          </p:cNvPr>
-          <p:cNvSpPr/>
-          <p:nvPr/>
-        </p:nvSpPr>
-        <p:spPr>
-          <a:xfrm>
-            <a:off x="2286000" y="986552"/>
-            <a:ext cx="1409700" cy="381000"/>
-          </a:xfrm>
-          <a:prstGeom prst="rect">
-            <a:avLst/>
-          </a:prstGeom>
-          <a:solidFill>
-            <a:schemeClr val="bg1"/>
-          </a:solidFill>
-          <a:ln w="38100">
-            <a:solidFill>
-              <a:schemeClr val="tx1"/>
-            </a:solidFill>
-          </a:ln>
-        </p:spPr>
-        <p:style>
-          <a:lnRef idx="2">
-            <a:schemeClr val="accent1">
-              <a:shade val="50000"/>
-            </a:schemeClr>
-          </a:lnRef>
-          <a:fillRef idx="1">
-            <a:schemeClr val="accent1"/>
-          </a:fillRef>
-          <a:effectRef idx="0">
-            <a:schemeClr val="accent1"/>
-          </a:effectRef>
-          <a:fontRef idx="minor">
-            <a:schemeClr val="lt1"/>
-          </a:fontRef>
-        </p:style>
-        <p:txBody>
-          <a:bodyPr rtlCol="0" anchor="ctr"/>
-          <a:lstStyle/>
-          <a:p>
-            <a:pPr algn="ctr"/>
-            <a:r>
-              <a:rPr lang="fr-CH" b="1" dirty="0">
-                <a:solidFill>
-                  <a:schemeClr val="tx1"/>
-                </a:solidFill>
-              </a:rPr>
-              <a:t>Saint-Roch</a:t>
-            </a:r>
-          </a:p>
-        </p:txBody>
-      </p:sp>
-      <p:sp>
-        <p:nvSpPr>
-          <p:cNvPr id="23" name="Rectangle 22">
-            <a:extLst>
-              <a:ext uri="{FF2B5EF4-FFF2-40B4-BE49-F238E27FC236}">
-                <a16:creationId xmlns:a16="http://schemas.microsoft.com/office/drawing/2014/main" id="{369B2824-F532-45F4-AA2C-61D6F673CA9D}"/>
-              </a:ext>
-            </a:extLst>
-          </p:cNvPr>
-          <p:cNvSpPr/>
-          <p:nvPr/>
-        </p:nvSpPr>
-        <p:spPr>
-          <a:xfrm>
-            <a:off x="8595360" y="986552"/>
-            <a:ext cx="2971800" cy="381000"/>
-          </a:xfrm>
-          <a:prstGeom prst="rect">
-            <a:avLst/>
-          </a:prstGeom>
-          <a:solidFill>
-            <a:schemeClr val="bg1"/>
-          </a:solidFill>
-          <a:ln w="38100">
-            <a:solidFill>
-              <a:schemeClr val="tx1"/>
-            </a:solidFill>
-          </a:ln>
-        </p:spPr>
-        <p:style>
-          <a:lnRef idx="2">
-            <a:schemeClr val="accent1">
-              <a:shade val="50000"/>
-            </a:schemeClr>
-          </a:lnRef>
-          <a:fillRef idx="1">
-            <a:schemeClr val="accent1"/>
-          </a:fillRef>
-          <a:effectRef idx="0">
-            <a:schemeClr val="accent1"/>
-          </a:effectRef>
-          <a:fontRef idx="minor">
-            <a:schemeClr val="lt1"/>
-          </a:fontRef>
-        </p:style>
-        <p:txBody>
-          <a:bodyPr rtlCol="0" anchor="ctr"/>
-          <a:lstStyle/>
-          <a:p>
-            <a:pPr algn="ctr"/>
-            <a:r>
-              <a:rPr lang="fr-CH" b="1" dirty="0">
-                <a:solidFill>
-                  <a:schemeClr val="tx1"/>
-                </a:solidFill>
-              </a:rPr>
-              <a:t>Filtres/Conditions</a:t>
-            </a:r>
-          </a:p>
-        </p:txBody>
-      </p:sp>
-      <p:grpSp>
-        <p:nvGrpSpPr>
-          <p:cNvPr id="35" name="Groupe 34">
-            <a:extLst>
-              <a:ext uri="{FF2B5EF4-FFF2-40B4-BE49-F238E27FC236}">
-                <a16:creationId xmlns:a16="http://schemas.microsoft.com/office/drawing/2014/main" id="{569729D3-DCB3-40FA-B52F-203EC1121D70}"/>
-              </a:ext>
-            </a:extLst>
-          </p:cNvPr>
-          <p:cNvGrpSpPr/>
-          <p:nvPr/>
-        </p:nvGrpSpPr>
-        <p:grpSpPr>
-          <a:xfrm>
-            <a:off x="8862060" y="2402920"/>
-            <a:ext cx="2118360" cy="369332"/>
-            <a:chOff x="8862060" y="2402920"/>
-            <a:chExt cx="2118360" cy="369332"/>
-          </a:xfrm>
-        </p:grpSpPr>
         <p:sp>
           <p:nvSpPr>
-            <p:cNvPr id="31" name="Rectangle 30">
+            <p:cNvPr id="13" name="Rectangle 12">
               <a:extLst>
                 <a:ext uri="{FF2B5EF4-FFF2-40B4-BE49-F238E27FC236}">
-                  <a16:creationId xmlns:a16="http://schemas.microsoft.com/office/drawing/2014/main" id="{8E282E94-A873-4742-8358-EFA6AEDB3958}"/>
+                  <a16:creationId xmlns:a16="http://schemas.microsoft.com/office/drawing/2014/main" id="{6B6DF9ED-ECFD-4CCB-A306-1D31FE808A47}"/>
                 </a:ext>
               </a:extLst>
             </p:cNvPr>
@@ -4351,242 +4017,8 @@
           </p:nvSpPr>
           <p:spPr>
             <a:xfrm>
-              <a:off x="8862060" y="2438400"/>
-              <a:ext cx="281940" cy="273844"/>
-            </a:xfrm>
-            <a:prstGeom prst="rect">
-              <a:avLst/>
-            </a:prstGeom>
-            <a:solidFill>
-              <a:schemeClr val="bg1"/>
-            </a:solidFill>
-            <a:ln w="38100">
-              <a:solidFill>
-                <a:schemeClr val="tx1"/>
-              </a:solidFill>
-            </a:ln>
-          </p:spPr>
-          <p:style>
-            <a:lnRef idx="2">
-              <a:schemeClr val="accent1">
-                <a:shade val="50000"/>
-              </a:schemeClr>
-            </a:lnRef>
-            <a:fillRef idx="1">
-              <a:schemeClr val="accent1"/>
-            </a:fillRef>
-            <a:effectRef idx="0">
-              <a:schemeClr val="accent1"/>
-            </a:effectRef>
-            <a:fontRef idx="minor">
-              <a:schemeClr val="lt1"/>
-            </a:fontRef>
-          </p:style>
-          <p:txBody>
-            <a:bodyPr rtlCol="0" anchor="ctr"/>
-            <a:lstStyle/>
-            <a:p>
-              <a:pPr algn="ctr"/>
-              <a:r>
-                <a:rPr lang="fr-CH" dirty="0">
-                  <a:solidFill>
-                    <a:schemeClr val="tx1"/>
-                  </a:solidFill>
-                </a:rPr>
-                <a:t>X</a:t>
-              </a:r>
-            </a:p>
-          </p:txBody>
-        </p:sp>
-        <p:sp>
-          <p:nvSpPr>
-            <p:cNvPr id="34" name="ZoneTexte 33">
-              <a:extLst>
-                <a:ext uri="{FF2B5EF4-FFF2-40B4-BE49-F238E27FC236}">
-                  <a16:creationId xmlns:a16="http://schemas.microsoft.com/office/drawing/2014/main" id="{1AD1A590-0CD7-4AC8-8E11-BE182461EAEE}"/>
-                </a:ext>
-              </a:extLst>
-            </p:cNvPr>
-            <p:cNvSpPr txBox="1"/>
-            <p:nvPr/>
-          </p:nvSpPr>
-          <p:spPr>
-            <a:xfrm>
-              <a:off x="9311640" y="2402920"/>
-              <a:ext cx="1668780" cy="369332"/>
-            </a:xfrm>
-            <a:prstGeom prst="rect">
-              <a:avLst/>
-            </a:prstGeom>
-            <a:noFill/>
-          </p:spPr>
-          <p:txBody>
-            <a:bodyPr wrap="square" rtlCol="0">
-              <a:spAutoFit/>
-            </a:bodyPr>
-            <a:lstStyle/>
-            <a:p>
-              <a:r>
-                <a:rPr lang="fr-CH" dirty="0"/>
-                <a:t>Projecteur</a:t>
-              </a:r>
-            </a:p>
-          </p:txBody>
-        </p:sp>
-      </p:grpSp>
-      <p:grpSp>
-        <p:nvGrpSpPr>
-          <p:cNvPr id="36" name="Groupe 35">
-            <a:extLst>
-              <a:ext uri="{FF2B5EF4-FFF2-40B4-BE49-F238E27FC236}">
-                <a16:creationId xmlns:a16="http://schemas.microsoft.com/office/drawing/2014/main" id="{AAD3CDB4-E977-46C6-9DAE-83E69378DCA2}"/>
-              </a:ext>
-            </a:extLst>
-          </p:cNvPr>
-          <p:cNvGrpSpPr/>
-          <p:nvPr/>
-        </p:nvGrpSpPr>
-        <p:grpSpPr>
-          <a:xfrm>
-            <a:off x="8862060" y="3500914"/>
-            <a:ext cx="2118360" cy="369332"/>
-            <a:chOff x="8862060" y="2402920"/>
-            <a:chExt cx="2118360" cy="369332"/>
-          </a:xfrm>
-        </p:grpSpPr>
-        <p:sp>
-          <p:nvSpPr>
-            <p:cNvPr id="37" name="Rectangle 36">
-              <a:extLst>
-                <a:ext uri="{FF2B5EF4-FFF2-40B4-BE49-F238E27FC236}">
-                  <a16:creationId xmlns:a16="http://schemas.microsoft.com/office/drawing/2014/main" id="{63276C52-DCDC-4F18-BB10-B1CF2F7E1ADE}"/>
-                </a:ext>
-              </a:extLst>
-            </p:cNvPr>
-            <p:cNvSpPr/>
-            <p:nvPr/>
-          </p:nvSpPr>
-          <p:spPr>
-            <a:xfrm>
-              <a:off x="8862060" y="2438400"/>
-              <a:ext cx="281940" cy="273844"/>
-            </a:xfrm>
-            <a:prstGeom prst="rect">
-              <a:avLst/>
-            </a:prstGeom>
-            <a:solidFill>
-              <a:schemeClr val="bg1"/>
-            </a:solidFill>
-            <a:ln w="38100">
-              <a:solidFill>
-                <a:schemeClr val="tx1"/>
-              </a:solidFill>
-            </a:ln>
-          </p:spPr>
-          <p:style>
-            <a:lnRef idx="2">
-              <a:schemeClr val="accent1">
-                <a:shade val="50000"/>
-              </a:schemeClr>
-            </a:lnRef>
-            <a:fillRef idx="1">
-              <a:schemeClr val="accent1"/>
-            </a:fillRef>
-            <a:effectRef idx="0">
-              <a:schemeClr val="accent1"/>
-            </a:effectRef>
-            <a:fontRef idx="minor">
-              <a:schemeClr val="lt1"/>
-            </a:fontRef>
-          </p:style>
-          <p:txBody>
-            <a:bodyPr rtlCol="0" anchor="ctr"/>
-            <a:lstStyle/>
-            <a:p>
-              <a:pPr algn="ctr"/>
-              <a:r>
-                <a:rPr lang="fr-CH" dirty="0">
-                  <a:solidFill>
-                    <a:schemeClr val="tx1"/>
-                  </a:solidFill>
-                </a:rPr>
-                <a:t>X</a:t>
-              </a:r>
-            </a:p>
-          </p:txBody>
-        </p:sp>
-        <p:sp>
-          <p:nvSpPr>
-            <p:cNvPr id="38" name="ZoneTexte 37">
-              <a:extLst>
-                <a:ext uri="{FF2B5EF4-FFF2-40B4-BE49-F238E27FC236}">
-                  <a16:creationId xmlns:a16="http://schemas.microsoft.com/office/drawing/2014/main" id="{72B81FA5-3668-4359-BC8E-748464962080}"/>
-                </a:ext>
-              </a:extLst>
-            </p:cNvPr>
-            <p:cNvSpPr txBox="1"/>
-            <p:nvPr/>
-          </p:nvSpPr>
-          <p:spPr>
-            <a:xfrm>
-              <a:off x="9311640" y="2402920"/>
-              <a:ext cx="1668780" cy="369332"/>
-            </a:xfrm>
-            <a:prstGeom prst="rect">
-              <a:avLst/>
-            </a:prstGeom>
-            <a:noFill/>
-          </p:spPr>
-          <p:txBody>
-            <a:bodyPr wrap="square" rtlCol="0">
-              <a:spAutoFit/>
-            </a:bodyPr>
-            <a:lstStyle/>
-            <a:p>
-              <a:r>
-                <a:rPr lang="fr-CH" dirty="0"/>
-                <a:t>Toilettes à prox.</a:t>
-              </a:r>
-            </a:p>
-          </p:txBody>
-        </p:sp>
-      </p:grpSp>
-      <p:grpSp>
-        <p:nvGrpSpPr>
-          <p:cNvPr id="39" name="Groupe 38">
-            <a:extLst>
-              <a:ext uri="{FF2B5EF4-FFF2-40B4-BE49-F238E27FC236}">
-                <a16:creationId xmlns:a16="http://schemas.microsoft.com/office/drawing/2014/main" id="{F32BC244-E134-4B0D-A957-740B734AAC94}"/>
-              </a:ext>
-            </a:extLst>
-          </p:cNvPr>
-          <p:cNvGrpSpPr/>
-          <p:nvPr/>
-        </p:nvGrpSpPr>
-        <p:grpSpPr>
-          <a:xfrm>
-            <a:off x="8862060" y="2951917"/>
-            <a:ext cx="2453640" cy="646331"/>
-            <a:chOff x="8862060" y="2402920"/>
-            <a:chExt cx="2118360" cy="646331"/>
-          </a:xfrm>
-        </p:grpSpPr>
-        <p:sp>
-          <p:nvSpPr>
-            <p:cNvPr id="40" name="Rectangle 39">
-              <a:extLst>
-                <a:ext uri="{FF2B5EF4-FFF2-40B4-BE49-F238E27FC236}">
-                  <a16:creationId xmlns:a16="http://schemas.microsoft.com/office/drawing/2014/main" id="{640DE51C-8F51-44E5-B20B-2D90A2C32985}"/>
-                </a:ext>
-              </a:extLst>
-            </p:cNvPr>
-            <p:cNvSpPr/>
-            <p:nvPr/>
-          </p:nvSpPr>
-          <p:spPr>
-            <a:xfrm>
-              <a:off x="8862060" y="2438400"/>
-              <a:ext cx="232481" cy="273844"/>
+              <a:off x="1312528" y="1327698"/>
+              <a:ext cx="10690860" cy="5364480"/>
             </a:xfrm>
             <a:prstGeom prst="rect">
               <a:avLst/>
@@ -4631,10 +4063,10 @@
         </p:sp>
         <p:sp>
           <p:nvSpPr>
-            <p:cNvPr id="41" name="ZoneTexte 40">
+            <p:cNvPr id="15" name="ZoneTexte 14">
               <a:extLst>
                 <a:ext uri="{FF2B5EF4-FFF2-40B4-BE49-F238E27FC236}">
-                  <a16:creationId xmlns:a16="http://schemas.microsoft.com/office/drawing/2014/main" id="{510E7742-F24B-47D7-A736-4FBE9CFCB7C7}"/>
+                  <a16:creationId xmlns:a16="http://schemas.microsoft.com/office/drawing/2014/main" id="{EFF18D46-A1FE-41DA-B740-2151864ECA4B}"/>
                 </a:ext>
               </a:extLst>
             </p:cNvPr>
@@ -4643,8 +4075,8 @@
           </p:nvSpPr>
           <p:spPr>
             <a:xfrm>
-              <a:off x="9311640" y="2402920"/>
-              <a:ext cx="1668780" cy="646331"/>
+              <a:off x="1449688" y="958366"/>
+              <a:ext cx="1783080" cy="369332"/>
             </a:xfrm>
             <a:prstGeom prst="rect">
               <a:avLst/>
@@ -4659,38 +4091,17 @@
             <a:p>
               <a:r>
                 <a:rPr lang="fr-CH" dirty="0"/>
-                <a:t>Prises électriques</a:t>
+                <a:t>Titre programme</a:t>
               </a:r>
             </a:p>
           </p:txBody>
         </p:sp>
-      </p:grpSp>
-      <p:grpSp>
-        <p:nvGrpSpPr>
-          <p:cNvPr id="2" name="Groupe 1">
-            <a:extLst>
-              <a:ext uri="{FF2B5EF4-FFF2-40B4-BE49-F238E27FC236}">
-                <a16:creationId xmlns:a16="http://schemas.microsoft.com/office/drawing/2014/main" id="{ED6CEE56-F5E6-4C48-8196-30A51AE33B81}"/>
-              </a:ext>
-            </a:extLst>
-          </p:cNvPr>
-          <p:cNvGrpSpPr/>
-          <p:nvPr/>
-        </p:nvGrpSpPr>
-        <p:grpSpPr>
-          <a:xfrm>
-            <a:off x="2286000" y="1355884"/>
-            <a:ext cx="6309360" cy="4995148"/>
-            <a:chOff x="876300" y="1355884"/>
-            <a:chExt cx="7719060" cy="4995148"/>
-          </a:xfrm>
-        </p:grpSpPr>
         <p:sp>
           <p:nvSpPr>
-            <p:cNvPr id="16" name="Rectangle 15">
+            <p:cNvPr id="17" name="Rectangle 16">
               <a:extLst>
                 <a:ext uri="{FF2B5EF4-FFF2-40B4-BE49-F238E27FC236}">
-                  <a16:creationId xmlns:a16="http://schemas.microsoft.com/office/drawing/2014/main" id="{D81E555B-4F56-4DF3-BE33-01E7C5B6E0B9}"/>
+                  <a16:creationId xmlns:a16="http://schemas.microsoft.com/office/drawing/2014/main" id="{8A9515FE-A58F-47A0-909F-9C10BB16FBFC}"/>
                 </a:ext>
               </a:extLst>
             </p:cNvPr>
@@ -4699,8 +4110,8 @@
           </p:nvSpPr>
           <p:spPr>
             <a:xfrm>
-              <a:off x="876300" y="1357670"/>
-              <a:ext cx="7719060" cy="4983956"/>
+              <a:off x="9031588" y="1338890"/>
+              <a:ext cx="2971800" cy="5353288"/>
             </a:xfrm>
             <a:prstGeom prst="rect">
               <a:avLst/>
@@ -4745,10 +4156,10 @@
         </p:sp>
         <p:sp>
           <p:nvSpPr>
-            <p:cNvPr id="32" name="Rectangle 31">
+            <p:cNvPr id="21" name="Rectangle 20">
               <a:extLst>
                 <a:ext uri="{FF2B5EF4-FFF2-40B4-BE49-F238E27FC236}">
-                  <a16:creationId xmlns:a16="http://schemas.microsoft.com/office/drawing/2014/main" id="{3379A290-B93C-4943-B15C-B21BF11A0764}"/>
+                  <a16:creationId xmlns:a16="http://schemas.microsoft.com/office/drawing/2014/main" id="{4A8C177F-B1BC-4CC3-89E9-E2EC6C950B4E}"/>
                 </a:ext>
               </a:extLst>
             </p:cNvPr>
@@ -4757,8 +4168,1186 @@
           </p:nvSpPr>
           <p:spPr>
             <a:xfrm>
-              <a:off x="876300" y="4396740"/>
-              <a:ext cx="1508760" cy="1954292"/>
+              <a:off x="1312528" y="1338890"/>
+              <a:ext cx="1409700" cy="381000"/>
+            </a:xfrm>
+            <a:prstGeom prst="rect">
+              <a:avLst/>
+            </a:prstGeom>
+            <a:solidFill>
+              <a:schemeClr val="accent5">
+                <a:lumMod val="40000"/>
+                <a:lumOff val="60000"/>
+              </a:schemeClr>
+            </a:solidFill>
+            <a:ln w="38100">
+              <a:solidFill>
+                <a:schemeClr val="tx1"/>
+              </a:solidFill>
+            </a:ln>
+          </p:spPr>
+          <p:style>
+            <a:lnRef idx="2">
+              <a:schemeClr val="accent1">
+                <a:shade val="50000"/>
+              </a:schemeClr>
+            </a:lnRef>
+            <a:fillRef idx="1">
+              <a:schemeClr val="accent1"/>
+            </a:fillRef>
+            <a:effectRef idx="0">
+              <a:schemeClr val="accent1"/>
+            </a:effectRef>
+            <a:fontRef idx="minor">
+              <a:schemeClr val="lt1"/>
+            </a:fontRef>
+          </p:style>
+          <p:txBody>
+            <a:bodyPr rtlCol="0" anchor="ctr"/>
+            <a:lstStyle/>
+            <a:p>
+              <a:pPr algn="ctr"/>
+              <a:r>
+                <a:rPr lang="fr-CH" b="1" dirty="0">
+                  <a:solidFill>
+                    <a:schemeClr val="tx1"/>
+                  </a:solidFill>
+                </a:rPr>
+                <a:t>Cheseaux</a:t>
+              </a:r>
+            </a:p>
+          </p:txBody>
+        </p:sp>
+        <p:sp>
+          <p:nvSpPr>
+            <p:cNvPr id="22" name="Rectangle 21">
+              <a:extLst>
+                <a:ext uri="{FF2B5EF4-FFF2-40B4-BE49-F238E27FC236}">
+                  <a16:creationId xmlns:a16="http://schemas.microsoft.com/office/drawing/2014/main" id="{87923A7E-F05A-4DA8-B17B-0E8AC60F1BE5}"/>
+                </a:ext>
+              </a:extLst>
+            </p:cNvPr>
+            <p:cNvSpPr/>
+            <p:nvPr/>
+          </p:nvSpPr>
+          <p:spPr>
+            <a:xfrm>
+              <a:off x="2722228" y="1338890"/>
+              <a:ext cx="1409700" cy="381000"/>
+            </a:xfrm>
+            <a:prstGeom prst="rect">
+              <a:avLst/>
+            </a:prstGeom>
+            <a:solidFill>
+              <a:schemeClr val="bg1"/>
+            </a:solidFill>
+            <a:ln w="38100">
+              <a:solidFill>
+                <a:schemeClr val="tx1"/>
+              </a:solidFill>
+            </a:ln>
+          </p:spPr>
+          <p:style>
+            <a:lnRef idx="2">
+              <a:schemeClr val="accent1">
+                <a:shade val="50000"/>
+              </a:schemeClr>
+            </a:lnRef>
+            <a:fillRef idx="1">
+              <a:schemeClr val="accent1"/>
+            </a:fillRef>
+            <a:effectRef idx="0">
+              <a:schemeClr val="accent1"/>
+            </a:effectRef>
+            <a:fontRef idx="minor">
+              <a:schemeClr val="lt1"/>
+            </a:fontRef>
+          </p:style>
+          <p:txBody>
+            <a:bodyPr rtlCol="0" anchor="ctr"/>
+            <a:lstStyle/>
+            <a:p>
+              <a:pPr algn="ctr"/>
+              <a:r>
+                <a:rPr lang="fr-CH" b="1" dirty="0">
+                  <a:solidFill>
+                    <a:schemeClr val="tx1"/>
+                  </a:solidFill>
+                </a:rPr>
+                <a:t>Saint-Roch</a:t>
+              </a:r>
+            </a:p>
+          </p:txBody>
+        </p:sp>
+        <p:sp>
+          <p:nvSpPr>
+            <p:cNvPr id="23" name="Rectangle 22">
+              <a:extLst>
+                <a:ext uri="{FF2B5EF4-FFF2-40B4-BE49-F238E27FC236}">
+                  <a16:creationId xmlns:a16="http://schemas.microsoft.com/office/drawing/2014/main" id="{369B2824-F532-45F4-AA2C-61D6F673CA9D}"/>
+                </a:ext>
+              </a:extLst>
+            </p:cNvPr>
+            <p:cNvSpPr/>
+            <p:nvPr/>
+          </p:nvSpPr>
+          <p:spPr>
+            <a:xfrm>
+              <a:off x="9031588" y="1338890"/>
+              <a:ext cx="2971800" cy="381000"/>
+            </a:xfrm>
+            <a:prstGeom prst="rect">
+              <a:avLst/>
+            </a:prstGeom>
+            <a:solidFill>
+              <a:schemeClr val="bg1"/>
+            </a:solidFill>
+            <a:ln w="38100">
+              <a:solidFill>
+                <a:schemeClr val="tx1"/>
+              </a:solidFill>
+            </a:ln>
+          </p:spPr>
+          <p:style>
+            <a:lnRef idx="2">
+              <a:schemeClr val="accent1">
+                <a:shade val="50000"/>
+              </a:schemeClr>
+            </a:lnRef>
+            <a:fillRef idx="1">
+              <a:schemeClr val="accent1"/>
+            </a:fillRef>
+            <a:effectRef idx="0">
+              <a:schemeClr val="accent1"/>
+            </a:effectRef>
+            <a:fontRef idx="minor">
+              <a:schemeClr val="lt1"/>
+            </a:fontRef>
+          </p:style>
+          <p:txBody>
+            <a:bodyPr rtlCol="0" anchor="ctr"/>
+            <a:lstStyle/>
+            <a:p>
+              <a:pPr algn="ctr"/>
+              <a:r>
+                <a:rPr lang="fr-CH" b="1" dirty="0">
+                  <a:solidFill>
+                    <a:schemeClr val="tx1"/>
+                  </a:solidFill>
+                </a:rPr>
+                <a:t>Filtres/Conditions</a:t>
+              </a:r>
+            </a:p>
+          </p:txBody>
+        </p:sp>
+        <p:grpSp>
+          <p:nvGrpSpPr>
+            <p:cNvPr id="35" name="Groupe 34">
+              <a:extLst>
+                <a:ext uri="{FF2B5EF4-FFF2-40B4-BE49-F238E27FC236}">
+                  <a16:creationId xmlns:a16="http://schemas.microsoft.com/office/drawing/2014/main" id="{569729D3-DCB3-40FA-B52F-203EC1121D70}"/>
+                </a:ext>
+              </a:extLst>
+            </p:cNvPr>
+            <p:cNvGrpSpPr/>
+            <p:nvPr/>
+          </p:nvGrpSpPr>
+          <p:grpSpPr>
+            <a:xfrm>
+              <a:off x="9298288" y="2790738"/>
+              <a:ext cx="1730528" cy="329748"/>
+              <a:chOff x="8862060" y="2438400"/>
+              <a:chExt cx="1730528" cy="329748"/>
+            </a:xfrm>
+          </p:grpSpPr>
+          <p:sp>
+            <p:nvSpPr>
+              <p:cNvPr id="31" name="Rectangle 30">
+                <a:extLst>
+                  <a:ext uri="{FF2B5EF4-FFF2-40B4-BE49-F238E27FC236}">
+                    <a16:creationId xmlns:a16="http://schemas.microsoft.com/office/drawing/2014/main" id="{8E282E94-A873-4742-8358-EFA6AEDB3958}"/>
+                  </a:ext>
+                </a:extLst>
+              </p:cNvPr>
+              <p:cNvSpPr/>
+              <p:nvPr/>
+            </p:nvSpPr>
+            <p:spPr>
+              <a:xfrm>
+                <a:off x="8862060" y="2438400"/>
+                <a:ext cx="281940" cy="273844"/>
+              </a:xfrm>
+              <a:prstGeom prst="rect">
+                <a:avLst/>
+              </a:prstGeom>
+              <a:solidFill>
+                <a:schemeClr val="bg1"/>
+              </a:solidFill>
+              <a:ln w="38100">
+                <a:solidFill>
+                  <a:schemeClr val="tx1"/>
+                </a:solidFill>
+              </a:ln>
+            </p:spPr>
+            <p:style>
+              <a:lnRef idx="2">
+                <a:schemeClr val="accent1">
+                  <a:shade val="50000"/>
+                </a:schemeClr>
+              </a:lnRef>
+              <a:fillRef idx="1">
+                <a:schemeClr val="accent1"/>
+              </a:fillRef>
+              <a:effectRef idx="0">
+                <a:schemeClr val="accent1"/>
+              </a:effectRef>
+              <a:fontRef idx="minor">
+                <a:schemeClr val="lt1"/>
+              </a:fontRef>
+            </p:style>
+            <p:txBody>
+              <a:bodyPr rtlCol="0" anchor="ctr"/>
+              <a:lstStyle/>
+              <a:p>
+                <a:pPr algn="ctr"/>
+                <a:r>
+                  <a:rPr lang="fr-CH" dirty="0">
+                    <a:solidFill>
+                      <a:schemeClr val="tx1"/>
+                    </a:solidFill>
+                  </a:rPr>
+                  <a:t>X</a:t>
+                </a:r>
+              </a:p>
+            </p:txBody>
+          </p:sp>
+          <p:sp>
+            <p:nvSpPr>
+              <p:cNvPr id="34" name="ZoneTexte 33">
+                <a:extLst>
+                  <a:ext uri="{FF2B5EF4-FFF2-40B4-BE49-F238E27FC236}">
+                    <a16:creationId xmlns:a16="http://schemas.microsoft.com/office/drawing/2014/main" id="{1AD1A590-0CD7-4AC8-8E11-BE182461EAEE}"/>
+                  </a:ext>
+                </a:extLst>
+              </p:cNvPr>
+              <p:cNvSpPr txBox="1"/>
+              <p:nvPr/>
+            </p:nvSpPr>
+            <p:spPr>
+              <a:xfrm>
+                <a:off x="9311639" y="2438401"/>
+                <a:ext cx="1280949" cy="329747"/>
+              </a:xfrm>
+              <a:prstGeom prst="rect">
+                <a:avLst/>
+              </a:prstGeom>
+              <a:noFill/>
+            </p:spPr>
+            <p:txBody>
+              <a:bodyPr wrap="square" rtlCol="0">
+                <a:spAutoFit/>
+              </a:bodyPr>
+              <a:lstStyle/>
+              <a:p>
+                <a:r>
+                  <a:rPr lang="fr-CH" dirty="0"/>
+                  <a:t>Projecteur</a:t>
+                </a:r>
+              </a:p>
+            </p:txBody>
+          </p:sp>
+        </p:grpSp>
+        <p:grpSp>
+          <p:nvGrpSpPr>
+            <p:cNvPr id="36" name="Groupe 35">
+              <a:extLst>
+                <a:ext uri="{FF2B5EF4-FFF2-40B4-BE49-F238E27FC236}">
+                  <a16:creationId xmlns:a16="http://schemas.microsoft.com/office/drawing/2014/main" id="{AAD3CDB4-E977-46C6-9DAE-83E69378DCA2}"/>
+                </a:ext>
+              </a:extLst>
+            </p:cNvPr>
+            <p:cNvGrpSpPr/>
+            <p:nvPr/>
+          </p:nvGrpSpPr>
+          <p:grpSpPr>
+            <a:xfrm>
+              <a:off x="9298288" y="3853252"/>
+              <a:ext cx="2118360" cy="369332"/>
+              <a:chOff x="8862060" y="2402920"/>
+              <a:chExt cx="2118360" cy="369332"/>
+            </a:xfrm>
+          </p:grpSpPr>
+          <p:sp>
+            <p:nvSpPr>
+              <p:cNvPr id="37" name="Rectangle 36">
+                <a:extLst>
+                  <a:ext uri="{FF2B5EF4-FFF2-40B4-BE49-F238E27FC236}">
+                    <a16:creationId xmlns:a16="http://schemas.microsoft.com/office/drawing/2014/main" id="{63276C52-DCDC-4F18-BB10-B1CF2F7E1ADE}"/>
+                  </a:ext>
+                </a:extLst>
+              </p:cNvPr>
+              <p:cNvSpPr/>
+              <p:nvPr/>
+            </p:nvSpPr>
+            <p:spPr>
+              <a:xfrm>
+                <a:off x="8862060" y="2438400"/>
+                <a:ext cx="281940" cy="273844"/>
+              </a:xfrm>
+              <a:prstGeom prst="rect">
+                <a:avLst/>
+              </a:prstGeom>
+              <a:solidFill>
+                <a:schemeClr val="bg1"/>
+              </a:solidFill>
+              <a:ln w="38100">
+                <a:solidFill>
+                  <a:schemeClr val="tx1"/>
+                </a:solidFill>
+              </a:ln>
+            </p:spPr>
+            <p:style>
+              <a:lnRef idx="2">
+                <a:schemeClr val="accent1">
+                  <a:shade val="50000"/>
+                </a:schemeClr>
+              </a:lnRef>
+              <a:fillRef idx="1">
+                <a:schemeClr val="accent1"/>
+              </a:fillRef>
+              <a:effectRef idx="0">
+                <a:schemeClr val="accent1"/>
+              </a:effectRef>
+              <a:fontRef idx="minor">
+                <a:schemeClr val="lt1"/>
+              </a:fontRef>
+            </p:style>
+            <p:txBody>
+              <a:bodyPr rtlCol="0" anchor="ctr"/>
+              <a:lstStyle/>
+              <a:p>
+                <a:pPr algn="ctr"/>
+                <a:r>
+                  <a:rPr lang="fr-CH" dirty="0">
+                    <a:solidFill>
+                      <a:schemeClr val="tx1"/>
+                    </a:solidFill>
+                  </a:rPr>
+                  <a:t>X</a:t>
+                </a:r>
+              </a:p>
+            </p:txBody>
+          </p:sp>
+          <p:sp>
+            <p:nvSpPr>
+              <p:cNvPr id="38" name="ZoneTexte 37">
+                <a:extLst>
+                  <a:ext uri="{FF2B5EF4-FFF2-40B4-BE49-F238E27FC236}">
+                    <a16:creationId xmlns:a16="http://schemas.microsoft.com/office/drawing/2014/main" id="{72B81FA5-3668-4359-BC8E-748464962080}"/>
+                  </a:ext>
+                </a:extLst>
+              </p:cNvPr>
+              <p:cNvSpPr txBox="1"/>
+              <p:nvPr/>
+            </p:nvSpPr>
+            <p:spPr>
+              <a:xfrm>
+                <a:off x="9311640" y="2402920"/>
+                <a:ext cx="1668780" cy="369332"/>
+              </a:xfrm>
+              <a:prstGeom prst="rect">
+                <a:avLst/>
+              </a:prstGeom>
+              <a:noFill/>
+            </p:spPr>
+            <p:txBody>
+              <a:bodyPr wrap="square" rtlCol="0">
+                <a:spAutoFit/>
+              </a:bodyPr>
+              <a:lstStyle/>
+              <a:p>
+                <a:r>
+                  <a:rPr lang="fr-CH" dirty="0"/>
+                  <a:t>Toilettes à prox.</a:t>
+                </a:r>
+              </a:p>
+            </p:txBody>
+          </p:sp>
+        </p:grpSp>
+        <p:grpSp>
+          <p:nvGrpSpPr>
+            <p:cNvPr id="39" name="Groupe 38">
+              <a:extLst>
+                <a:ext uri="{FF2B5EF4-FFF2-40B4-BE49-F238E27FC236}">
+                  <a16:creationId xmlns:a16="http://schemas.microsoft.com/office/drawing/2014/main" id="{F32BC244-E134-4B0D-A957-740B734AAC94}"/>
+                </a:ext>
+              </a:extLst>
+            </p:cNvPr>
+            <p:cNvGrpSpPr/>
+            <p:nvPr/>
+          </p:nvGrpSpPr>
+          <p:grpSpPr>
+            <a:xfrm>
+              <a:off x="9298287" y="3329047"/>
+              <a:ext cx="2267855" cy="329747"/>
+              <a:chOff x="8862060" y="2427712"/>
+              <a:chExt cx="1957962" cy="329747"/>
+            </a:xfrm>
+          </p:grpSpPr>
+          <p:sp>
+            <p:nvSpPr>
+              <p:cNvPr id="40" name="Rectangle 39">
+                <a:extLst>
+                  <a:ext uri="{FF2B5EF4-FFF2-40B4-BE49-F238E27FC236}">
+                    <a16:creationId xmlns:a16="http://schemas.microsoft.com/office/drawing/2014/main" id="{640DE51C-8F51-44E5-B20B-2D90A2C32985}"/>
+                  </a:ext>
+                </a:extLst>
+              </p:cNvPr>
+              <p:cNvSpPr/>
+              <p:nvPr/>
+            </p:nvSpPr>
+            <p:spPr>
+              <a:xfrm>
+                <a:off x="8862060" y="2438400"/>
+                <a:ext cx="232481" cy="273844"/>
+              </a:xfrm>
+              <a:prstGeom prst="rect">
+                <a:avLst/>
+              </a:prstGeom>
+              <a:solidFill>
+                <a:schemeClr val="bg1"/>
+              </a:solidFill>
+              <a:ln w="38100">
+                <a:solidFill>
+                  <a:schemeClr val="tx1"/>
+                </a:solidFill>
+              </a:ln>
+            </p:spPr>
+            <p:style>
+              <a:lnRef idx="2">
+                <a:schemeClr val="accent1">
+                  <a:shade val="50000"/>
+                </a:schemeClr>
+              </a:lnRef>
+              <a:fillRef idx="1">
+                <a:schemeClr val="accent1"/>
+              </a:fillRef>
+              <a:effectRef idx="0">
+                <a:schemeClr val="accent1"/>
+              </a:effectRef>
+              <a:fontRef idx="minor">
+                <a:schemeClr val="lt1"/>
+              </a:fontRef>
+            </p:style>
+            <p:txBody>
+              <a:bodyPr rtlCol="0" anchor="ctr"/>
+              <a:lstStyle/>
+              <a:p>
+                <a:pPr algn="ctr"/>
+                <a:endParaRPr lang="fr-CH" dirty="0">
+                  <a:solidFill>
+                    <a:schemeClr val="tx1"/>
+                  </a:solidFill>
+                </a:endParaRPr>
+              </a:p>
+            </p:txBody>
+          </p:sp>
+          <p:sp>
+            <p:nvSpPr>
+              <p:cNvPr id="41" name="ZoneTexte 40">
+                <a:extLst>
+                  <a:ext uri="{FF2B5EF4-FFF2-40B4-BE49-F238E27FC236}">
+                    <a16:creationId xmlns:a16="http://schemas.microsoft.com/office/drawing/2014/main" id="{510E7742-F24B-47D7-A736-4FBE9CFCB7C7}"/>
+                  </a:ext>
+                </a:extLst>
+              </p:cNvPr>
+              <p:cNvSpPr txBox="1"/>
+              <p:nvPr/>
+            </p:nvSpPr>
+            <p:spPr>
+              <a:xfrm>
+                <a:off x="9250206" y="2427712"/>
+                <a:ext cx="1569816" cy="329747"/>
+              </a:xfrm>
+              <a:prstGeom prst="rect">
+                <a:avLst/>
+              </a:prstGeom>
+              <a:noFill/>
+            </p:spPr>
+            <p:txBody>
+              <a:bodyPr wrap="square" rtlCol="0">
+                <a:spAutoFit/>
+              </a:bodyPr>
+              <a:lstStyle/>
+              <a:p>
+                <a:r>
+                  <a:rPr lang="fr-CH" dirty="0"/>
+                  <a:t>Prises électriques</a:t>
+                </a:r>
+              </a:p>
+            </p:txBody>
+          </p:sp>
+        </p:grpSp>
+        <p:grpSp>
+          <p:nvGrpSpPr>
+            <p:cNvPr id="2" name="Groupe 1">
+              <a:extLst>
+                <a:ext uri="{FF2B5EF4-FFF2-40B4-BE49-F238E27FC236}">
+                  <a16:creationId xmlns:a16="http://schemas.microsoft.com/office/drawing/2014/main" id="{ED6CEE56-F5E6-4C48-8196-30A51AE33B81}"/>
+                </a:ext>
+              </a:extLst>
+            </p:cNvPr>
+            <p:cNvGrpSpPr/>
+            <p:nvPr/>
+          </p:nvGrpSpPr>
+          <p:grpSpPr>
+            <a:xfrm>
+              <a:off x="2722228" y="1708222"/>
+              <a:ext cx="6309360" cy="4995148"/>
+              <a:chOff x="876300" y="1355884"/>
+              <a:chExt cx="7719060" cy="4995148"/>
+            </a:xfrm>
+          </p:grpSpPr>
+          <p:sp>
+            <p:nvSpPr>
+              <p:cNvPr id="16" name="Rectangle 15">
+                <a:extLst>
+                  <a:ext uri="{FF2B5EF4-FFF2-40B4-BE49-F238E27FC236}">
+                    <a16:creationId xmlns:a16="http://schemas.microsoft.com/office/drawing/2014/main" id="{D81E555B-4F56-4DF3-BE33-01E7C5B6E0B9}"/>
+                  </a:ext>
+                </a:extLst>
+              </p:cNvPr>
+              <p:cNvSpPr/>
+              <p:nvPr/>
+            </p:nvSpPr>
+            <p:spPr>
+              <a:xfrm>
+                <a:off x="876300" y="1357670"/>
+                <a:ext cx="7719060" cy="4983956"/>
+              </a:xfrm>
+              <a:prstGeom prst="rect">
+                <a:avLst/>
+              </a:prstGeom>
+              <a:solidFill>
+                <a:schemeClr val="bg1"/>
+              </a:solidFill>
+              <a:ln w="38100">
+                <a:solidFill>
+                  <a:schemeClr val="tx1"/>
+                </a:solidFill>
+              </a:ln>
+            </p:spPr>
+            <p:style>
+              <a:lnRef idx="2">
+                <a:schemeClr val="accent1">
+                  <a:shade val="50000"/>
+                </a:schemeClr>
+              </a:lnRef>
+              <a:fillRef idx="1">
+                <a:schemeClr val="accent1"/>
+              </a:fillRef>
+              <a:effectRef idx="0">
+                <a:schemeClr val="accent1"/>
+              </a:effectRef>
+              <a:fontRef idx="minor">
+                <a:schemeClr val="lt1"/>
+              </a:fontRef>
+            </p:style>
+            <p:txBody>
+              <a:bodyPr rtlCol="0" anchor="ctr"/>
+              <a:lstStyle/>
+              <a:p>
+                <a:pPr algn="ctr"/>
+                <a:endParaRPr lang="fr-CH" dirty="0">
+                  <a:solidFill>
+                    <a:schemeClr val="tx1"/>
+                  </a:solidFill>
+                </a:endParaRPr>
+              </a:p>
+            </p:txBody>
+          </p:sp>
+          <p:sp>
+            <p:nvSpPr>
+              <p:cNvPr id="32" name="Rectangle 31">
+                <a:extLst>
+                  <a:ext uri="{FF2B5EF4-FFF2-40B4-BE49-F238E27FC236}">
+                    <a16:creationId xmlns:a16="http://schemas.microsoft.com/office/drawing/2014/main" id="{3379A290-B93C-4943-B15C-B21BF11A0764}"/>
+                  </a:ext>
+                </a:extLst>
+              </p:cNvPr>
+              <p:cNvSpPr/>
+              <p:nvPr/>
+            </p:nvSpPr>
+            <p:spPr>
+              <a:xfrm>
+                <a:off x="876300" y="4396740"/>
+                <a:ext cx="1508760" cy="1954292"/>
+              </a:xfrm>
+              <a:prstGeom prst="rect">
+                <a:avLst/>
+              </a:prstGeom>
+              <a:solidFill>
+                <a:schemeClr val="bg1"/>
+              </a:solidFill>
+              <a:ln w="38100">
+                <a:solidFill>
+                  <a:schemeClr val="tx1"/>
+                </a:solidFill>
+              </a:ln>
+            </p:spPr>
+            <p:style>
+              <a:lnRef idx="2">
+                <a:schemeClr val="accent1">
+                  <a:shade val="50000"/>
+                </a:schemeClr>
+              </a:lnRef>
+              <a:fillRef idx="1">
+                <a:schemeClr val="accent1"/>
+              </a:fillRef>
+              <a:effectRef idx="0">
+                <a:schemeClr val="accent1"/>
+              </a:effectRef>
+              <a:fontRef idx="minor">
+                <a:schemeClr val="lt1"/>
+              </a:fontRef>
+            </p:style>
+            <p:txBody>
+              <a:bodyPr rtlCol="0" anchor="ctr"/>
+              <a:lstStyle/>
+              <a:p>
+                <a:pPr algn="ctr"/>
+                <a:r>
+                  <a:rPr lang="fr-CH" dirty="0">
+                    <a:solidFill>
+                      <a:schemeClr val="tx1"/>
+                    </a:solidFill>
+                  </a:rPr>
+                  <a:t>WC</a:t>
+                </a:r>
+              </a:p>
+            </p:txBody>
+          </p:sp>
+          <p:sp>
+            <p:nvSpPr>
+              <p:cNvPr id="33" name="Rectangle 32">
+                <a:extLst>
+                  <a:ext uri="{FF2B5EF4-FFF2-40B4-BE49-F238E27FC236}">
+                    <a16:creationId xmlns:a16="http://schemas.microsoft.com/office/drawing/2014/main" id="{37C1BD34-2475-4F1C-8726-39F3D789A5C3}"/>
+                  </a:ext>
+                </a:extLst>
+              </p:cNvPr>
+              <p:cNvSpPr/>
+              <p:nvPr/>
+            </p:nvSpPr>
+            <p:spPr>
+              <a:xfrm>
+                <a:off x="876300" y="1363980"/>
+                <a:ext cx="1242060" cy="1531620"/>
+              </a:xfrm>
+              <a:prstGeom prst="rect">
+                <a:avLst/>
+              </a:prstGeom>
+              <a:solidFill>
+                <a:schemeClr val="accent6">
+                  <a:lumMod val="75000"/>
+                </a:schemeClr>
+              </a:solidFill>
+              <a:ln w="38100">
+                <a:solidFill>
+                  <a:schemeClr val="tx1"/>
+                </a:solidFill>
+              </a:ln>
+            </p:spPr>
+            <p:style>
+              <a:lnRef idx="2">
+                <a:schemeClr val="accent1">
+                  <a:shade val="50000"/>
+                </a:schemeClr>
+              </a:lnRef>
+              <a:fillRef idx="1">
+                <a:schemeClr val="accent1"/>
+              </a:fillRef>
+              <a:effectRef idx="0">
+                <a:schemeClr val="accent1"/>
+              </a:effectRef>
+              <a:fontRef idx="minor">
+                <a:schemeClr val="lt1"/>
+              </a:fontRef>
+            </p:style>
+            <p:txBody>
+              <a:bodyPr rtlCol="0" anchor="ctr"/>
+              <a:lstStyle/>
+              <a:p>
+                <a:pPr algn="ctr"/>
+                <a:r>
+                  <a:rPr lang="fr-CH" dirty="0">
+                    <a:solidFill>
+                      <a:schemeClr val="tx1"/>
+                    </a:solidFill>
+                  </a:rPr>
+                  <a:t>H01</a:t>
+                </a:r>
+              </a:p>
+            </p:txBody>
+          </p:sp>
+          <p:sp>
+            <p:nvSpPr>
+              <p:cNvPr id="42" name="Rectangle 41">
+                <a:extLst>
+                  <a:ext uri="{FF2B5EF4-FFF2-40B4-BE49-F238E27FC236}">
+                    <a16:creationId xmlns:a16="http://schemas.microsoft.com/office/drawing/2014/main" id="{6FDF1844-2295-41A2-B751-56FC83F0D762}"/>
+                  </a:ext>
+                </a:extLst>
+              </p:cNvPr>
+              <p:cNvSpPr/>
+              <p:nvPr/>
+            </p:nvSpPr>
+            <p:spPr>
+              <a:xfrm>
+                <a:off x="2118360" y="1371124"/>
+                <a:ext cx="1242060" cy="1531620"/>
+              </a:xfrm>
+              <a:prstGeom prst="rect">
+                <a:avLst/>
+              </a:prstGeom>
+              <a:solidFill>
+                <a:schemeClr val="bg1"/>
+              </a:solidFill>
+              <a:ln w="38100">
+                <a:solidFill>
+                  <a:schemeClr val="tx1"/>
+                </a:solidFill>
+              </a:ln>
+            </p:spPr>
+            <p:style>
+              <a:lnRef idx="2">
+                <a:schemeClr val="accent1">
+                  <a:shade val="50000"/>
+                </a:schemeClr>
+              </a:lnRef>
+              <a:fillRef idx="1">
+                <a:schemeClr val="accent1"/>
+              </a:fillRef>
+              <a:effectRef idx="0">
+                <a:schemeClr val="accent1"/>
+              </a:effectRef>
+              <a:fontRef idx="minor">
+                <a:schemeClr val="lt1"/>
+              </a:fontRef>
+            </p:style>
+            <p:txBody>
+              <a:bodyPr rtlCol="0" anchor="ctr"/>
+              <a:lstStyle/>
+              <a:p>
+                <a:pPr algn="ctr"/>
+                <a:r>
+                  <a:rPr lang="fr-CH" dirty="0">
+                    <a:solidFill>
+                      <a:schemeClr val="tx1"/>
+                    </a:solidFill>
+                  </a:rPr>
+                  <a:t>H02</a:t>
+                </a:r>
+              </a:p>
+            </p:txBody>
+          </p:sp>
+          <p:sp>
+            <p:nvSpPr>
+              <p:cNvPr id="43" name="Rectangle 42">
+                <a:extLst>
+                  <a:ext uri="{FF2B5EF4-FFF2-40B4-BE49-F238E27FC236}">
+                    <a16:creationId xmlns:a16="http://schemas.microsoft.com/office/drawing/2014/main" id="{684FD5A1-1E47-4941-B905-2F63A88E23FC}"/>
+                  </a:ext>
+                </a:extLst>
+              </p:cNvPr>
+              <p:cNvSpPr/>
+              <p:nvPr/>
+            </p:nvSpPr>
+            <p:spPr>
+              <a:xfrm>
+                <a:off x="3360420" y="1355884"/>
+                <a:ext cx="1684020" cy="2050256"/>
+              </a:xfrm>
+              <a:prstGeom prst="rect">
+                <a:avLst/>
+              </a:prstGeom>
+              <a:solidFill>
+                <a:schemeClr val="accent6">
+                  <a:lumMod val="60000"/>
+                  <a:lumOff val="40000"/>
+                </a:schemeClr>
+              </a:solidFill>
+              <a:ln w="38100">
+                <a:solidFill>
+                  <a:schemeClr val="tx1"/>
+                </a:solidFill>
+              </a:ln>
+            </p:spPr>
+            <p:style>
+              <a:lnRef idx="2">
+                <a:schemeClr val="accent1">
+                  <a:shade val="50000"/>
+                </a:schemeClr>
+              </a:lnRef>
+              <a:fillRef idx="1">
+                <a:schemeClr val="accent1"/>
+              </a:fillRef>
+              <a:effectRef idx="0">
+                <a:schemeClr val="accent1"/>
+              </a:effectRef>
+              <a:fontRef idx="minor">
+                <a:schemeClr val="lt1"/>
+              </a:fontRef>
+            </p:style>
+            <p:txBody>
+              <a:bodyPr rtlCol="0" anchor="ctr"/>
+              <a:lstStyle/>
+              <a:p>
+                <a:pPr algn="ctr"/>
+                <a:r>
+                  <a:rPr lang="fr-CH" dirty="0">
+                    <a:solidFill>
+                      <a:schemeClr val="tx1"/>
+                    </a:solidFill>
+                  </a:rPr>
+                  <a:t>H03</a:t>
+                </a:r>
+              </a:p>
+            </p:txBody>
+          </p:sp>
+          <p:sp>
+            <p:nvSpPr>
+              <p:cNvPr id="44" name="Rectangle 43">
+                <a:extLst>
+                  <a:ext uri="{FF2B5EF4-FFF2-40B4-BE49-F238E27FC236}">
+                    <a16:creationId xmlns:a16="http://schemas.microsoft.com/office/drawing/2014/main" id="{D59B7F66-8C9F-45A9-B976-69DD62734CE5}"/>
+                  </a:ext>
+                </a:extLst>
+              </p:cNvPr>
+              <p:cNvSpPr/>
+              <p:nvPr/>
+            </p:nvSpPr>
+            <p:spPr>
+              <a:xfrm>
+                <a:off x="5044440" y="1362433"/>
+                <a:ext cx="1569720" cy="2036087"/>
+              </a:xfrm>
+              <a:prstGeom prst="rect">
+                <a:avLst/>
+              </a:prstGeom>
+              <a:solidFill>
+                <a:schemeClr val="bg1"/>
+              </a:solidFill>
+              <a:ln w="38100">
+                <a:solidFill>
+                  <a:schemeClr val="tx1"/>
+                </a:solidFill>
+              </a:ln>
+            </p:spPr>
+            <p:style>
+              <a:lnRef idx="2">
+                <a:schemeClr val="accent1">
+                  <a:shade val="50000"/>
+                </a:schemeClr>
+              </a:lnRef>
+              <a:fillRef idx="1">
+                <a:schemeClr val="accent1"/>
+              </a:fillRef>
+              <a:effectRef idx="0">
+                <a:schemeClr val="accent1"/>
+              </a:effectRef>
+              <a:fontRef idx="minor">
+                <a:schemeClr val="lt1"/>
+              </a:fontRef>
+            </p:style>
+            <p:txBody>
+              <a:bodyPr rtlCol="0" anchor="ctr"/>
+              <a:lstStyle/>
+              <a:p>
+                <a:pPr algn="ctr"/>
+                <a:r>
+                  <a:rPr lang="fr-CH" dirty="0">
+                    <a:solidFill>
+                      <a:schemeClr val="tx1"/>
+                    </a:solidFill>
+                  </a:rPr>
+                  <a:t>H04</a:t>
+                </a:r>
+              </a:p>
+            </p:txBody>
+          </p:sp>
+          <p:sp>
+            <p:nvSpPr>
+              <p:cNvPr id="48" name="Rectangle 47">
+                <a:extLst>
+                  <a:ext uri="{FF2B5EF4-FFF2-40B4-BE49-F238E27FC236}">
+                    <a16:creationId xmlns:a16="http://schemas.microsoft.com/office/drawing/2014/main" id="{DB39A551-F893-449E-89D9-AA6AB3E91E99}"/>
+                  </a:ext>
+                </a:extLst>
+              </p:cNvPr>
+              <p:cNvSpPr/>
+              <p:nvPr/>
+            </p:nvSpPr>
+            <p:spPr>
+              <a:xfrm>
+                <a:off x="6614160" y="3429001"/>
+                <a:ext cx="1981200" cy="1409700"/>
+              </a:xfrm>
+              <a:prstGeom prst="rect">
+                <a:avLst/>
+              </a:prstGeom>
+              <a:solidFill>
+                <a:schemeClr val="accent6">
+                  <a:lumMod val="20000"/>
+                  <a:lumOff val="80000"/>
+                </a:schemeClr>
+              </a:solidFill>
+              <a:ln w="38100">
+                <a:solidFill>
+                  <a:schemeClr val="tx1"/>
+                </a:solidFill>
+              </a:ln>
+            </p:spPr>
+            <p:style>
+              <a:lnRef idx="2">
+                <a:schemeClr val="accent1">
+                  <a:shade val="50000"/>
+                </a:schemeClr>
+              </a:lnRef>
+              <a:fillRef idx="1">
+                <a:schemeClr val="accent1"/>
+              </a:fillRef>
+              <a:effectRef idx="0">
+                <a:schemeClr val="accent1"/>
+              </a:effectRef>
+              <a:fontRef idx="minor">
+                <a:schemeClr val="lt1"/>
+              </a:fontRef>
+            </p:style>
+            <p:txBody>
+              <a:bodyPr rtlCol="0" anchor="ctr"/>
+              <a:lstStyle/>
+              <a:p>
+                <a:pPr algn="ctr"/>
+                <a:r>
+                  <a:rPr lang="fr-CH" dirty="0">
+                    <a:solidFill>
+                      <a:schemeClr val="tx1"/>
+                    </a:solidFill>
+                  </a:rPr>
+                  <a:t>H05</a:t>
+                </a:r>
+              </a:p>
+            </p:txBody>
+          </p:sp>
+          <p:sp>
+            <p:nvSpPr>
+              <p:cNvPr id="49" name="Rectangle 48">
+                <a:extLst>
+                  <a:ext uri="{FF2B5EF4-FFF2-40B4-BE49-F238E27FC236}">
+                    <a16:creationId xmlns:a16="http://schemas.microsoft.com/office/drawing/2014/main" id="{94533DA4-BC12-4373-9791-379F85724E83}"/>
+                  </a:ext>
+                </a:extLst>
+              </p:cNvPr>
+              <p:cNvSpPr/>
+              <p:nvPr/>
+            </p:nvSpPr>
+            <p:spPr>
+              <a:xfrm>
+                <a:off x="6614160" y="4838700"/>
+                <a:ext cx="1981200" cy="1501139"/>
+              </a:xfrm>
+              <a:prstGeom prst="rect">
+                <a:avLst/>
+              </a:prstGeom>
+              <a:solidFill>
+                <a:schemeClr val="accent6">
+                  <a:lumMod val="60000"/>
+                  <a:lumOff val="40000"/>
+                </a:schemeClr>
+              </a:solidFill>
+              <a:ln w="38100">
+                <a:solidFill>
+                  <a:schemeClr val="tx1"/>
+                </a:solidFill>
+              </a:ln>
+            </p:spPr>
+            <p:style>
+              <a:lnRef idx="2">
+                <a:schemeClr val="accent1">
+                  <a:shade val="50000"/>
+                </a:schemeClr>
+              </a:lnRef>
+              <a:fillRef idx="1">
+                <a:schemeClr val="accent1"/>
+              </a:fillRef>
+              <a:effectRef idx="0">
+                <a:schemeClr val="accent1"/>
+              </a:effectRef>
+              <a:fontRef idx="minor">
+                <a:schemeClr val="lt1"/>
+              </a:fontRef>
+            </p:style>
+            <p:txBody>
+              <a:bodyPr rtlCol="0" anchor="ctr"/>
+              <a:lstStyle/>
+              <a:p>
+                <a:pPr algn="ctr"/>
+                <a:r>
+                  <a:rPr lang="fr-CH" dirty="0">
+                    <a:solidFill>
+                      <a:schemeClr val="tx1"/>
+                    </a:solidFill>
+                  </a:rPr>
+                  <a:t>H06</a:t>
+                </a:r>
+              </a:p>
+            </p:txBody>
+          </p:sp>
+          <p:sp>
+            <p:nvSpPr>
+              <p:cNvPr id="50" name="Rectangle 49">
+                <a:extLst>
+                  <a:ext uri="{FF2B5EF4-FFF2-40B4-BE49-F238E27FC236}">
+                    <a16:creationId xmlns:a16="http://schemas.microsoft.com/office/drawing/2014/main" id="{2210BB83-E6B6-4215-9D50-51FA435D2E9B}"/>
+                  </a:ext>
+                </a:extLst>
+              </p:cNvPr>
+              <p:cNvSpPr/>
+              <p:nvPr/>
+            </p:nvSpPr>
+            <p:spPr>
+              <a:xfrm>
+                <a:off x="3108960" y="5486877"/>
+                <a:ext cx="1242060" cy="852962"/>
+              </a:xfrm>
+              <a:prstGeom prst="rect">
+                <a:avLst/>
+              </a:prstGeom>
+              <a:solidFill>
+                <a:schemeClr val="bg1"/>
+              </a:solidFill>
+              <a:ln w="38100">
+                <a:solidFill>
+                  <a:schemeClr val="tx1"/>
+                </a:solidFill>
+              </a:ln>
+            </p:spPr>
+            <p:style>
+              <a:lnRef idx="2">
+                <a:schemeClr val="accent1">
+                  <a:shade val="50000"/>
+                </a:schemeClr>
+              </a:lnRef>
+              <a:fillRef idx="1">
+                <a:schemeClr val="accent1"/>
+              </a:fillRef>
+              <a:effectRef idx="0">
+                <a:schemeClr val="accent1"/>
+              </a:effectRef>
+              <a:fontRef idx="minor">
+                <a:schemeClr val="lt1"/>
+              </a:fontRef>
+            </p:style>
+            <p:txBody>
+              <a:bodyPr rtlCol="0" anchor="ctr"/>
+              <a:lstStyle/>
+              <a:p>
+                <a:pPr algn="ctr"/>
+                <a:r>
+                  <a:rPr lang="fr-CH" dirty="0">
+                    <a:solidFill>
+                      <a:schemeClr val="tx1"/>
+                    </a:solidFill>
+                  </a:rPr>
+                  <a:t>Escalier</a:t>
+                </a:r>
+              </a:p>
+            </p:txBody>
+          </p:sp>
+        </p:grpSp>
+        <p:sp>
+          <p:nvSpPr>
+            <p:cNvPr id="45" name="Rectangle 44">
+              <a:extLst>
+                <a:ext uri="{FF2B5EF4-FFF2-40B4-BE49-F238E27FC236}">
+                  <a16:creationId xmlns:a16="http://schemas.microsoft.com/office/drawing/2014/main" id="{D63678CD-D0EA-4362-984E-D0829A57026B}"/>
+                </a:ext>
+              </a:extLst>
+            </p:cNvPr>
+            <p:cNvSpPr/>
+            <p:nvPr/>
+          </p:nvSpPr>
+          <p:spPr>
+            <a:xfrm>
+              <a:off x="1312527" y="1731082"/>
+              <a:ext cx="1409700" cy="453628"/>
+            </a:xfrm>
+            <a:prstGeom prst="rect">
+              <a:avLst/>
+            </a:prstGeom>
+            <a:solidFill>
+              <a:schemeClr val="bg1"/>
+            </a:solidFill>
+            <a:ln w="38100">
+              <a:solidFill>
+                <a:schemeClr val="tx1"/>
+              </a:solidFill>
+            </a:ln>
+          </p:spPr>
+          <p:style>
+            <a:lnRef idx="2">
+              <a:schemeClr val="accent1">
+                <a:shade val="50000"/>
+              </a:schemeClr>
+            </a:lnRef>
+            <a:fillRef idx="1">
+              <a:schemeClr val="accent1"/>
+            </a:fillRef>
+            <a:effectRef idx="0">
+              <a:schemeClr val="accent1"/>
+            </a:effectRef>
+            <a:fontRef idx="minor">
+              <a:schemeClr val="lt1"/>
+            </a:fontRef>
+          </p:style>
+          <p:txBody>
+            <a:bodyPr rtlCol="0" anchor="ctr"/>
+            <a:lstStyle/>
+            <a:p>
+              <a:pPr algn="ctr"/>
+              <a:r>
+                <a:rPr lang="fr-CH">
+                  <a:solidFill>
+                    <a:schemeClr val="tx1"/>
+                  </a:solidFill>
+                </a:rPr>
+                <a:t>ÉtageN</a:t>
+              </a:r>
+              <a:endParaRPr lang="fr-CH" dirty="0">
+                <a:solidFill>
+                  <a:schemeClr val="tx1"/>
+                </a:solidFill>
+              </a:endParaRPr>
+            </a:p>
+          </p:txBody>
+        </p:sp>
+        <p:sp>
+          <p:nvSpPr>
+            <p:cNvPr id="47" name="Rectangle 46">
+              <a:extLst>
+                <a:ext uri="{FF2B5EF4-FFF2-40B4-BE49-F238E27FC236}">
+                  <a16:creationId xmlns:a16="http://schemas.microsoft.com/office/drawing/2014/main" id="{9716E632-ADEB-48EC-8C7B-0D37D5A8AA43}"/>
+                </a:ext>
+              </a:extLst>
+            </p:cNvPr>
+            <p:cNvSpPr/>
+            <p:nvPr/>
+          </p:nvSpPr>
+          <p:spPr>
+            <a:xfrm>
+              <a:off x="1307608" y="2178450"/>
+              <a:ext cx="1409700" cy="453628"/>
             </a:xfrm>
             <a:prstGeom prst="rect">
               <a:avLst/>
@@ -4799,17 +5388,17 @@
                     <a:schemeClr val="tx1"/>
                   </a:solidFill>
                 </a:rPr>
-                <a:t>WC</a:t>
+                <a:t>…</a:t>
               </a:r>
             </a:p>
           </p:txBody>
         </p:sp>
         <p:sp>
           <p:nvSpPr>
-            <p:cNvPr id="33" name="Rectangle 32">
+            <p:cNvPr id="51" name="Rectangle 50">
               <a:extLst>
                 <a:ext uri="{FF2B5EF4-FFF2-40B4-BE49-F238E27FC236}">
-                  <a16:creationId xmlns:a16="http://schemas.microsoft.com/office/drawing/2014/main" id="{37C1BD34-2475-4F1C-8726-39F3D789A5C3}"/>
+                  <a16:creationId xmlns:a16="http://schemas.microsoft.com/office/drawing/2014/main" id="{03B98A59-0AB1-46DB-82A1-98532570A34B}"/>
                 </a:ext>
               </a:extLst>
             </p:cNvPr>
@@ -4818,392 +5407,8 @@
           </p:nvSpPr>
           <p:spPr>
             <a:xfrm>
-              <a:off x="876300" y="1363980"/>
-              <a:ext cx="1242060" cy="1531620"/>
-            </a:xfrm>
-            <a:prstGeom prst="rect">
-              <a:avLst/>
-            </a:prstGeom>
-            <a:solidFill>
-              <a:schemeClr val="accent6">
-                <a:lumMod val="40000"/>
-                <a:lumOff val="60000"/>
-              </a:schemeClr>
-            </a:solidFill>
-            <a:ln w="38100">
-              <a:solidFill>
-                <a:schemeClr val="tx1"/>
-              </a:solidFill>
-            </a:ln>
-          </p:spPr>
-          <p:style>
-            <a:lnRef idx="2">
-              <a:schemeClr val="accent1">
-                <a:shade val="50000"/>
-              </a:schemeClr>
-            </a:lnRef>
-            <a:fillRef idx="1">
-              <a:schemeClr val="accent1"/>
-            </a:fillRef>
-            <a:effectRef idx="0">
-              <a:schemeClr val="accent1"/>
-            </a:effectRef>
-            <a:fontRef idx="minor">
-              <a:schemeClr val="lt1"/>
-            </a:fontRef>
-          </p:style>
-          <p:txBody>
-            <a:bodyPr rtlCol="0" anchor="ctr"/>
-            <a:lstStyle/>
-            <a:p>
-              <a:pPr algn="ctr"/>
-              <a:r>
-                <a:rPr lang="fr-CH" dirty="0">
-                  <a:solidFill>
-                    <a:schemeClr val="tx1"/>
-                  </a:solidFill>
-                </a:rPr>
-                <a:t>H01</a:t>
-              </a:r>
-            </a:p>
-          </p:txBody>
-        </p:sp>
-        <p:sp>
-          <p:nvSpPr>
-            <p:cNvPr id="42" name="Rectangle 41">
-              <a:extLst>
-                <a:ext uri="{FF2B5EF4-FFF2-40B4-BE49-F238E27FC236}">
-                  <a16:creationId xmlns:a16="http://schemas.microsoft.com/office/drawing/2014/main" id="{6FDF1844-2295-41A2-B751-56FC83F0D762}"/>
-                </a:ext>
-              </a:extLst>
-            </p:cNvPr>
-            <p:cNvSpPr/>
-            <p:nvPr/>
-          </p:nvSpPr>
-          <p:spPr>
-            <a:xfrm>
-              <a:off x="2118360" y="1371124"/>
-              <a:ext cx="1242060" cy="1531620"/>
-            </a:xfrm>
-            <a:prstGeom prst="rect">
-              <a:avLst/>
-            </a:prstGeom>
-            <a:solidFill>
-              <a:schemeClr val="accent2">
-                <a:lumMod val="40000"/>
-                <a:lumOff val="60000"/>
-              </a:schemeClr>
-            </a:solidFill>
-            <a:ln w="38100">
-              <a:solidFill>
-                <a:schemeClr val="tx1"/>
-              </a:solidFill>
-            </a:ln>
-          </p:spPr>
-          <p:style>
-            <a:lnRef idx="2">
-              <a:schemeClr val="accent1">
-                <a:shade val="50000"/>
-              </a:schemeClr>
-            </a:lnRef>
-            <a:fillRef idx="1">
-              <a:schemeClr val="accent1"/>
-            </a:fillRef>
-            <a:effectRef idx="0">
-              <a:schemeClr val="accent1"/>
-            </a:effectRef>
-            <a:fontRef idx="minor">
-              <a:schemeClr val="lt1"/>
-            </a:fontRef>
-          </p:style>
-          <p:txBody>
-            <a:bodyPr rtlCol="0" anchor="ctr"/>
-            <a:lstStyle/>
-            <a:p>
-              <a:pPr algn="ctr"/>
-              <a:r>
-                <a:rPr lang="fr-CH" dirty="0">
-                  <a:solidFill>
-                    <a:schemeClr val="tx1"/>
-                  </a:solidFill>
-                </a:rPr>
-                <a:t>H02</a:t>
-              </a:r>
-            </a:p>
-          </p:txBody>
-        </p:sp>
-        <p:sp>
-          <p:nvSpPr>
-            <p:cNvPr id="43" name="Rectangle 42">
-              <a:extLst>
-                <a:ext uri="{FF2B5EF4-FFF2-40B4-BE49-F238E27FC236}">
-                  <a16:creationId xmlns:a16="http://schemas.microsoft.com/office/drawing/2014/main" id="{684FD5A1-1E47-4941-B905-2F63A88E23FC}"/>
-                </a:ext>
-              </a:extLst>
-            </p:cNvPr>
-            <p:cNvSpPr/>
-            <p:nvPr/>
-          </p:nvSpPr>
-          <p:spPr>
-            <a:xfrm>
-              <a:off x="3360420" y="1355884"/>
-              <a:ext cx="1684020" cy="2050256"/>
-            </a:xfrm>
-            <a:prstGeom prst="rect">
-              <a:avLst/>
-            </a:prstGeom>
-            <a:solidFill>
-              <a:schemeClr val="accent6">
-                <a:lumMod val="40000"/>
-                <a:lumOff val="60000"/>
-              </a:schemeClr>
-            </a:solidFill>
-            <a:ln w="38100">
-              <a:solidFill>
-                <a:schemeClr val="tx1"/>
-              </a:solidFill>
-            </a:ln>
-          </p:spPr>
-          <p:style>
-            <a:lnRef idx="2">
-              <a:schemeClr val="accent1">
-                <a:shade val="50000"/>
-              </a:schemeClr>
-            </a:lnRef>
-            <a:fillRef idx="1">
-              <a:schemeClr val="accent1"/>
-            </a:fillRef>
-            <a:effectRef idx="0">
-              <a:schemeClr val="accent1"/>
-            </a:effectRef>
-            <a:fontRef idx="minor">
-              <a:schemeClr val="lt1"/>
-            </a:fontRef>
-          </p:style>
-          <p:txBody>
-            <a:bodyPr rtlCol="0" anchor="ctr"/>
-            <a:lstStyle/>
-            <a:p>
-              <a:pPr algn="ctr"/>
-              <a:r>
-                <a:rPr lang="fr-CH" dirty="0">
-                  <a:solidFill>
-                    <a:schemeClr val="tx1"/>
-                  </a:solidFill>
-                </a:rPr>
-                <a:t>H03</a:t>
-              </a:r>
-            </a:p>
-          </p:txBody>
-        </p:sp>
-        <p:sp>
-          <p:nvSpPr>
-            <p:cNvPr id="44" name="Rectangle 43">
-              <a:extLst>
-                <a:ext uri="{FF2B5EF4-FFF2-40B4-BE49-F238E27FC236}">
-                  <a16:creationId xmlns:a16="http://schemas.microsoft.com/office/drawing/2014/main" id="{D59B7F66-8C9F-45A9-B976-69DD62734CE5}"/>
-                </a:ext>
-              </a:extLst>
-            </p:cNvPr>
-            <p:cNvSpPr/>
-            <p:nvPr/>
-          </p:nvSpPr>
-          <p:spPr>
-            <a:xfrm>
-              <a:off x="5044440" y="1362433"/>
-              <a:ext cx="1569720" cy="2036087"/>
-            </a:xfrm>
-            <a:prstGeom prst="rect">
-              <a:avLst/>
-            </a:prstGeom>
-            <a:solidFill>
-              <a:schemeClr val="accent2">
-                <a:lumMod val="40000"/>
-                <a:lumOff val="60000"/>
-              </a:schemeClr>
-            </a:solidFill>
-            <a:ln w="38100">
-              <a:solidFill>
-                <a:schemeClr val="tx1"/>
-              </a:solidFill>
-            </a:ln>
-          </p:spPr>
-          <p:style>
-            <a:lnRef idx="2">
-              <a:schemeClr val="accent1">
-                <a:shade val="50000"/>
-              </a:schemeClr>
-            </a:lnRef>
-            <a:fillRef idx="1">
-              <a:schemeClr val="accent1"/>
-            </a:fillRef>
-            <a:effectRef idx="0">
-              <a:schemeClr val="accent1"/>
-            </a:effectRef>
-            <a:fontRef idx="minor">
-              <a:schemeClr val="lt1"/>
-            </a:fontRef>
-          </p:style>
-          <p:txBody>
-            <a:bodyPr rtlCol="0" anchor="ctr"/>
-            <a:lstStyle/>
-            <a:p>
-              <a:pPr algn="ctr"/>
-              <a:r>
-                <a:rPr lang="fr-CH" dirty="0">
-                  <a:solidFill>
-                    <a:schemeClr val="tx1"/>
-                  </a:solidFill>
-                </a:rPr>
-                <a:t>H04</a:t>
-              </a:r>
-            </a:p>
-          </p:txBody>
-        </p:sp>
-        <p:sp>
-          <p:nvSpPr>
-            <p:cNvPr id="48" name="Rectangle 47">
-              <a:extLst>
-                <a:ext uri="{FF2B5EF4-FFF2-40B4-BE49-F238E27FC236}">
-                  <a16:creationId xmlns:a16="http://schemas.microsoft.com/office/drawing/2014/main" id="{DB39A551-F893-449E-89D9-AA6AB3E91E99}"/>
-                </a:ext>
-              </a:extLst>
-            </p:cNvPr>
-            <p:cNvSpPr/>
-            <p:nvPr/>
-          </p:nvSpPr>
-          <p:spPr>
-            <a:xfrm>
-              <a:off x="6614160" y="3429001"/>
-              <a:ext cx="1981200" cy="1409700"/>
-            </a:xfrm>
-            <a:prstGeom prst="rect">
-              <a:avLst/>
-            </a:prstGeom>
-            <a:solidFill>
-              <a:schemeClr val="accent6">
-                <a:lumMod val="40000"/>
-                <a:lumOff val="60000"/>
-              </a:schemeClr>
-            </a:solidFill>
-            <a:ln w="38100">
-              <a:solidFill>
-                <a:schemeClr val="tx1"/>
-              </a:solidFill>
-            </a:ln>
-          </p:spPr>
-          <p:style>
-            <a:lnRef idx="2">
-              <a:schemeClr val="accent1">
-                <a:shade val="50000"/>
-              </a:schemeClr>
-            </a:lnRef>
-            <a:fillRef idx="1">
-              <a:schemeClr val="accent1"/>
-            </a:fillRef>
-            <a:effectRef idx="0">
-              <a:schemeClr val="accent1"/>
-            </a:effectRef>
-            <a:fontRef idx="minor">
-              <a:schemeClr val="lt1"/>
-            </a:fontRef>
-          </p:style>
-          <p:txBody>
-            <a:bodyPr rtlCol="0" anchor="ctr"/>
-            <a:lstStyle/>
-            <a:p>
-              <a:pPr algn="ctr"/>
-              <a:r>
-                <a:rPr lang="fr-CH" dirty="0">
-                  <a:solidFill>
-                    <a:schemeClr val="tx1"/>
-                  </a:solidFill>
-                </a:rPr>
-                <a:t>H05</a:t>
-              </a:r>
-            </a:p>
-          </p:txBody>
-        </p:sp>
-        <p:sp>
-          <p:nvSpPr>
-            <p:cNvPr id="49" name="Rectangle 48">
-              <a:extLst>
-                <a:ext uri="{FF2B5EF4-FFF2-40B4-BE49-F238E27FC236}">
-                  <a16:creationId xmlns:a16="http://schemas.microsoft.com/office/drawing/2014/main" id="{94533DA4-BC12-4373-9791-379F85724E83}"/>
-                </a:ext>
-              </a:extLst>
-            </p:cNvPr>
-            <p:cNvSpPr/>
-            <p:nvPr/>
-          </p:nvSpPr>
-          <p:spPr>
-            <a:xfrm>
-              <a:off x="6614160" y="4838700"/>
-              <a:ext cx="1981200" cy="1501139"/>
-            </a:xfrm>
-            <a:prstGeom prst="rect">
-              <a:avLst/>
-            </a:prstGeom>
-            <a:solidFill>
-              <a:schemeClr val="accent2">
-                <a:lumMod val="40000"/>
-                <a:lumOff val="60000"/>
-              </a:schemeClr>
-            </a:solidFill>
-            <a:ln w="38100">
-              <a:solidFill>
-                <a:schemeClr val="tx1"/>
-              </a:solidFill>
-            </a:ln>
-          </p:spPr>
-          <p:style>
-            <a:lnRef idx="2">
-              <a:schemeClr val="accent1">
-                <a:shade val="50000"/>
-              </a:schemeClr>
-            </a:lnRef>
-            <a:fillRef idx="1">
-              <a:schemeClr val="accent1"/>
-            </a:fillRef>
-            <a:effectRef idx="0">
-              <a:schemeClr val="accent1"/>
-            </a:effectRef>
-            <a:fontRef idx="minor">
-              <a:schemeClr val="lt1"/>
-            </a:fontRef>
-          </p:style>
-          <p:txBody>
-            <a:bodyPr rtlCol="0" anchor="ctr"/>
-            <a:lstStyle/>
-            <a:p>
-              <a:pPr algn="ctr"/>
-              <a:r>
-                <a:rPr lang="fr-CH" dirty="0">
-                  <a:solidFill>
-                    <a:schemeClr val="tx1"/>
-                  </a:solidFill>
-                </a:rPr>
-                <a:t>H06</a:t>
-              </a:r>
-            </a:p>
-          </p:txBody>
-        </p:sp>
-        <p:sp>
-          <p:nvSpPr>
-            <p:cNvPr id="50" name="Rectangle 49">
-              <a:extLst>
-                <a:ext uri="{FF2B5EF4-FFF2-40B4-BE49-F238E27FC236}">
-                  <a16:creationId xmlns:a16="http://schemas.microsoft.com/office/drawing/2014/main" id="{2210BB83-E6B6-4215-9D50-51FA435D2E9B}"/>
-                </a:ext>
-              </a:extLst>
-            </p:cNvPr>
-            <p:cNvSpPr/>
-            <p:nvPr/>
-          </p:nvSpPr>
-          <p:spPr>
-            <a:xfrm>
-              <a:off x="3108960" y="5486877"/>
-              <a:ext cx="1242060" cy="852962"/>
+              <a:off x="1317442" y="2630736"/>
+              <a:ext cx="1409700" cy="453628"/>
             </a:xfrm>
             <a:prstGeom prst="rect">
               <a:avLst/>
@@ -5244,696 +5449,1021 @@
                     <a:schemeClr val="tx1"/>
                   </a:solidFill>
                 </a:rPr>
-                <a:t>Escalier</a:t>
+                <a:t>…</a:t>
               </a:r>
+            </a:p>
+          </p:txBody>
+        </p:sp>
+        <p:sp>
+          <p:nvSpPr>
+            <p:cNvPr id="52" name="Rectangle 51">
+              <a:extLst>
+                <a:ext uri="{FF2B5EF4-FFF2-40B4-BE49-F238E27FC236}">
+                  <a16:creationId xmlns:a16="http://schemas.microsoft.com/office/drawing/2014/main" id="{EE212C94-745C-477F-BF3C-E2FF478045C3}"/>
+                </a:ext>
+              </a:extLst>
+            </p:cNvPr>
+            <p:cNvSpPr/>
+            <p:nvPr/>
+          </p:nvSpPr>
+          <p:spPr>
+            <a:xfrm>
+              <a:off x="1312523" y="3078104"/>
+              <a:ext cx="1409700" cy="453628"/>
+            </a:xfrm>
+            <a:prstGeom prst="rect">
+              <a:avLst/>
+            </a:prstGeom>
+            <a:solidFill>
+              <a:schemeClr val="bg1"/>
+            </a:solidFill>
+            <a:ln w="38100">
+              <a:solidFill>
+                <a:schemeClr val="tx1"/>
+              </a:solidFill>
+            </a:ln>
+          </p:spPr>
+          <p:style>
+            <a:lnRef idx="2">
+              <a:schemeClr val="accent1">
+                <a:shade val="50000"/>
+              </a:schemeClr>
+            </a:lnRef>
+            <a:fillRef idx="1">
+              <a:schemeClr val="accent1"/>
+            </a:fillRef>
+            <a:effectRef idx="0">
+              <a:schemeClr val="accent1"/>
+            </a:effectRef>
+            <a:fontRef idx="minor">
+              <a:schemeClr val="lt1"/>
+            </a:fontRef>
+          </p:style>
+          <p:txBody>
+            <a:bodyPr rtlCol="0" anchor="ctr"/>
+            <a:lstStyle/>
+            <a:p>
+              <a:pPr algn="ctr"/>
+              <a:r>
+                <a:rPr lang="fr-CH" dirty="0">
+                  <a:solidFill>
+                    <a:schemeClr val="tx1"/>
+                  </a:solidFill>
+                </a:rPr>
+                <a:t>…</a:t>
+              </a:r>
+            </a:p>
+          </p:txBody>
+        </p:sp>
+        <p:sp>
+          <p:nvSpPr>
+            <p:cNvPr id="53" name="Rectangle 52">
+              <a:extLst>
+                <a:ext uri="{FF2B5EF4-FFF2-40B4-BE49-F238E27FC236}">
+                  <a16:creationId xmlns:a16="http://schemas.microsoft.com/office/drawing/2014/main" id="{48D97D13-439D-490F-9500-D232BAE84D1C}"/>
+                </a:ext>
+              </a:extLst>
+            </p:cNvPr>
+            <p:cNvSpPr/>
+            <p:nvPr/>
+          </p:nvSpPr>
+          <p:spPr>
+            <a:xfrm>
+              <a:off x="1317442" y="3525470"/>
+              <a:ext cx="1409700" cy="453628"/>
+            </a:xfrm>
+            <a:prstGeom prst="rect">
+              <a:avLst/>
+            </a:prstGeom>
+            <a:solidFill>
+              <a:schemeClr val="bg1"/>
+            </a:solidFill>
+            <a:ln w="38100">
+              <a:solidFill>
+                <a:schemeClr val="tx1"/>
+              </a:solidFill>
+            </a:ln>
+          </p:spPr>
+          <p:style>
+            <a:lnRef idx="2">
+              <a:schemeClr val="accent1">
+                <a:shade val="50000"/>
+              </a:schemeClr>
+            </a:lnRef>
+            <a:fillRef idx="1">
+              <a:schemeClr val="accent1"/>
+            </a:fillRef>
+            <a:effectRef idx="0">
+              <a:schemeClr val="accent1"/>
+            </a:effectRef>
+            <a:fontRef idx="minor">
+              <a:schemeClr val="lt1"/>
+            </a:fontRef>
+          </p:style>
+          <p:txBody>
+            <a:bodyPr rtlCol="0" anchor="ctr"/>
+            <a:lstStyle/>
+            <a:p>
+              <a:pPr algn="ctr"/>
+              <a:r>
+                <a:rPr lang="fr-CH" dirty="0">
+                  <a:solidFill>
+                    <a:schemeClr val="tx1"/>
+                  </a:solidFill>
+                </a:rPr>
+                <a:t>…</a:t>
+              </a:r>
+            </a:p>
+          </p:txBody>
+        </p:sp>
+        <p:sp>
+          <p:nvSpPr>
+            <p:cNvPr id="54" name="Rectangle 53">
+              <a:extLst>
+                <a:ext uri="{FF2B5EF4-FFF2-40B4-BE49-F238E27FC236}">
+                  <a16:creationId xmlns:a16="http://schemas.microsoft.com/office/drawing/2014/main" id="{50466DC9-0244-4930-8556-3D9A97D4600A}"/>
+                </a:ext>
+              </a:extLst>
+            </p:cNvPr>
+            <p:cNvSpPr/>
+            <p:nvPr/>
+          </p:nvSpPr>
+          <p:spPr>
+            <a:xfrm>
+              <a:off x="1312523" y="3972838"/>
+              <a:ext cx="1409700" cy="453628"/>
+            </a:xfrm>
+            <a:prstGeom prst="rect">
+              <a:avLst/>
+            </a:prstGeom>
+            <a:solidFill>
+              <a:schemeClr val="bg1"/>
+            </a:solidFill>
+            <a:ln w="38100">
+              <a:solidFill>
+                <a:schemeClr val="tx1"/>
+              </a:solidFill>
+            </a:ln>
+          </p:spPr>
+          <p:style>
+            <a:lnRef idx="2">
+              <a:schemeClr val="accent1">
+                <a:shade val="50000"/>
+              </a:schemeClr>
+            </a:lnRef>
+            <a:fillRef idx="1">
+              <a:schemeClr val="accent1"/>
+            </a:fillRef>
+            <a:effectRef idx="0">
+              <a:schemeClr val="accent1"/>
+            </a:effectRef>
+            <a:fontRef idx="minor">
+              <a:schemeClr val="lt1"/>
+            </a:fontRef>
+          </p:style>
+          <p:txBody>
+            <a:bodyPr rtlCol="0" anchor="ctr"/>
+            <a:lstStyle/>
+            <a:p>
+              <a:pPr algn="ctr"/>
+              <a:r>
+                <a:rPr lang="fr-CH" dirty="0">
+                  <a:solidFill>
+                    <a:schemeClr val="tx1"/>
+                  </a:solidFill>
+                </a:rPr>
+                <a:t>…</a:t>
+              </a:r>
+            </a:p>
+          </p:txBody>
+        </p:sp>
+        <p:sp>
+          <p:nvSpPr>
+            <p:cNvPr id="55" name="Rectangle 54">
+              <a:extLst>
+                <a:ext uri="{FF2B5EF4-FFF2-40B4-BE49-F238E27FC236}">
+                  <a16:creationId xmlns:a16="http://schemas.microsoft.com/office/drawing/2014/main" id="{C855EA14-E506-46B5-A805-04168B6ED65D}"/>
+                </a:ext>
+              </a:extLst>
+            </p:cNvPr>
+            <p:cNvSpPr/>
+            <p:nvPr/>
+          </p:nvSpPr>
+          <p:spPr>
+            <a:xfrm>
+              <a:off x="1305581" y="4395626"/>
+              <a:ext cx="1409700" cy="453628"/>
+            </a:xfrm>
+            <a:prstGeom prst="rect">
+              <a:avLst/>
+            </a:prstGeom>
+            <a:solidFill>
+              <a:schemeClr val="bg1"/>
+            </a:solidFill>
+            <a:ln w="38100">
+              <a:solidFill>
+                <a:schemeClr val="tx1"/>
+              </a:solidFill>
+            </a:ln>
+          </p:spPr>
+          <p:style>
+            <a:lnRef idx="2">
+              <a:schemeClr val="accent1">
+                <a:shade val="50000"/>
+              </a:schemeClr>
+            </a:lnRef>
+            <a:fillRef idx="1">
+              <a:schemeClr val="accent1"/>
+            </a:fillRef>
+            <a:effectRef idx="0">
+              <a:schemeClr val="accent1"/>
+            </a:effectRef>
+            <a:fontRef idx="minor">
+              <a:schemeClr val="lt1"/>
+            </a:fontRef>
+          </p:style>
+          <p:txBody>
+            <a:bodyPr rtlCol="0" anchor="ctr"/>
+            <a:lstStyle/>
+            <a:p>
+              <a:pPr algn="ctr"/>
+              <a:r>
+                <a:rPr lang="fr-CH" dirty="0">
+                  <a:solidFill>
+                    <a:schemeClr val="tx1"/>
+                  </a:solidFill>
+                </a:rPr>
+                <a:t>…</a:t>
+              </a:r>
+            </a:p>
+          </p:txBody>
+        </p:sp>
+        <p:sp>
+          <p:nvSpPr>
+            <p:cNvPr id="56" name="Rectangle 55">
+              <a:extLst>
+                <a:ext uri="{FF2B5EF4-FFF2-40B4-BE49-F238E27FC236}">
+                  <a16:creationId xmlns:a16="http://schemas.microsoft.com/office/drawing/2014/main" id="{F6A6C2AF-2ACD-4E65-8620-56B80A6B4DBF}"/>
+                </a:ext>
+              </a:extLst>
+            </p:cNvPr>
+            <p:cNvSpPr/>
+            <p:nvPr/>
+          </p:nvSpPr>
+          <p:spPr>
+            <a:xfrm>
+              <a:off x="1317440" y="4842994"/>
+              <a:ext cx="1409700" cy="453628"/>
+            </a:xfrm>
+            <a:prstGeom prst="rect">
+              <a:avLst/>
+            </a:prstGeom>
+            <a:solidFill>
+              <a:schemeClr val="bg1"/>
+            </a:solidFill>
+            <a:ln w="38100">
+              <a:solidFill>
+                <a:schemeClr val="tx1"/>
+              </a:solidFill>
+            </a:ln>
+          </p:spPr>
+          <p:style>
+            <a:lnRef idx="2">
+              <a:schemeClr val="accent1">
+                <a:shade val="50000"/>
+              </a:schemeClr>
+            </a:lnRef>
+            <a:fillRef idx="1">
+              <a:schemeClr val="accent1"/>
+            </a:fillRef>
+            <a:effectRef idx="0">
+              <a:schemeClr val="accent1"/>
+            </a:effectRef>
+            <a:fontRef idx="minor">
+              <a:schemeClr val="lt1"/>
+            </a:fontRef>
+          </p:style>
+          <p:txBody>
+            <a:bodyPr rtlCol="0" anchor="ctr"/>
+            <a:lstStyle/>
+            <a:p>
+              <a:pPr algn="ctr"/>
+              <a:r>
+                <a:rPr lang="fr-CH" dirty="0">
+                  <a:solidFill>
+                    <a:schemeClr val="tx1"/>
+                  </a:solidFill>
+                </a:rPr>
+                <a:t>…</a:t>
+              </a:r>
+            </a:p>
+          </p:txBody>
+        </p:sp>
+        <p:sp>
+          <p:nvSpPr>
+            <p:cNvPr id="57" name="Rectangle 56">
+              <a:extLst>
+                <a:ext uri="{FF2B5EF4-FFF2-40B4-BE49-F238E27FC236}">
+                  <a16:creationId xmlns:a16="http://schemas.microsoft.com/office/drawing/2014/main" id="{39DD5B73-30EF-4B70-8AB5-735737C24082}"/>
+                </a:ext>
+              </a:extLst>
+            </p:cNvPr>
+            <p:cNvSpPr/>
+            <p:nvPr/>
+          </p:nvSpPr>
+          <p:spPr>
+            <a:xfrm>
+              <a:off x="1317445" y="5285448"/>
+              <a:ext cx="1409700" cy="453628"/>
+            </a:xfrm>
+            <a:prstGeom prst="rect">
+              <a:avLst/>
+            </a:prstGeom>
+            <a:solidFill>
+              <a:schemeClr val="bg1"/>
+            </a:solidFill>
+            <a:ln w="38100">
+              <a:solidFill>
+                <a:schemeClr val="tx1"/>
+              </a:solidFill>
+            </a:ln>
+          </p:spPr>
+          <p:style>
+            <a:lnRef idx="2">
+              <a:schemeClr val="accent1">
+                <a:shade val="50000"/>
+              </a:schemeClr>
+            </a:lnRef>
+            <a:fillRef idx="1">
+              <a:schemeClr val="accent1"/>
+            </a:fillRef>
+            <a:effectRef idx="0">
+              <a:schemeClr val="accent1"/>
+            </a:effectRef>
+            <a:fontRef idx="minor">
+              <a:schemeClr val="lt1"/>
+            </a:fontRef>
+          </p:style>
+          <p:txBody>
+            <a:bodyPr rtlCol="0" anchor="ctr"/>
+            <a:lstStyle/>
+            <a:p>
+              <a:pPr algn="ctr"/>
+              <a:r>
+                <a:rPr lang="fr-CH" dirty="0">
+                  <a:solidFill>
+                    <a:schemeClr val="tx1"/>
+                  </a:solidFill>
+                </a:rPr>
+                <a:t>…</a:t>
+              </a:r>
+            </a:p>
+          </p:txBody>
+        </p:sp>
+        <p:sp>
+          <p:nvSpPr>
+            <p:cNvPr id="58" name="Rectangle 57">
+              <a:extLst>
+                <a:ext uri="{FF2B5EF4-FFF2-40B4-BE49-F238E27FC236}">
+                  <a16:creationId xmlns:a16="http://schemas.microsoft.com/office/drawing/2014/main" id="{60588FEB-4CD5-4065-825F-FBE62683B26F}"/>
+                </a:ext>
+              </a:extLst>
+            </p:cNvPr>
+            <p:cNvSpPr/>
+            <p:nvPr/>
+          </p:nvSpPr>
+          <p:spPr>
+            <a:xfrm>
+              <a:off x="1322358" y="5732816"/>
+              <a:ext cx="1409700" cy="453628"/>
+            </a:xfrm>
+            <a:prstGeom prst="rect">
+              <a:avLst/>
+            </a:prstGeom>
+            <a:solidFill>
+              <a:schemeClr val="bg1"/>
+            </a:solidFill>
+            <a:ln w="38100">
+              <a:solidFill>
+                <a:schemeClr val="tx1"/>
+              </a:solidFill>
+            </a:ln>
+          </p:spPr>
+          <p:style>
+            <a:lnRef idx="2">
+              <a:schemeClr val="accent1">
+                <a:shade val="50000"/>
+              </a:schemeClr>
+            </a:lnRef>
+            <a:fillRef idx="1">
+              <a:schemeClr val="accent1"/>
+            </a:fillRef>
+            <a:effectRef idx="0">
+              <a:schemeClr val="accent1"/>
+            </a:effectRef>
+            <a:fontRef idx="minor">
+              <a:schemeClr val="lt1"/>
+            </a:fontRef>
+          </p:style>
+          <p:txBody>
+            <a:bodyPr rtlCol="0" anchor="ctr"/>
+            <a:lstStyle/>
+            <a:p>
+              <a:pPr algn="ctr"/>
+              <a:r>
+                <a:rPr lang="fr-CH" dirty="0">
+                  <a:solidFill>
+                    <a:schemeClr val="tx1"/>
+                  </a:solidFill>
+                </a:rPr>
+                <a:t>Étage2</a:t>
+              </a:r>
+            </a:p>
+          </p:txBody>
+        </p:sp>
+        <p:sp>
+          <p:nvSpPr>
+            <p:cNvPr id="59" name="Rectangle 58">
+              <a:extLst>
+                <a:ext uri="{FF2B5EF4-FFF2-40B4-BE49-F238E27FC236}">
+                  <a16:creationId xmlns:a16="http://schemas.microsoft.com/office/drawing/2014/main" id="{CCBA0498-7B52-496F-9AF7-7FF7F213D327}"/>
+                </a:ext>
+              </a:extLst>
+            </p:cNvPr>
+            <p:cNvSpPr/>
+            <p:nvPr/>
+          </p:nvSpPr>
+          <p:spPr>
+            <a:xfrm>
+              <a:off x="1312526" y="6213744"/>
+              <a:ext cx="1409700" cy="453628"/>
+            </a:xfrm>
+            <a:prstGeom prst="rect">
+              <a:avLst/>
+            </a:prstGeom>
+            <a:solidFill>
+              <a:schemeClr val="accent5">
+                <a:lumMod val="40000"/>
+                <a:lumOff val="60000"/>
+              </a:schemeClr>
+            </a:solidFill>
+            <a:ln w="38100">
+              <a:solidFill>
+                <a:schemeClr val="tx1"/>
+              </a:solidFill>
+            </a:ln>
+          </p:spPr>
+          <p:style>
+            <a:lnRef idx="2">
+              <a:schemeClr val="accent1">
+                <a:shade val="50000"/>
+              </a:schemeClr>
+            </a:lnRef>
+            <a:fillRef idx="1">
+              <a:schemeClr val="accent1"/>
+            </a:fillRef>
+            <a:effectRef idx="0">
+              <a:schemeClr val="accent1"/>
+            </a:effectRef>
+            <a:fontRef idx="minor">
+              <a:schemeClr val="lt1"/>
+            </a:fontRef>
+          </p:style>
+          <p:txBody>
+            <a:bodyPr rtlCol="0" anchor="ctr"/>
+            <a:lstStyle/>
+            <a:p>
+              <a:pPr algn="ctr"/>
+              <a:r>
+                <a:rPr lang="fr-CH" sz="1600" dirty="0">
+                  <a:solidFill>
+                    <a:schemeClr val="tx1"/>
+                  </a:solidFill>
+                </a:rPr>
+                <a:t>Étage1</a:t>
+              </a:r>
+              <a:endParaRPr lang="fr-CH" dirty="0">
+                <a:solidFill>
+                  <a:schemeClr val="tx1"/>
+                </a:solidFill>
+              </a:endParaRPr>
             </a:p>
           </p:txBody>
         </p:sp>
       </p:grpSp>
       <p:sp>
         <p:nvSpPr>
-          <p:cNvPr id="45" name="Rectangle 44">
+          <p:cNvPr id="7" name="ZoneTexte 6">
             <a:extLst>
               <a:ext uri="{FF2B5EF4-FFF2-40B4-BE49-F238E27FC236}">
-                <a16:creationId xmlns:a16="http://schemas.microsoft.com/office/drawing/2014/main" id="{D63678CD-D0EA-4362-984E-D0829A57026B}"/>
+                <a16:creationId xmlns:a16="http://schemas.microsoft.com/office/drawing/2014/main" id="{ACC248CE-6026-403E-B7D6-ADE01D023A6E}"/>
               </a:ext>
             </a:extLst>
           </p:cNvPr>
-          <p:cNvSpPr/>
+          <p:cNvSpPr txBox="1"/>
           <p:nvPr/>
         </p:nvSpPr>
         <p:spPr>
           <a:xfrm>
-            <a:off x="876299" y="1378744"/>
-            <a:ext cx="1409700" cy="453628"/>
+            <a:off x="337490" y="6079523"/>
+            <a:ext cx="1179871" cy="369332"/>
           </a:xfrm>
           <a:prstGeom prst="rect">
             <a:avLst/>
           </a:prstGeom>
-          <a:solidFill>
-            <a:schemeClr val="bg1"/>
-          </a:solidFill>
-          <a:ln w="38100">
+          <a:noFill/>
+          <a:ln>
             <a:solidFill>
               <a:schemeClr val="tx1"/>
             </a:solidFill>
           </a:ln>
         </p:spPr>
-        <p:style>
-          <a:lnRef idx="2">
-            <a:schemeClr val="accent1">
-              <a:shade val="50000"/>
-            </a:schemeClr>
-          </a:lnRef>
-          <a:fillRef idx="1">
-            <a:schemeClr val="accent1"/>
-          </a:fillRef>
-          <a:effectRef idx="0">
-            <a:schemeClr val="accent1"/>
-          </a:effectRef>
-          <a:fontRef idx="minor">
-            <a:schemeClr val="lt1"/>
-          </a:fontRef>
-        </p:style>
         <p:txBody>
-          <a:bodyPr rtlCol="0" anchor="ctr"/>
+          <a:bodyPr wrap="square" rtlCol="0">
+            <a:spAutoFit/>
+          </a:bodyPr>
           <a:lstStyle/>
           <a:p>
-            <a:pPr algn="ctr"/>
             <a:r>
-              <a:rPr lang="fr-CH">
+              <a:rPr lang="fr-CH" dirty="0"/>
+              <a:t>Légendes :</a:t>
+            </a:r>
+          </a:p>
+        </p:txBody>
+      </p:sp>
+      <p:grpSp>
+        <p:nvGrpSpPr>
+          <p:cNvPr id="18" name="Groupe 17">
+            <a:extLst>
+              <a:ext uri="{FF2B5EF4-FFF2-40B4-BE49-F238E27FC236}">
+                <a16:creationId xmlns:a16="http://schemas.microsoft.com/office/drawing/2014/main" id="{71DC48D1-FD7C-44CC-B8D2-504EEDEE7CDC}"/>
+              </a:ext>
+            </a:extLst>
+          </p:cNvPr>
+          <p:cNvGrpSpPr/>
+          <p:nvPr/>
+        </p:nvGrpSpPr>
+        <p:grpSpPr>
+          <a:xfrm>
+            <a:off x="6511323" y="5822595"/>
+            <a:ext cx="4208037" cy="377171"/>
+            <a:chOff x="2100893" y="5807129"/>
+            <a:chExt cx="4391787" cy="434814"/>
+          </a:xfrm>
+        </p:grpSpPr>
+        <p:sp>
+          <p:nvSpPr>
+            <p:cNvPr id="60" name="Rectangle 59">
+              <a:extLst>
+                <a:ext uri="{FF2B5EF4-FFF2-40B4-BE49-F238E27FC236}">
+                  <a16:creationId xmlns:a16="http://schemas.microsoft.com/office/drawing/2014/main" id="{DA61802B-44A4-4D8E-BFFA-88800366EEAF}"/>
+                </a:ext>
+              </a:extLst>
+            </p:cNvPr>
+            <p:cNvSpPr/>
+            <p:nvPr/>
+          </p:nvSpPr>
+          <p:spPr>
+            <a:xfrm>
+              <a:off x="2100893" y="5891820"/>
+              <a:ext cx="366109" cy="350123"/>
+            </a:xfrm>
+            <a:prstGeom prst="rect">
+              <a:avLst/>
+            </a:prstGeom>
+            <a:solidFill>
+              <a:schemeClr val="accent6">
+                <a:lumMod val="60000"/>
+                <a:lumOff val="40000"/>
+              </a:schemeClr>
+            </a:solidFill>
+            <a:ln w="38100">
+              <a:solidFill>
+                <a:schemeClr val="tx1"/>
+              </a:solidFill>
+            </a:ln>
+          </p:spPr>
+          <p:style>
+            <a:lnRef idx="2">
+              <a:schemeClr val="accent1">
+                <a:shade val="50000"/>
+              </a:schemeClr>
+            </a:lnRef>
+            <a:fillRef idx="1">
+              <a:schemeClr val="accent1"/>
+            </a:fillRef>
+            <a:effectRef idx="0">
+              <a:schemeClr val="accent1"/>
+            </a:effectRef>
+            <a:fontRef idx="minor">
+              <a:schemeClr val="lt1"/>
+            </a:fontRef>
+          </p:style>
+          <p:txBody>
+            <a:bodyPr rtlCol="0" anchor="ctr"/>
+            <a:lstStyle/>
+            <a:p>
+              <a:pPr algn="ctr"/>
+              <a:endParaRPr lang="fr-CH" dirty="0">
+                <a:solidFill>
+                  <a:schemeClr val="accent6">
+                    <a:lumMod val="60000"/>
+                    <a:lumOff val="40000"/>
+                  </a:schemeClr>
+                </a:solidFill>
+              </a:endParaRPr>
+            </a:p>
+          </p:txBody>
+        </p:sp>
+        <p:sp>
+          <p:nvSpPr>
+            <p:cNvPr id="8" name="ZoneTexte 7">
+              <a:extLst>
+                <a:ext uri="{FF2B5EF4-FFF2-40B4-BE49-F238E27FC236}">
+                  <a16:creationId xmlns:a16="http://schemas.microsoft.com/office/drawing/2014/main" id="{59ADC962-D917-413C-985E-EA6FBEFEE761}"/>
+                </a:ext>
+              </a:extLst>
+            </p:cNvPr>
+            <p:cNvSpPr txBox="1"/>
+            <p:nvPr/>
+          </p:nvSpPr>
+          <p:spPr>
+            <a:xfrm>
+              <a:off x="2578011" y="5807129"/>
+              <a:ext cx="3914669" cy="425777"/>
+            </a:xfrm>
+            <a:prstGeom prst="rect">
+              <a:avLst/>
+            </a:prstGeom>
+            <a:noFill/>
+          </p:spPr>
+          <p:txBody>
+            <a:bodyPr wrap="square" rtlCol="0">
+              <a:spAutoFit/>
+            </a:bodyPr>
+            <a:lstStyle/>
+            <a:p>
+              <a:r>
+                <a:rPr lang="fr-CH" dirty="0"/>
+                <a:t>= libre pour les 2 prochaines périodes</a:t>
+              </a:r>
+            </a:p>
+          </p:txBody>
+        </p:sp>
+      </p:grpSp>
+      <p:grpSp>
+        <p:nvGrpSpPr>
+          <p:cNvPr id="61" name="Groupe 60">
+            <a:extLst>
+              <a:ext uri="{FF2B5EF4-FFF2-40B4-BE49-F238E27FC236}">
+                <a16:creationId xmlns:a16="http://schemas.microsoft.com/office/drawing/2014/main" id="{2C484D11-B366-43B8-96F1-BB6A9F0C1FEA}"/>
+              </a:ext>
+            </a:extLst>
+          </p:cNvPr>
+          <p:cNvGrpSpPr/>
+          <p:nvPr/>
+        </p:nvGrpSpPr>
+        <p:grpSpPr>
+          <a:xfrm>
+            <a:off x="2020241" y="5830433"/>
+            <a:ext cx="4208037" cy="377176"/>
+            <a:chOff x="2100893" y="5807124"/>
+            <a:chExt cx="4391787" cy="434819"/>
+          </a:xfrm>
+        </p:grpSpPr>
+        <p:sp>
+          <p:nvSpPr>
+            <p:cNvPr id="62" name="Rectangle 61">
+              <a:extLst>
+                <a:ext uri="{FF2B5EF4-FFF2-40B4-BE49-F238E27FC236}">
+                  <a16:creationId xmlns:a16="http://schemas.microsoft.com/office/drawing/2014/main" id="{FDB0A9E2-1FC0-42FB-8CE4-0D46046BFD73}"/>
+                </a:ext>
+              </a:extLst>
+            </p:cNvPr>
+            <p:cNvSpPr/>
+            <p:nvPr/>
+          </p:nvSpPr>
+          <p:spPr>
+            <a:xfrm>
+              <a:off x="2100893" y="5891820"/>
+              <a:ext cx="366109" cy="350123"/>
+            </a:xfrm>
+            <a:prstGeom prst="rect">
+              <a:avLst/>
+            </a:prstGeom>
+            <a:solidFill>
+              <a:schemeClr val="accent6">
+                <a:lumMod val="75000"/>
+              </a:schemeClr>
+            </a:solidFill>
+            <a:ln w="38100">
+              <a:solidFill>
+                <a:schemeClr val="tx1"/>
+              </a:solidFill>
+            </a:ln>
+          </p:spPr>
+          <p:style>
+            <a:lnRef idx="2">
+              <a:schemeClr val="accent1">
+                <a:shade val="50000"/>
+              </a:schemeClr>
+            </a:lnRef>
+            <a:fillRef idx="1">
+              <a:schemeClr val="accent1"/>
+            </a:fillRef>
+            <a:effectRef idx="0">
+              <a:schemeClr val="accent1"/>
+            </a:effectRef>
+            <a:fontRef idx="minor">
+              <a:schemeClr val="lt1"/>
+            </a:fontRef>
+          </p:style>
+          <p:txBody>
+            <a:bodyPr rtlCol="0" anchor="ctr"/>
+            <a:lstStyle/>
+            <a:p>
+              <a:pPr algn="ctr"/>
+              <a:endParaRPr lang="fr-CH" dirty="0">
                 <a:solidFill>
                   <a:schemeClr val="tx1"/>
                 </a:solidFill>
-              </a:rPr>
-              <a:t>ÉtageN</a:t>
-            </a:r>
-            <a:endParaRPr lang="fr-CH" dirty="0">
+              </a:endParaRPr>
+            </a:p>
+          </p:txBody>
+        </p:sp>
+        <p:sp>
+          <p:nvSpPr>
+            <p:cNvPr id="63" name="ZoneTexte 62">
+              <a:extLst>
+                <a:ext uri="{FF2B5EF4-FFF2-40B4-BE49-F238E27FC236}">
+                  <a16:creationId xmlns:a16="http://schemas.microsoft.com/office/drawing/2014/main" id="{15D6AC0C-7712-427C-843F-8FD545B88B06}"/>
+                </a:ext>
+              </a:extLst>
+            </p:cNvPr>
+            <p:cNvSpPr txBox="1"/>
+            <p:nvPr/>
+          </p:nvSpPr>
+          <p:spPr>
+            <a:xfrm>
+              <a:off x="2578011" y="5807124"/>
+              <a:ext cx="3914669" cy="425777"/>
+            </a:xfrm>
+            <a:prstGeom prst="rect">
+              <a:avLst/>
+            </a:prstGeom>
+            <a:noFill/>
+          </p:spPr>
+          <p:txBody>
+            <a:bodyPr wrap="square" rtlCol="0">
+              <a:spAutoFit/>
+            </a:bodyPr>
+            <a:lstStyle/>
+            <a:p>
+              <a:r>
+                <a:rPr lang="fr-CH" dirty="0"/>
+                <a:t>= libre pour les 3 prochaines périodes</a:t>
+              </a:r>
+            </a:p>
+          </p:txBody>
+        </p:sp>
+      </p:grpSp>
+      <p:grpSp>
+        <p:nvGrpSpPr>
+          <p:cNvPr id="64" name="Groupe 63">
+            <a:extLst>
+              <a:ext uri="{FF2B5EF4-FFF2-40B4-BE49-F238E27FC236}">
+                <a16:creationId xmlns:a16="http://schemas.microsoft.com/office/drawing/2014/main" id="{DA3CDCA5-A5CF-4650-8B44-AA6F12515A24}"/>
+              </a:ext>
+            </a:extLst>
+          </p:cNvPr>
+          <p:cNvGrpSpPr/>
+          <p:nvPr/>
+        </p:nvGrpSpPr>
+        <p:grpSpPr>
+          <a:xfrm>
+            <a:off x="2020241" y="6307006"/>
+            <a:ext cx="4208037" cy="377176"/>
+            <a:chOff x="2100893" y="5807124"/>
+            <a:chExt cx="4391787" cy="434819"/>
+          </a:xfrm>
+        </p:grpSpPr>
+        <p:sp>
+          <p:nvSpPr>
+            <p:cNvPr id="65" name="Rectangle 64">
+              <a:extLst>
+                <a:ext uri="{FF2B5EF4-FFF2-40B4-BE49-F238E27FC236}">
+                  <a16:creationId xmlns:a16="http://schemas.microsoft.com/office/drawing/2014/main" id="{88C21E64-4FD5-43F0-A629-622C95E3812A}"/>
+                </a:ext>
+              </a:extLst>
+            </p:cNvPr>
+            <p:cNvSpPr/>
+            <p:nvPr/>
+          </p:nvSpPr>
+          <p:spPr>
+            <a:xfrm>
+              <a:off x="2100893" y="5891820"/>
+              <a:ext cx="366109" cy="350123"/>
+            </a:xfrm>
+            <a:prstGeom prst="rect">
+              <a:avLst/>
+            </a:prstGeom>
+            <a:solidFill>
+              <a:schemeClr val="accent6">
+                <a:lumMod val="20000"/>
+                <a:lumOff val="80000"/>
+              </a:schemeClr>
+            </a:solidFill>
+            <a:ln w="38100">
               <a:solidFill>
                 <a:schemeClr val="tx1"/>
               </a:solidFill>
-            </a:endParaRPr>
-          </a:p>
-        </p:txBody>
-      </p:sp>
-      <p:sp>
-        <p:nvSpPr>
-          <p:cNvPr id="47" name="Rectangle 46">
+            </a:ln>
+          </p:spPr>
+          <p:style>
+            <a:lnRef idx="2">
+              <a:schemeClr val="accent1">
+                <a:shade val="50000"/>
+              </a:schemeClr>
+            </a:lnRef>
+            <a:fillRef idx="1">
+              <a:schemeClr val="accent1"/>
+            </a:fillRef>
+            <a:effectRef idx="0">
+              <a:schemeClr val="accent1"/>
+            </a:effectRef>
+            <a:fontRef idx="minor">
+              <a:schemeClr val="lt1"/>
+            </a:fontRef>
+          </p:style>
+          <p:txBody>
+            <a:bodyPr rtlCol="0" anchor="ctr"/>
+            <a:lstStyle/>
+            <a:p>
+              <a:pPr algn="ctr"/>
+              <a:endParaRPr lang="fr-CH" dirty="0">
+                <a:solidFill>
+                  <a:schemeClr val="tx1"/>
+                </a:solidFill>
+              </a:endParaRPr>
+            </a:p>
+          </p:txBody>
+        </p:sp>
+        <p:sp>
+          <p:nvSpPr>
+            <p:cNvPr id="66" name="ZoneTexte 65">
+              <a:extLst>
+                <a:ext uri="{FF2B5EF4-FFF2-40B4-BE49-F238E27FC236}">
+                  <a16:creationId xmlns:a16="http://schemas.microsoft.com/office/drawing/2014/main" id="{F619F1EB-A10B-4E03-91DA-03177A64AE05}"/>
+                </a:ext>
+              </a:extLst>
+            </p:cNvPr>
+            <p:cNvSpPr txBox="1"/>
+            <p:nvPr/>
+          </p:nvSpPr>
+          <p:spPr>
+            <a:xfrm>
+              <a:off x="2578011" y="5807124"/>
+              <a:ext cx="3914669" cy="425777"/>
+            </a:xfrm>
+            <a:prstGeom prst="rect">
+              <a:avLst/>
+            </a:prstGeom>
+            <a:noFill/>
+          </p:spPr>
+          <p:txBody>
+            <a:bodyPr wrap="square" rtlCol="0">
+              <a:spAutoFit/>
+            </a:bodyPr>
+            <a:lstStyle/>
+            <a:p>
+              <a:r>
+                <a:rPr lang="fr-CH" dirty="0"/>
+                <a:t>= libre pour la prochaine période</a:t>
+              </a:r>
+            </a:p>
+          </p:txBody>
+        </p:sp>
+      </p:grpSp>
+      <p:grpSp>
+        <p:nvGrpSpPr>
+          <p:cNvPr id="67" name="Groupe 66">
             <a:extLst>
               <a:ext uri="{FF2B5EF4-FFF2-40B4-BE49-F238E27FC236}">
-                <a16:creationId xmlns:a16="http://schemas.microsoft.com/office/drawing/2014/main" id="{9716E632-ADEB-48EC-8C7B-0D37D5A8AA43}"/>
+                <a16:creationId xmlns:a16="http://schemas.microsoft.com/office/drawing/2014/main" id="{E8441092-6F4B-4E58-B501-E72F45D98351}"/>
               </a:ext>
             </a:extLst>
           </p:cNvPr>
-          <p:cNvSpPr/>
+          <p:cNvGrpSpPr/>
           <p:nvPr/>
-        </p:nvSpPr>
-        <p:spPr>
+        </p:nvGrpSpPr>
+        <p:grpSpPr>
           <a:xfrm>
-            <a:off x="871380" y="1826112"/>
-            <a:ext cx="1409700" cy="453628"/>
+            <a:off x="6510521" y="6284562"/>
+            <a:ext cx="4208037" cy="377171"/>
+            <a:chOff x="2100893" y="5807129"/>
+            <a:chExt cx="4391787" cy="434814"/>
           </a:xfrm>
-          <a:prstGeom prst="rect">
-            <a:avLst/>
-          </a:prstGeom>
-          <a:solidFill>
-            <a:schemeClr val="bg1"/>
-          </a:solidFill>
-          <a:ln w="38100">
+        </p:grpSpPr>
+        <p:sp>
+          <p:nvSpPr>
+            <p:cNvPr id="68" name="Rectangle 67">
+              <a:extLst>
+                <a:ext uri="{FF2B5EF4-FFF2-40B4-BE49-F238E27FC236}">
+                  <a16:creationId xmlns:a16="http://schemas.microsoft.com/office/drawing/2014/main" id="{9A2533E8-3259-4F5B-B335-D916BC720F54}"/>
+                </a:ext>
+              </a:extLst>
+            </p:cNvPr>
+            <p:cNvSpPr/>
+            <p:nvPr/>
+          </p:nvSpPr>
+          <p:spPr>
+            <a:xfrm>
+              <a:off x="2100893" y="5891820"/>
+              <a:ext cx="366109" cy="350123"/>
+            </a:xfrm>
+            <a:prstGeom prst="rect">
+              <a:avLst/>
+            </a:prstGeom>
             <a:solidFill>
-              <a:schemeClr val="tx1"/>
+              <a:schemeClr val="accent5">
+                <a:lumMod val="40000"/>
+                <a:lumOff val="60000"/>
+              </a:schemeClr>
             </a:solidFill>
-          </a:ln>
-        </p:spPr>
-        <p:style>
-          <a:lnRef idx="2">
-            <a:schemeClr val="accent1">
-              <a:shade val="50000"/>
-            </a:schemeClr>
-          </a:lnRef>
-          <a:fillRef idx="1">
-            <a:schemeClr val="accent1"/>
-          </a:fillRef>
-          <a:effectRef idx="0">
-            <a:schemeClr val="accent1"/>
-          </a:effectRef>
-          <a:fontRef idx="minor">
-            <a:schemeClr val="lt1"/>
-          </a:fontRef>
-        </p:style>
-        <p:txBody>
-          <a:bodyPr rtlCol="0" anchor="ctr"/>
-          <a:lstStyle/>
-          <a:p>
-            <a:pPr algn="ctr"/>
-            <a:r>
-              <a:rPr lang="fr-CH" dirty="0">
-                <a:solidFill>
-                  <a:schemeClr val="tx1"/>
-                </a:solidFill>
-              </a:rPr>
-              <a:t>…</a:t>
-            </a:r>
-          </a:p>
-        </p:txBody>
-      </p:sp>
-      <p:sp>
-        <p:nvSpPr>
-          <p:cNvPr id="51" name="Rectangle 50">
-            <a:extLst>
-              <a:ext uri="{FF2B5EF4-FFF2-40B4-BE49-F238E27FC236}">
-                <a16:creationId xmlns:a16="http://schemas.microsoft.com/office/drawing/2014/main" id="{03B98A59-0AB1-46DB-82A1-98532570A34B}"/>
-              </a:ext>
-            </a:extLst>
-          </p:cNvPr>
-          <p:cNvSpPr/>
-          <p:nvPr/>
-        </p:nvSpPr>
-        <p:spPr>
-          <a:xfrm>
-            <a:off x="881214" y="2278398"/>
-            <a:ext cx="1409700" cy="453628"/>
-          </a:xfrm>
-          <a:prstGeom prst="rect">
-            <a:avLst/>
-          </a:prstGeom>
-          <a:solidFill>
-            <a:schemeClr val="bg1"/>
-          </a:solidFill>
-          <a:ln w="38100">
-            <a:solidFill>
-              <a:schemeClr val="tx1"/>
-            </a:solidFill>
-          </a:ln>
-        </p:spPr>
-        <p:style>
-          <a:lnRef idx="2">
-            <a:schemeClr val="accent1">
-              <a:shade val="50000"/>
-            </a:schemeClr>
-          </a:lnRef>
-          <a:fillRef idx="1">
-            <a:schemeClr val="accent1"/>
-          </a:fillRef>
-          <a:effectRef idx="0">
-            <a:schemeClr val="accent1"/>
-          </a:effectRef>
-          <a:fontRef idx="minor">
-            <a:schemeClr val="lt1"/>
-          </a:fontRef>
-        </p:style>
-        <p:txBody>
-          <a:bodyPr rtlCol="0" anchor="ctr"/>
-          <a:lstStyle/>
-          <a:p>
-            <a:pPr algn="ctr"/>
-            <a:r>
-              <a:rPr lang="fr-CH" dirty="0">
-                <a:solidFill>
-                  <a:schemeClr val="tx1"/>
-                </a:solidFill>
-              </a:rPr>
-              <a:t>…</a:t>
-            </a:r>
-          </a:p>
-        </p:txBody>
-      </p:sp>
-      <p:sp>
-        <p:nvSpPr>
-          <p:cNvPr id="52" name="Rectangle 51">
-            <a:extLst>
-              <a:ext uri="{FF2B5EF4-FFF2-40B4-BE49-F238E27FC236}">
-                <a16:creationId xmlns:a16="http://schemas.microsoft.com/office/drawing/2014/main" id="{EE212C94-745C-477F-BF3C-E2FF478045C3}"/>
-              </a:ext>
-            </a:extLst>
-          </p:cNvPr>
-          <p:cNvSpPr/>
-          <p:nvPr/>
-        </p:nvSpPr>
-        <p:spPr>
-          <a:xfrm>
-            <a:off x="876295" y="2725766"/>
-            <a:ext cx="1409700" cy="453628"/>
-          </a:xfrm>
-          <a:prstGeom prst="rect">
-            <a:avLst/>
-          </a:prstGeom>
-          <a:solidFill>
-            <a:schemeClr val="bg1"/>
-          </a:solidFill>
-          <a:ln w="38100">
-            <a:solidFill>
-              <a:schemeClr val="tx1"/>
-            </a:solidFill>
-          </a:ln>
-        </p:spPr>
-        <p:style>
-          <a:lnRef idx="2">
-            <a:schemeClr val="accent1">
-              <a:shade val="50000"/>
-            </a:schemeClr>
-          </a:lnRef>
-          <a:fillRef idx="1">
-            <a:schemeClr val="accent1"/>
-          </a:fillRef>
-          <a:effectRef idx="0">
-            <a:schemeClr val="accent1"/>
-          </a:effectRef>
-          <a:fontRef idx="minor">
-            <a:schemeClr val="lt1"/>
-          </a:fontRef>
-        </p:style>
-        <p:txBody>
-          <a:bodyPr rtlCol="0" anchor="ctr"/>
-          <a:lstStyle/>
-          <a:p>
-            <a:pPr algn="ctr"/>
-            <a:r>
-              <a:rPr lang="fr-CH" dirty="0">
-                <a:solidFill>
-                  <a:schemeClr val="tx1"/>
-                </a:solidFill>
-              </a:rPr>
-              <a:t>…</a:t>
-            </a:r>
-          </a:p>
-        </p:txBody>
-      </p:sp>
-      <p:sp>
-        <p:nvSpPr>
-          <p:cNvPr id="53" name="Rectangle 52">
-            <a:extLst>
-              <a:ext uri="{FF2B5EF4-FFF2-40B4-BE49-F238E27FC236}">
-                <a16:creationId xmlns:a16="http://schemas.microsoft.com/office/drawing/2014/main" id="{48D97D13-439D-490F-9500-D232BAE84D1C}"/>
-              </a:ext>
-            </a:extLst>
-          </p:cNvPr>
-          <p:cNvSpPr/>
-          <p:nvPr/>
-        </p:nvSpPr>
-        <p:spPr>
-          <a:xfrm>
-            <a:off x="881214" y="3173132"/>
-            <a:ext cx="1409700" cy="453628"/>
-          </a:xfrm>
-          <a:prstGeom prst="rect">
-            <a:avLst/>
-          </a:prstGeom>
-          <a:solidFill>
-            <a:schemeClr val="bg1"/>
-          </a:solidFill>
-          <a:ln w="38100">
-            <a:solidFill>
-              <a:schemeClr val="tx1"/>
-            </a:solidFill>
-          </a:ln>
-        </p:spPr>
-        <p:style>
-          <a:lnRef idx="2">
-            <a:schemeClr val="accent1">
-              <a:shade val="50000"/>
-            </a:schemeClr>
-          </a:lnRef>
-          <a:fillRef idx="1">
-            <a:schemeClr val="accent1"/>
-          </a:fillRef>
-          <a:effectRef idx="0">
-            <a:schemeClr val="accent1"/>
-          </a:effectRef>
-          <a:fontRef idx="minor">
-            <a:schemeClr val="lt1"/>
-          </a:fontRef>
-        </p:style>
-        <p:txBody>
-          <a:bodyPr rtlCol="0" anchor="ctr"/>
-          <a:lstStyle/>
-          <a:p>
-            <a:pPr algn="ctr"/>
-            <a:r>
-              <a:rPr lang="fr-CH" dirty="0">
-                <a:solidFill>
-                  <a:schemeClr val="tx1"/>
-                </a:solidFill>
-              </a:rPr>
-              <a:t>…</a:t>
-            </a:r>
-          </a:p>
-        </p:txBody>
-      </p:sp>
-      <p:sp>
-        <p:nvSpPr>
-          <p:cNvPr id="54" name="Rectangle 53">
-            <a:extLst>
-              <a:ext uri="{FF2B5EF4-FFF2-40B4-BE49-F238E27FC236}">
-                <a16:creationId xmlns:a16="http://schemas.microsoft.com/office/drawing/2014/main" id="{50466DC9-0244-4930-8556-3D9A97D4600A}"/>
-              </a:ext>
-            </a:extLst>
-          </p:cNvPr>
-          <p:cNvSpPr/>
-          <p:nvPr/>
-        </p:nvSpPr>
-        <p:spPr>
-          <a:xfrm>
-            <a:off x="876295" y="3620500"/>
-            <a:ext cx="1409700" cy="453628"/>
-          </a:xfrm>
-          <a:prstGeom prst="rect">
-            <a:avLst/>
-          </a:prstGeom>
-          <a:solidFill>
-            <a:schemeClr val="bg1"/>
-          </a:solidFill>
-          <a:ln w="38100">
-            <a:solidFill>
-              <a:schemeClr val="tx1"/>
-            </a:solidFill>
-          </a:ln>
-        </p:spPr>
-        <p:style>
-          <a:lnRef idx="2">
-            <a:schemeClr val="accent1">
-              <a:shade val="50000"/>
-            </a:schemeClr>
-          </a:lnRef>
-          <a:fillRef idx="1">
-            <a:schemeClr val="accent1"/>
-          </a:fillRef>
-          <a:effectRef idx="0">
-            <a:schemeClr val="accent1"/>
-          </a:effectRef>
-          <a:fontRef idx="minor">
-            <a:schemeClr val="lt1"/>
-          </a:fontRef>
-        </p:style>
-        <p:txBody>
-          <a:bodyPr rtlCol="0" anchor="ctr"/>
-          <a:lstStyle/>
-          <a:p>
-            <a:pPr algn="ctr"/>
-            <a:r>
-              <a:rPr lang="fr-CH" dirty="0">
-                <a:solidFill>
-                  <a:schemeClr val="tx1"/>
-                </a:solidFill>
-              </a:rPr>
-              <a:t>…</a:t>
-            </a:r>
-          </a:p>
-        </p:txBody>
-      </p:sp>
-      <p:sp>
-        <p:nvSpPr>
-          <p:cNvPr id="55" name="Rectangle 54">
-            <a:extLst>
-              <a:ext uri="{FF2B5EF4-FFF2-40B4-BE49-F238E27FC236}">
-                <a16:creationId xmlns:a16="http://schemas.microsoft.com/office/drawing/2014/main" id="{C855EA14-E506-46B5-A805-04168B6ED65D}"/>
-              </a:ext>
-            </a:extLst>
-          </p:cNvPr>
-          <p:cNvSpPr/>
-          <p:nvPr/>
-        </p:nvSpPr>
-        <p:spPr>
-          <a:xfrm>
-            <a:off x="869353" y="4043288"/>
-            <a:ext cx="1409700" cy="453628"/>
-          </a:xfrm>
-          <a:prstGeom prst="rect">
-            <a:avLst/>
-          </a:prstGeom>
-          <a:solidFill>
-            <a:schemeClr val="bg1"/>
-          </a:solidFill>
-          <a:ln w="38100">
-            <a:solidFill>
-              <a:schemeClr val="tx1"/>
-            </a:solidFill>
-          </a:ln>
-        </p:spPr>
-        <p:style>
-          <a:lnRef idx="2">
-            <a:schemeClr val="accent1">
-              <a:shade val="50000"/>
-            </a:schemeClr>
-          </a:lnRef>
-          <a:fillRef idx="1">
-            <a:schemeClr val="accent1"/>
-          </a:fillRef>
-          <a:effectRef idx="0">
-            <a:schemeClr val="accent1"/>
-          </a:effectRef>
-          <a:fontRef idx="minor">
-            <a:schemeClr val="lt1"/>
-          </a:fontRef>
-        </p:style>
-        <p:txBody>
-          <a:bodyPr rtlCol="0" anchor="ctr"/>
-          <a:lstStyle/>
-          <a:p>
-            <a:pPr algn="ctr"/>
-            <a:r>
-              <a:rPr lang="fr-CH" dirty="0">
-                <a:solidFill>
-                  <a:schemeClr val="tx1"/>
-                </a:solidFill>
-              </a:rPr>
-              <a:t>…</a:t>
-            </a:r>
-          </a:p>
-        </p:txBody>
-      </p:sp>
-      <p:sp>
-        <p:nvSpPr>
-          <p:cNvPr id="56" name="Rectangle 55">
-            <a:extLst>
-              <a:ext uri="{FF2B5EF4-FFF2-40B4-BE49-F238E27FC236}">
-                <a16:creationId xmlns:a16="http://schemas.microsoft.com/office/drawing/2014/main" id="{F6A6C2AF-2ACD-4E65-8620-56B80A6B4DBF}"/>
-              </a:ext>
-            </a:extLst>
-          </p:cNvPr>
-          <p:cNvSpPr/>
-          <p:nvPr/>
-        </p:nvSpPr>
-        <p:spPr>
-          <a:xfrm>
-            <a:off x="881212" y="4490656"/>
-            <a:ext cx="1409700" cy="453628"/>
-          </a:xfrm>
-          <a:prstGeom prst="rect">
-            <a:avLst/>
-          </a:prstGeom>
-          <a:solidFill>
-            <a:schemeClr val="bg1"/>
-          </a:solidFill>
-          <a:ln w="38100">
-            <a:solidFill>
-              <a:schemeClr val="tx1"/>
-            </a:solidFill>
-          </a:ln>
-        </p:spPr>
-        <p:style>
-          <a:lnRef idx="2">
-            <a:schemeClr val="accent1">
-              <a:shade val="50000"/>
-            </a:schemeClr>
-          </a:lnRef>
-          <a:fillRef idx="1">
-            <a:schemeClr val="accent1"/>
-          </a:fillRef>
-          <a:effectRef idx="0">
-            <a:schemeClr val="accent1"/>
-          </a:effectRef>
-          <a:fontRef idx="minor">
-            <a:schemeClr val="lt1"/>
-          </a:fontRef>
-        </p:style>
-        <p:txBody>
-          <a:bodyPr rtlCol="0" anchor="ctr"/>
-          <a:lstStyle/>
-          <a:p>
-            <a:pPr algn="ctr"/>
-            <a:r>
-              <a:rPr lang="fr-CH" dirty="0">
-                <a:solidFill>
-                  <a:schemeClr val="tx1"/>
-                </a:solidFill>
-              </a:rPr>
-              <a:t>…</a:t>
-            </a:r>
-          </a:p>
-        </p:txBody>
-      </p:sp>
-      <p:sp>
-        <p:nvSpPr>
-          <p:cNvPr id="57" name="Rectangle 56">
-            <a:extLst>
-              <a:ext uri="{FF2B5EF4-FFF2-40B4-BE49-F238E27FC236}">
-                <a16:creationId xmlns:a16="http://schemas.microsoft.com/office/drawing/2014/main" id="{39DD5B73-30EF-4B70-8AB5-735737C24082}"/>
-              </a:ext>
-            </a:extLst>
-          </p:cNvPr>
-          <p:cNvSpPr/>
-          <p:nvPr/>
-        </p:nvSpPr>
-        <p:spPr>
-          <a:xfrm>
-            <a:off x="881217" y="4933110"/>
-            <a:ext cx="1409700" cy="453628"/>
-          </a:xfrm>
-          <a:prstGeom prst="rect">
-            <a:avLst/>
-          </a:prstGeom>
-          <a:solidFill>
-            <a:schemeClr val="bg1"/>
-          </a:solidFill>
-          <a:ln w="38100">
-            <a:solidFill>
-              <a:schemeClr val="tx1"/>
-            </a:solidFill>
-          </a:ln>
-        </p:spPr>
-        <p:style>
-          <a:lnRef idx="2">
-            <a:schemeClr val="accent1">
-              <a:shade val="50000"/>
-            </a:schemeClr>
-          </a:lnRef>
-          <a:fillRef idx="1">
-            <a:schemeClr val="accent1"/>
-          </a:fillRef>
-          <a:effectRef idx="0">
-            <a:schemeClr val="accent1"/>
-          </a:effectRef>
-          <a:fontRef idx="minor">
-            <a:schemeClr val="lt1"/>
-          </a:fontRef>
-        </p:style>
-        <p:txBody>
-          <a:bodyPr rtlCol="0" anchor="ctr"/>
-          <a:lstStyle/>
-          <a:p>
-            <a:pPr algn="ctr"/>
-            <a:r>
-              <a:rPr lang="fr-CH" dirty="0">
-                <a:solidFill>
-                  <a:schemeClr val="tx1"/>
-                </a:solidFill>
-              </a:rPr>
-              <a:t>…</a:t>
-            </a:r>
-          </a:p>
-        </p:txBody>
-      </p:sp>
-      <p:sp>
-        <p:nvSpPr>
-          <p:cNvPr id="58" name="Rectangle 57">
-            <a:extLst>
-              <a:ext uri="{FF2B5EF4-FFF2-40B4-BE49-F238E27FC236}">
-                <a16:creationId xmlns:a16="http://schemas.microsoft.com/office/drawing/2014/main" id="{60588FEB-4CD5-4065-825F-FBE62683B26F}"/>
-              </a:ext>
-            </a:extLst>
-          </p:cNvPr>
-          <p:cNvSpPr/>
-          <p:nvPr/>
-        </p:nvSpPr>
-        <p:spPr>
-          <a:xfrm>
-            <a:off x="886130" y="5380478"/>
-            <a:ext cx="1409700" cy="453628"/>
-          </a:xfrm>
-          <a:prstGeom prst="rect">
-            <a:avLst/>
-          </a:prstGeom>
-          <a:solidFill>
-            <a:schemeClr val="bg1"/>
-          </a:solidFill>
-          <a:ln w="38100">
-            <a:solidFill>
-              <a:schemeClr val="tx1"/>
-            </a:solidFill>
-          </a:ln>
-        </p:spPr>
-        <p:style>
-          <a:lnRef idx="2">
-            <a:schemeClr val="accent1">
-              <a:shade val="50000"/>
-            </a:schemeClr>
-          </a:lnRef>
-          <a:fillRef idx="1">
-            <a:schemeClr val="accent1"/>
-          </a:fillRef>
-          <a:effectRef idx="0">
-            <a:schemeClr val="accent1"/>
-          </a:effectRef>
-          <a:fontRef idx="minor">
-            <a:schemeClr val="lt1"/>
-          </a:fontRef>
-        </p:style>
-        <p:txBody>
-          <a:bodyPr rtlCol="0" anchor="ctr"/>
-          <a:lstStyle/>
-          <a:p>
-            <a:pPr algn="ctr"/>
-            <a:r>
-              <a:rPr lang="fr-CH" dirty="0">
-                <a:solidFill>
-                  <a:schemeClr val="tx1"/>
-                </a:solidFill>
-              </a:rPr>
-              <a:t>Étage2</a:t>
-            </a:r>
-          </a:p>
-        </p:txBody>
-      </p:sp>
-      <p:sp>
-        <p:nvSpPr>
-          <p:cNvPr id="59" name="Rectangle 58">
-            <a:extLst>
-              <a:ext uri="{FF2B5EF4-FFF2-40B4-BE49-F238E27FC236}">
-                <a16:creationId xmlns:a16="http://schemas.microsoft.com/office/drawing/2014/main" id="{CCBA0498-7B52-496F-9AF7-7FF7F213D327}"/>
-              </a:ext>
-            </a:extLst>
-          </p:cNvPr>
-          <p:cNvSpPr/>
-          <p:nvPr/>
-        </p:nvSpPr>
-        <p:spPr>
-          <a:xfrm>
-            <a:off x="876298" y="5861406"/>
-            <a:ext cx="1409700" cy="453628"/>
-          </a:xfrm>
-          <a:prstGeom prst="rect">
-            <a:avLst/>
-          </a:prstGeom>
-          <a:solidFill>
-            <a:schemeClr val="accent1">
-              <a:lumMod val="40000"/>
-              <a:lumOff val="60000"/>
-            </a:schemeClr>
-          </a:solidFill>
-          <a:ln w="38100">
-            <a:solidFill>
-              <a:schemeClr val="tx1"/>
-            </a:solidFill>
-          </a:ln>
-        </p:spPr>
-        <p:style>
-          <a:lnRef idx="2">
-            <a:schemeClr val="accent1">
-              <a:shade val="50000"/>
-            </a:schemeClr>
-          </a:lnRef>
-          <a:fillRef idx="1">
-            <a:schemeClr val="accent1"/>
-          </a:fillRef>
-          <a:effectRef idx="0">
-            <a:schemeClr val="accent1"/>
-          </a:effectRef>
-          <a:fontRef idx="minor">
-            <a:schemeClr val="lt1"/>
-          </a:fontRef>
-        </p:style>
-        <p:txBody>
-          <a:bodyPr rtlCol="0" anchor="ctr"/>
-          <a:lstStyle/>
-          <a:p>
-            <a:pPr algn="ctr"/>
-            <a:r>
-              <a:rPr lang="fr-CH" sz="1600" dirty="0">
-                <a:solidFill>
-                  <a:schemeClr val="tx1"/>
-                </a:solidFill>
-              </a:rPr>
-              <a:t>Étage1</a:t>
-            </a:r>
-            <a:endParaRPr lang="fr-CH" dirty="0">
+            <a:ln w="38100">
               <a:solidFill>
                 <a:schemeClr val="tx1"/>
               </a:solidFill>
-            </a:endParaRPr>
-          </a:p>
-        </p:txBody>
-      </p:sp>
+            </a:ln>
+          </p:spPr>
+          <p:style>
+            <a:lnRef idx="2">
+              <a:schemeClr val="accent1">
+                <a:shade val="50000"/>
+              </a:schemeClr>
+            </a:lnRef>
+            <a:fillRef idx="1">
+              <a:schemeClr val="accent1"/>
+            </a:fillRef>
+            <a:effectRef idx="0">
+              <a:schemeClr val="accent1"/>
+            </a:effectRef>
+            <a:fontRef idx="minor">
+              <a:schemeClr val="lt1"/>
+            </a:fontRef>
+          </p:style>
+          <p:txBody>
+            <a:bodyPr rtlCol="0" anchor="ctr"/>
+            <a:lstStyle/>
+            <a:p>
+              <a:pPr algn="ctr"/>
+              <a:endParaRPr lang="fr-CH" dirty="0">
+                <a:solidFill>
+                  <a:schemeClr val="accent6">
+                    <a:lumMod val="60000"/>
+                    <a:lumOff val="40000"/>
+                  </a:schemeClr>
+                </a:solidFill>
+              </a:endParaRPr>
+            </a:p>
+          </p:txBody>
+        </p:sp>
+        <p:sp>
+          <p:nvSpPr>
+            <p:cNvPr id="69" name="ZoneTexte 68">
+              <a:extLst>
+                <a:ext uri="{FF2B5EF4-FFF2-40B4-BE49-F238E27FC236}">
+                  <a16:creationId xmlns:a16="http://schemas.microsoft.com/office/drawing/2014/main" id="{9F462797-7E68-448B-B1E1-B98A0C471FC1}"/>
+                </a:ext>
+              </a:extLst>
+            </p:cNvPr>
+            <p:cNvSpPr txBox="1"/>
+            <p:nvPr/>
+          </p:nvSpPr>
+          <p:spPr>
+            <a:xfrm>
+              <a:off x="2578011" y="5807129"/>
+              <a:ext cx="3914669" cy="425777"/>
+            </a:xfrm>
+            <a:prstGeom prst="rect">
+              <a:avLst/>
+            </a:prstGeom>
+            <a:noFill/>
+          </p:spPr>
+          <p:txBody>
+            <a:bodyPr wrap="square" rtlCol="0">
+              <a:spAutoFit/>
+            </a:bodyPr>
+            <a:lstStyle/>
+            <a:p>
+              <a:r>
+                <a:rPr lang="fr-CH" dirty="0"/>
+                <a:t>= Étage/Établissement sélectionné</a:t>
+              </a:r>
+            </a:p>
+          </p:txBody>
+        </p:sp>
+      </p:grpSp>
     </p:spTree>
     <p:extLst>
       <p:ext uri="{BB962C8B-B14F-4D97-AF65-F5344CB8AC3E}">

</xml_diff>